<commit_message>
changed color of slides, and add annotation of compilation stages
</commit_message>
<xml_diff>
--- a/notebooks/xiaoqi-why-julia-fast.pptx
+++ b/notebooks/xiaoqi-why-julia-fast.pptx
@@ -124,42 +124,45 @@
 </file>
 
 <file path=ppt/diagrams/colors1.xml><?xml version="1.0" encoding="utf-8"?>
-<dgm:colorsDef xmlns:dgm="http://schemas.openxmlformats.org/drawingml/2006/diagram" xmlns:a="http://schemas.openxmlformats.org/drawingml/2006/main" uniqueId="urn:microsoft.com/office/officeart/2005/8/colors/accent0_3">
+<dgm:colorsDef xmlns:dgm="http://schemas.openxmlformats.org/drawingml/2006/diagram" xmlns:a="http://schemas.openxmlformats.org/drawingml/2006/main" uniqueId="urn:microsoft.com/office/officeart/2005/8/colors/colorful5">
   <dgm:title val=""/>
   <dgm:desc val=""/>
   <dgm:catLst>
-    <dgm:cat type="mainScheme" pri="10300"/>
+    <dgm:cat type="colorful" pri="10500"/>
   </dgm:catLst>
   <dgm:styleLbl name="node0">
     <dgm:fillClrLst meth="repeat">
-      <a:schemeClr val="dk2"/>
+      <a:schemeClr val="accent4"/>
     </dgm:fillClrLst>
     <dgm:linClrLst meth="repeat">
-      <a:schemeClr val="lt2"/>
+      <a:schemeClr val="lt1"/>
     </dgm:linClrLst>
     <dgm:effectClrLst/>
     <dgm:txLinClrLst/>
     <dgm:txFillClrLst/>
     <dgm:txEffectClrLst/>
   </dgm:styleLbl>
-  <dgm:styleLbl name="alignNode1">
-    <dgm:fillClrLst meth="repeat">
-      <a:schemeClr val="dk2"/>
+  <dgm:styleLbl name="node1">
+    <dgm:fillClrLst>
+      <a:schemeClr val="accent5"/>
+      <a:schemeClr val="accent6"/>
     </dgm:fillClrLst>
     <dgm:linClrLst meth="repeat">
-      <a:schemeClr val="dk2"/>
+      <a:schemeClr val="lt1"/>
     </dgm:linClrLst>
     <dgm:effectClrLst/>
     <dgm:txLinClrLst/>
     <dgm:txFillClrLst/>
     <dgm:txEffectClrLst/>
   </dgm:styleLbl>
-  <dgm:styleLbl name="node1">
-    <dgm:fillClrLst meth="repeat">
-      <a:schemeClr val="dk2"/>
+  <dgm:styleLbl name="alignNode1">
+    <dgm:fillClrLst>
+      <a:schemeClr val="accent5"/>
+      <a:schemeClr val="accent6"/>
     </dgm:fillClrLst>
-    <dgm:linClrLst meth="repeat">
-      <a:schemeClr val="lt2"/>
+    <dgm:linClrLst>
+      <a:schemeClr val="accent5"/>
+      <a:schemeClr val="accent6"/>
     </dgm:linClrLst>
     <dgm:effectClrLst/>
     <dgm:txLinClrLst/>
@@ -167,11 +170,12 @@
     <dgm:txEffectClrLst/>
   </dgm:styleLbl>
   <dgm:styleLbl name="lnNode1">
-    <dgm:fillClrLst meth="repeat">
-      <a:schemeClr val="dk2"/>
+    <dgm:fillClrLst>
+      <a:schemeClr val="accent5"/>
+      <a:schemeClr val="accent6"/>
     </dgm:fillClrLst>
     <dgm:linClrLst meth="repeat">
-      <a:schemeClr val="lt2"/>
+      <a:schemeClr val="lt1"/>
     </dgm:linClrLst>
     <dgm:effectClrLst/>
     <dgm:txLinClrLst/>
@@ -179,13 +183,16 @@
     <dgm:txEffectClrLst/>
   </dgm:styleLbl>
   <dgm:styleLbl name="vennNode1">
-    <dgm:fillClrLst meth="repeat">
-      <a:schemeClr val="dk2">
+    <dgm:fillClrLst>
+      <a:schemeClr val="accent5">
+        <a:alpha val="50000"/>
+      </a:schemeClr>
+      <a:schemeClr val="accent6">
         <a:alpha val="50000"/>
       </a:schemeClr>
     </dgm:fillClrLst>
     <dgm:linClrLst meth="repeat">
-      <a:schemeClr val="lt2"/>
+      <a:schemeClr val="lt1"/>
     </dgm:linClrLst>
     <dgm:effectClrLst/>
     <dgm:txLinClrLst/>
@@ -193,11 +200,11 @@
     <dgm:txEffectClrLst/>
   </dgm:styleLbl>
   <dgm:styleLbl name="node2">
-    <dgm:fillClrLst meth="repeat">
-      <a:schemeClr val="dk2"/>
+    <dgm:fillClrLst>
+      <a:schemeClr val="accent6"/>
     </dgm:fillClrLst>
     <dgm:linClrLst meth="repeat">
-      <a:schemeClr val="lt2"/>
+      <a:schemeClr val="lt1"/>
     </dgm:linClrLst>
     <dgm:effectClrLst/>
     <dgm:txLinClrLst/>
@@ -205,11 +212,11 @@
     <dgm:txEffectClrLst/>
   </dgm:styleLbl>
   <dgm:styleLbl name="node3">
-    <dgm:fillClrLst meth="repeat">
-      <a:schemeClr val="dk2"/>
+    <dgm:fillClrLst>
+      <a:schemeClr val="accent1"/>
     </dgm:fillClrLst>
     <dgm:linClrLst meth="repeat">
-      <a:schemeClr val="lt2"/>
+      <a:schemeClr val="lt1"/>
     </dgm:linClrLst>
     <dgm:effectClrLst/>
     <dgm:txLinClrLst/>
@@ -217,11 +224,11 @@
     <dgm:txEffectClrLst/>
   </dgm:styleLbl>
   <dgm:styleLbl name="node4">
-    <dgm:fillClrLst meth="repeat">
-      <a:schemeClr val="dk2"/>
+    <dgm:fillClrLst>
+      <a:schemeClr val="accent2"/>
     </dgm:fillClrLst>
     <dgm:linClrLst meth="repeat">
-      <a:schemeClr val="lt2"/>
+      <a:schemeClr val="lt1"/>
     </dgm:linClrLst>
     <dgm:effectClrLst/>
     <dgm:txLinClrLst/>
@@ -229,67 +236,69 @@
     <dgm:txEffectClrLst/>
   </dgm:styleLbl>
   <dgm:styleLbl name="fgImgPlace1">
-    <dgm:fillClrLst meth="repeat">
-      <a:schemeClr val="dk2">
+    <dgm:fillClrLst>
+      <a:schemeClr val="accent5">
+        <a:tint val="50000"/>
+      </a:schemeClr>
+      <a:schemeClr val="accent6">
         <a:tint val="50000"/>
       </a:schemeClr>
     </dgm:fillClrLst>
     <dgm:linClrLst meth="repeat">
-      <a:schemeClr val="lt2"/>
+      <a:schemeClr val="lt1"/>
     </dgm:linClrLst>
     <dgm:effectClrLst/>
     <dgm:txLinClrLst/>
     <dgm:txFillClrLst meth="repeat">
-      <a:schemeClr val="lt2"/>
+      <a:schemeClr val="lt1"/>
     </dgm:txFillClrLst>
     <dgm:txEffectClrLst/>
   </dgm:styleLbl>
   <dgm:styleLbl name="alignImgPlace1">
-    <dgm:fillClrLst meth="repeat">
-      <a:schemeClr val="dk2">
+    <dgm:fillClrLst>
+      <a:schemeClr val="accent5">
         <a:tint val="50000"/>
+      </a:schemeClr>
+      <a:schemeClr val="accent6">
+        <a:tint val="20000"/>
       </a:schemeClr>
     </dgm:fillClrLst>
     <dgm:linClrLst meth="repeat">
-      <a:schemeClr val="dk2">
-        <a:shade val="80000"/>
-      </a:schemeClr>
+      <a:schemeClr val="lt1"/>
     </dgm:linClrLst>
     <dgm:effectClrLst/>
     <dgm:txLinClrLst/>
     <dgm:txFillClrLst meth="repeat">
-      <a:schemeClr val="lt2"/>
+      <a:schemeClr val="lt1"/>
     </dgm:txFillClrLst>
     <dgm:txEffectClrLst/>
   </dgm:styleLbl>
   <dgm:styleLbl name="bgImgPlace1">
-    <dgm:fillClrLst meth="repeat">
-      <a:schemeClr val="dk2">
+    <dgm:fillClrLst>
+      <a:schemeClr val="accent5">
         <a:tint val="50000"/>
+      </a:schemeClr>
+      <a:schemeClr val="accent6">
+        <a:tint val="20000"/>
       </a:schemeClr>
     </dgm:fillClrLst>
     <dgm:linClrLst meth="repeat">
-      <a:schemeClr val="dk2">
-        <a:shade val="80000"/>
-      </a:schemeClr>
+      <a:schemeClr val="lt1"/>
     </dgm:linClrLst>
     <dgm:effectClrLst/>
     <dgm:txLinClrLst/>
     <dgm:txFillClrLst meth="repeat">
-      <a:schemeClr val="lt2"/>
+      <a:schemeClr val="lt1"/>
     </dgm:txFillClrLst>
     <dgm:txEffectClrLst/>
   </dgm:styleLbl>
   <dgm:styleLbl name="sibTrans2D1">
-    <dgm:fillClrLst meth="repeat">
-      <a:schemeClr val="dk2">
-        <a:tint val="60000"/>
-      </a:schemeClr>
+    <dgm:fillClrLst>
+      <a:schemeClr val="accent5"/>
+      <a:schemeClr val="accent6"/>
     </dgm:fillClrLst>
     <dgm:linClrLst meth="repeat">
-      <a:schemeClr val="dk2">
-        <a:tint val="60000"/>
-      </a:schemeClr>
+      <a:schemeClr val="lt1"/>
     </dgm:linClrLst>
     <dgm:effectClrLst/>
     <dgm:txLinClrLst/>
@@ -297,194 +306,55 @@
     <dgm:txEffectClrLst/>
   </dgm:styleLbl>
   <dgm:styleLbl name="fgSibTrans2D1">
-    <dgm:fillClrLst meth="repeat">
-      <a:schemeClr val="dk2">
-        <a:tint val="60000"/>
-      </a:schemeClr>
+    <dgm:fillClrLst>
+      <a:schemeClr val="accent5"/>
+      <a:schemeClr val="accent6"/>
     </dgm:fillClrLst>
     <dgm:linClrLst meth="repeat">
-      <a:schemeClr val="dk2">
-        <a:tint val="60000"/>
-      </a:schemeClr>
-    </dgm:linClrLst>
-    <dgm:effectClrLst/>
-    <dgm:txLinClrLst/>
-    <dgm:txFillClrLst/>
-    <dgm:txEffectClrLst/>
-  </dgm:styleLbl>
-  <dgm:styleLbl name="bgSibTrans2D1">
-    <dgm:fillClrLst meth="repeat">
-      <a:schemeClr val="dk2">
-        <a:tint val="60000"/>
-      </a:schemeClr>
-    </dgm:fillClrLst>
-    <dgm:linClrLst meth="repeat">
-      <a:schemeClr val="dk2">
-        <a:tint val="60000"/>
-      </a:schemeClr>
-    </dgm:linClrLst>
-    <dgm:effectClrLst/>
-    <dgm:txLinClrLst/>
-    <dgm:txFillClrLst/>
-    <dgm:txEffectClrLst/>
-  </dgm:styleLbl>
-  <dgm:styleLbl name="sibTrans1D1">
-    <dgm:fillClrLst meth="repeat">
-      <a:schemeClr val="dk2"/>
-    </dgm:fillClrLst>
-    <dgm:linClrLst meth="repeat">
-      <a:schemeClr val="dk2"/>
+      <a:schemeClr val="lt1"/>
     </dgm:linClrLst>
     <dgm:effectClrLst/>
     <dgm:txLinClrLst/>
     <dgm:txFillClrLst meth="repeat">
-      <a:schemeClr val="lt2"/>
+      <a:schemeClr val="lt1"/>
     </dgm:txFillClrLst>
     <dgm:txEffectClrLst/>
   </dgm:styleLbl>
-  <dgm:styleLbl name="callout">
-    <dgm:fillClrLst meth="repeat">
-      <a:schemeClr val="dk2"/>
+  <dgm:styleLbl name="bgSibTrans2D1">
+    <dgm:fillClrLst>
+      <a:schemeClr val="accent5"/>
+      <a:schemeClr val="accent6"/>
     </dgm:fillClrLst>
     <dgm:linClrLst meth="repeat">
-      <a:schemeClr val="dk2">
-        <a:tint val="50000"/>
-      </a:schemeClr>
+      <a:schemeClr val="lt1"/>
     </dgm:linClrLst>
     <dgm:effectClrLst/>
     <dgm:txLinClrLst/>
     <dgm:txFillClrLst meth="repeat">
-      <a:schemeClr val="lt2"/>
+      <a:schemeClr val="lt1"/>
     </dgm:txFillClrLst>
     <dgm:txEffectClrLst/>
   </dgm:styleLbl>
-  <dgm:styleLbl name="asst0">
-    <dgm:fillClrLst meth="repeat">
-      <a:schemeClr val="dk2"/>
-    </dgm:fillClrLst>
-    <dgm:linClrLst meth="repeat">
-      <a:schemeClr val="lt2"/>
-    </dgm:linClrLst>
-    <dgm:effectClrLst/>
-    <dgm:txLinClrLst/>
-    <dgm:txFillClrLst/>
-    <dgm:txEffectClrLst/>
-  </dgm:styleLbl>
-  <dgm:styleLbl name="asst1">
-    <dgm:fillClrLst meth="repeat">
-      <a:schemeClr val="dk2"/>
-    </dgm:fillClrLst>
-    <dgm:linClrLst meth="repeat">
-      <a:schemeClr val="lt2"/>
-    </dgm:linClrLst>
-    <dgm:effectClrLst/>
-    <dgm:txLinClrLst/>
-    <dgm:txFillClrLst/>
-    <dgm:txEffectClrLst/>
-  </dgm:styleLbl>
-  <dgm:styleLbl name="asst2">
-    <dgm:fillClrLst meth="repeat">
-      <a:schemeClr val="dk2"/>
-    </dgm:fillClrLst>
-    <dgm:linClrLst meth="repeat">
-      <a:schemeClr val="lt2"/>
-    </dgm:linClrLst>
-    <dgm:effectClrLst/>
-    <dgm:txLinClrLst/>
-    <dgm:txFillClrLst/>
-    <dgm:txEffectClrLst/>
-  </dgm:styleLbl>
-  <dgm:styleLbl name="asst3">
-    <dgm:fillClrLst meth="repeat">
-      <a:schemeClr val="dk2"/>
-    </dgm:fillClrLst>
-    <dgm:linClrLst meth="repeat">
-      <a:schemeClr val="lt2"/>
-    </dgm:linClrLst>
-    <dgm:effectClrLst/>
-    <dgm:txLinClrLst/>
-    <dgm:txFillClrLst/>
-    <dgm:txEffectClrLst/>
-  </dgm:styleLbl>
-  <dgm:styleLbl name="asst4">
-    <dgm:fillClrLst meth="repeat">
-      <a:schemeClr val="dk2"/>
-    </dgm:fillClrLst>
-    <dgm:linClrLst meth="repeat">
-      <a:schemeClr val="lt2"/>
-    </dgm:linClrLst>
-    <dgm:effectClrLst/>
-    <dgm:txLinClrLst/>
-    <dgm:txFillClrLst/>
-    <dgm:txEffectClrLst/>
-  </dgm:styleLbl>
-  <dgm:styleLbl name="parChTrans2D1">
-    <dgm:fillClrLst meth="repeat">
-      <a:schemeClr val="dk2">
-        <a:tint val="60000"/>
-      </a:schemeClr>
-    </dgm:fillClrLst>
-    <dgm:linClrLst meth="repeat">
-      <a:schemeClr val="dk2">
-        <a:tint val="60000"/>
-      </a:schemeClr>
+  <dgm:styleLbl name="sibTrans1D1">
+    <dgm:fillClrLst/>
+    <dgm:linClrLst>
+      <a:schemeClr val="accent5"/>
+      <a:schemeClr val="accent6"/>
     </dgm:linClrLst>
     <dgm:effectClrLst/>
     <dgm:txLinClrLst/>
     <dgm:txFillClrLst meth="repeat">
-      <a:schemeClr val="lt2"/>
+      <a:schemeClr val="tx1"/>
     </dgm:txFillClrLst>
     <dgm:txEffectClrLst/>
   </dgm:styleLbl>
-  <dgm:styleLbl name="parChTrans2D2">
+  <dgm:styleLbl name="callout">
     <dgm:fillClrLst meth="repeat">
-      <a:schemeClr val="dk2"/>
+      <a:schemeClr val="accent5"/>
     </dgm:fillClrLst>
     <dgm:linClrLst meth="repeat">
-      <a:schemeClr val="dk2"/>
-    </dgm:linClrLst>
-    <dgm:effectClrLst/>
-    <dgm:txLinClrLst/>
-    <dgm:txFillClrLst meth="repeat">
-      <a:schemeClr val="lt2"/>
-    </dgm:txFillClrLst>
-    <dgm:txEffectClrLst/>
-  </dgm:styleLbl>
-  <dgm:styleLbl name="parChTrans2D3">
-    <dgm:fillClrLst meth="repeat">
-      <a:schemeClr val="dk2"/>
-    </dgm:fillClrLst>
-    <dgm:linClrLst meth="repeat">
-      <a:schemeClr val="dk2"/>
-    </dgm:linClrLst>
-    <dgm:effectClrLst/>
-    <dgm:txLinClrLst/>
-    <dgm:txFillClrLst meth="repeat">
-      <a:schemeClr val="lt2"/>
-    </dgm:txFillClrLst>
-    <dgm:txEffectClrLst/>
-  </dgm:styleLbl>
-  <dgm:styleLbl name="parChTrans2D4">
-    <dgm:fillClrLst meth="repeat">
-      <a:schemeClr val="dk2"/>
-    </dgm:fillClrLst>
-    <dgm:linClrLst meth="repeat">
-      <a:schemeClr val="dk2"/>
-    </dgm:linClrLst>
-    <dgm:effectClrLst/>
-    <dgm:txLinClrLst/>
-    <dgm:txFillClrLst meth="repeat">
-      <a:schemeClr val="lt2"/>
-    </dgm:txFillClrLst>
-    <dgm:txEffectClrLst/>
-  </dgm:styleLbl>
-  <dgm:styleLbl name="parChTrans1D1">
-    <dgm:fillClrLst meth="repeat">
-      <a:schemeClr val="dk2"/>
-    </dgm:fillClrLst>
-    <dgm:linClrLst meth="repeat">
-      <a:schemeClr val="dk2">
-        <a:shade val="60000"/>
+      <a:schemeClr val="accent5">
+        <a:tint val="50000"/>
       </a:schemeClr>
     </dgm:linClrLst>
     <dgm:effectClrLst/>
@@ -494,14 +364,128 @@
     </dgm:txFillClrLst>
     <dgm:txEffectClrLst/>
   </dgm:styleLbl>
-  <dgm:styleLbl name="parChTrans1D2">
+  <dgm:styleLbl name="asst0">
     <dgm:fillClrLst meth="repeat">
-      <a:schemeClr val="dk2"/>
+      <a:schemeClr val="accent5"/>
     </dgm:fillClrLst>
     <dgm:linClrLst meth="repeat">
-      <a:schemeClr val="dk2">
-        <a:shade val="60000"/>
+      <a:schemeClr val="lt1">
+        <a:shade val="80000"/>
       </a:schemeClr>
+    </dgm:linClrLst>
+    <dgm:effectClrLst/>
+    <dgm:txLinClrLst/>
+    <dgm:txFillClrLst/>
+    <dgm:txEffectClrLst/>
+  </dgm:styleLbl>
+  <dgm:styleLbl name="asst1">
+    <dgm:fillClrLst meth="repeat">
+      <a:schemeClr val="accent6"/>
+    </dgm:fillClrLst>
+    <dgm:linClrLst meth="repeat">
+      <a:schemeClr val="lt1">
+        <a:shade val="80000"/>
+      </a:schemeClr>
+    </dgm:linClrLst>
+    <dgm:effectClrLst/>
+    <dgm:txLinClrLst/>
+    <dgm:txFillClrLst/>
+    <dgm:txEffectClrLst/>
+  </dgm:styleLbl>
+  <dgm:styleLbl name="asst2">
+    <dgm:fillClrLst>
+      <a:schemeClr val="accent1"/>
+    </dgm:fillClrLst>
+    <dgm:linClrLst meth="repeat">
+      <a:schemeClr val="lt1"/>
+    </dgm:linClrLst>
+    <dgm:effectClrLst/>
+    <dgm:txLinClrLst/>
+    <dgm:txFillClrLst/>
+    <dgm:txEffectClrLst/>
+  </dgm:styleLbl>
+  <dgm:styleLbl name="asst3">
+    <dgm:fillClrLst>
+      <a:schemeClr val="accent2"/>
+    </dgm:fillClrLst>
+    <dgm:linClrLst meth="repeat">
+      <a:schemeClr val="lt1"/>
+    </dgm:linClrLst>
+    <dgm:effectClrLst/>
+    <dgm:txLinClrLst/>
+    <dgm:txFillClrLst/>
+    <dgm:txEffectClrLst/>
+  </dgm:styleLbl>
+  <dgm:styleLbl name="asst4">
+    <dgm:fillClrLst>
+      <a:schemeClr val="accent3"/>
+    </dgm:fillClrLst>
+    <dgm:linClrLst meth="repeat">
+      <a:schemeClr val="lt1"/>
+    </dgm:linClrLst>
+    <dgm:effectClrLst/>
+    <dgm:txLinClrLst/>
+    <dgm:txFillClrLst/>
+    <dgm:txEffectClrLst/>
+  </dgm:styleLbl>
+  <dgm:styleLbl name="parChTrans2D1">
+    <dgm:fillClrLst meth="repeat">
+      <a:schemeClr val="accent5"/>
+    </dgm:fillClrLst>
+    <dgm:linClrLst meth="repeat">
+      <a:schemeClr val="lt1"/>
+    </dgm:linClrLst>
+    <dgm:effectClrLst/>
+    <dgm:txLinClrLst/>
+    <dgm:txFillClrLst meth="repeat">
+      <a:schemeClr val="lt1"/>
+    </dgm:txFillClrLst>
+    <dgm:txEffectClrLst/>
+  </dgm:styleLbl>
+  <dgm:styleLbl name="parChTrans2D2">
+    <dgm:fillClrLst meth="repeat">
+      <a:schemeClr val="accent6"/>
+    </dgm:fillClrLst>
+    <dgm:linClrLst meth="repeat">
+      <a:schemeClr val="lt1"/>
+    </dgm:linClrLst>
+    <dgm:effectClrLst/>
+    <dgm:txLinClrLst/>
+    <dgm:txFillClrLst/>
+    <dgm:txEffectClrLst/>
+  </dgm:styleLbl>
+  <dgm:styleLbl name="parChTrans2D3">
+    <dgm:fillClrLst meth="repeat">
+      <a:schemeClr val="accent6"/>
+    </dgm:fillClrLst>
+    <dgm:linClrLst meth="repeat">
+      <a:schemeClr val="lt1"/>
+    </dgm:linClrLst>
+    <dgm:effectClrLst/>
+    <dgm:txLinClrLst/>
+    <dgm:txFillClrLst/>
+    <dgm:txEffectClrLst/>
+  </dgm:styleLbl>
+  <dgm:styleLbl name="parChTrans2D4">
+    <dgm:fillClrLst meth="repeat">
+      <a:schemeClr val="accent1"/>
+    </dgm:fillClrLst>
+    <dgm:linClrLst meth="repeat">
+      <a:schemeClr val="lt1"/>
+    </dgm:linClrLst>
+    <dgm:effectClrLst/>
+    <dgm:txLinClrLst/>
+    <dgm:txFillClrLst meth="repeat">
+      <a:schemeClr val="lt1"/>
+    </dgm:txFillClrLst>
+    <dgm:txEffectClrLst/>
+  </dgm:styleLbl>
+  <dgm:styleLbl name="parChTrans1D1">
+    <dgm:fillClrLst meth="repeat">
+      <a:schemeClr val="accent5"/>
+    </dgm:fillClrLst>
+    <dgm:linClrLst meth="repeat">
+      <a:schemeClr val="accent5"/>
     </dgm:linClrLst>
     <dgm:effectClrLst/>
     <dgm:txLinClrLst/>
@@ -510,14 +494,14 @@
     </dgm:txFillClrLst>
     <dgm:txEffectClrLst/>
   </dgm:styleLbl>
-  <dgm:styleLbl name="parChTrans1D3">
+  <dgm:styleLbl name="parChTrans1D2">
     <dgm:fillClrLst meth="repeat">
-      <a:schemeClr val="dk2"/>
+      <a:schemeClr val="accent6">
+        <a:tint val="90000"/>
+      </a:schemeClr>
     </dgm:fillClrLst>
     <dgm:linClrLst meth="repeat">
-      <a:schemeClr val="dk2">
-        <a:shade val="80000"/>
-      </a:schemeClr>
+      <a:schemeClr val="accent6"/>
     </dgm:linClrLst>
     <dgm:effectClrLst/>
     <dgm:txLinClrLst/>
@@ -526,14 +510,14 @@
     </dgm:txFillClrLst>
     <dgm:txEffectClrLst/>
   </dgm:styleLbl>
-  <dgm:styleLbl name="parChTrans1D4">
+  <dgm:styleLbl name="parChTrans1D3">
     <dgm:fillClrLst meth="repeat">
-      <a:schemeClr val="dk2"/>
+      <a:schemeClr val="accent6">
+        <a:tint val="70000"/>
+      </a:schemeClr>
     </dgm:fillClrLst>
     <dgm:linClrLst meth="repeat">
-      <a:schemeClr val="dk2">
-        <a:shade val="80000"/>
-      </a:schemeClr>
+      <a:schemeClr val="accent1"/>
     </dgm:linClrLst>
     <dgm:effectClrLst/>
     <dgm:txLinClrLst/>
@@ -542,14 +526,31 @@
     </dgm:txFillClrLst>
     <dgm:txEffectClrLst/>
   </dgm:styleLbl>
+  <dgm:styleLbl name="parChTrans1D4">
+    <dgm:fillClrLst meth="repeat">
+      <a:schemeClr val="accent6">
+        <a:tint val="50000"/>
+      </a:schemeClr>
+    </dgm:fillClrLst>
+    <dgm:linClrLst meth="repeat">
+      <a:schemeClr val="accent2"/>
+    </dgm:linClrLst>
+    <dgm:effectClrLst/>
+    <dgm:txLinClrLst/>
+    <dgm:txFillClrLst meth="repeat">
+      <a:schemeClr val="tx1"/>
+    </dgm:txFillClrLst>
+    <dgm:txEffectClrLst/>
+  </dgm:styleLbl>
   <dgm:styleLbl name="fgAcc1">
     <dgm:fillClrLst meth="repeat">
-      <a:schemeClr val="lt2">
+      <a:schemeClr val="lt1">
         <a:alpha val="90000"/>
       </a:schemeClr>
     </dgm:fillClrLst>
-    <dgm:linClrLst meth="repeat">
-      <a:schemeClr val="dk2"/>
+    <dgm:linClrLst>
+      <a:schemeClr val="accent5"/>
+      <a:schemeClr val="accent6"/>
     </dgm:linClrLst>
     <dgm:effectClrLst/>
     <dgm:txLinClrLst/>
@@ -560,12 +561,13 @@
   </dgm:styleLbl>
   <dgm:styleLbl name="conFgAcc1">
     <dgm:fillClrLst meth="repeat">
-      <a:schemeClr val="lt2">
+      <a:schemeClr val="lt1">
         <a:alpha val="90000"/>
       </a:schemeClr>
     </dgm:fillClrLst>
-    <dgm:linClrLst meth="repeat">
-      <a:schemeClr val="dk2"/>
+    <dgm:linClrLst>
+      <a:schemeClr val="accent5"/>
+      <a:schemeClr val="accent6"/>
     </dgm:linClrLst>
     <dgm:effectClrLst/>
     <dgm:txLinClrLst/>
@@ -576,12 +578,13 @@
   </dgm:styleLbl>
   <dgm:styleLbl name="alignAcc1">
     <dgm:fillClrLst meth="repeat">
-      <a:schemeClr val="lt2">
+      <a:schemeClr val="lt1">
         <a:alpha val="90000"/>
       </a:schemeClr>
     </dgm:fillClrLst>
-    <dgm:linClrLst meth="repeat">
-      <a:schemeClr val="dk2"/>
+    <dgm:linClrLst>
+      <a:schemeClr val="accent5"/>
+      <a:schemeClr val="accent6"/>
     </dgm:linClrLst>
     <dgm:effectClrLst/>
     <dgm:txLinClrLst/>
@@ -592,12 +595,12 @@
   </dgm:styleLbl>
   <dgm:styleLbl name="trAlignAcc1">
     <dgm:fillClrLst meth="repeat">
-      <a:schemeClr val="lt2">
+      <a:schemeClr val="lt1">
         <a:alpha val="40000"/>
       </a:schemeClr>
     </dgm:fillClrLst>
     <dgm:linClrLst meth="repeat">
-      <a:schemeClr val="dk2"/>
+      <a:schemeClr val="accent5"/>
     </dgm:linClrLst>
     <dgm:effectClrLst/>
     <dgm:txLinClrLst/>
@@ -608,12 +611,13 @@
   </dgm:styleLbl>
   <dgm:styleLbl name="bgAcc1">
     <dgm:fillClrLst meth="repeat">
-      <a:schemeClr val="lt2">
+      <a:schemeClr val="lt1">
         <a:alpha val="90000"/>
       </a:schemeClr>
     </dgm:fillClrLst>
-    <dgm:linClrLst meth="repeat">
-      <a:schemeClr val="dk2"/>
+    <dgm:linClrLst>
+      <a:schemeClr val="accent5"/>
+      <a:schemeClr val="accent6"/>
     </dgm:linClrLst>
     <dgm:effectClrLst/>
     <dgm:txLinClrLst/>
@@ -624,10 +628,11 @@
   </dgm:styleLbl>
   <dgm:styleLbl name="solidFgAcc1">
     <dgm:fillClrLst meth="repeat">
-      <a:schemeClr val="lt2"/>
+      <a:schemeClr val="lt1"/>
     </dgm:fillClrLst>
-    <dgm:linClrLst meth="repeat">
-      <a:schemeClr val="dk2"/>
+    <dgm:linClrLst>
+      <a:schemeClr val="accent5"/>
+      <a:schemeClr val="accent6"/>
     </dgm:linClrLst>
     <dgm:effectClrLst/>
     <dgm:txLinClrLst/>
@@ -638,10 +643,11 @@
   </dgm:styleLbl>
   <dgm:styleLbl name="solidAlignAcc1">
     <dgm:fillClrLst meth="repeat">
-      <a:schemeClr val="lt2"/>
+      <a:schemeClr val="lt1"/>
     </dgm:fillClrLst>
-    <dgm:linClrLst meth="repeat">
-      <a:schemeClr val="dk2"/>
+    <dgm:linClrLst>
+      <a:schemeClr val="accent5"/>
+      <a:schemeClr val="accent6"/>
     </dgm:linClrLst>
     <dgm:effectClrLst/>
     <dgm:txLinClrLst/>
@@ -652,10 +658,11 @@
   </dgm:styleLbl>
   <dgm:styleLbl name="solidBgAcc1">
     <dgm:fillClrLst meth="repeat">
-      <a:schemeClr val="lt2"/>
+      <a:schemeClr val="lt1"/>
     </dgm:fillClrLst>
-    <dgm:linClrLst meth="repeat">
-      <a:schemeClr val="dk2"/>
+    <dgm:linClrLst>
+      <a:schemeClr val="accent5"/>
+      <a:schemeClr val="accent6"/>
     </dgm:linClrLst>
     <dgm:effectClrLst/>
     <dgm:txLinClrLst/>
@@ -665,16 +672,24 @@
     <dgm:txEffectClrLst/>
   </dgm:styleLbl>
   <dgm:styleLbl name="fgAccFollowNode1">
-    <dgm:fillClrLst meth="repeat">
-      <a:schemeClr val="dk2">
+    <dgm:fillClrLst>
+      <a:schemeClr val="accent5">
+        <a:tint val="40000"/>
         <a:alpha val="90000"/>
+      </a:schemeClr>
+      <a:schemeClr val="accent6">
         <a:tint val="40000"/>
+        <a:alpha val="90000"/>
       </a:schemeClr>
     </dgm:fillClrLst>
-    <dgm:linClrLst meth="repeat">
-      <a:schemeClr val="dk2">
+    <dgm:linClrLst>
+      <a:schemeClr val="accent5">
+        <a:tint val="40000"/>
         <a:alpha val="90000"/>
+      </a:schemeClr>
+      <a:schemeClr val="accent5">
         <a:tint val="40000"/>
+        <a:alpha val="90000"/>
       </a:schemeClr>
     </dgm:linClrLst>
     <dgm:effectClrLst/>
@@ -685,16 +700,24 @@
     <dgm:txEffectClrLst/>
   </dgm:styleLbl>
   <dgm:styleLbl name="alignAccFollowNode1">
-    <dgm:fillClrLst meth="repeat">
-      <a:schemeClr val="dk2">
+    <dgm:fillClrLst>
+      <a:schemeClr val="accent5">
+        <a:tint val="40000"/>
         <a:alpha val="90000"/>
+      </a:schemeClr>
+      <a:schemeClr val="accent6">
         <a:tint val="40000"/>
+        <a:alpha val="90000"/>
       </a:schemeClr>
     </dgm:fillClrLst>
-    <dgm:linClrLst meth="repeat">
-      <a:schemeClr val="dk2">
+    <dgm:linClrLst>
+      <a:schemeClr val="accent5">
+        <a:tint val="40000"/>
         <a:alpha val="90000"/>
+      </a:schemeClr>
+      <a:schemeClr val="accent6">
         <a:tint val="40000"/>
+        <a:alpha val="90000"/>
       </a:schemeClr>
     </dgm:linClrLst>
     <dgm:effectClrLst/>
@@ -705,16 +728,24 @@
     <dgm:txEffectClrLst/>
   </dgm:styleLbl>
   <dgm:styleLbl name="bgAccFollowNode1">
-    <dgm:fillClrLst meth="repeat">
-      <a:schemeClr val="dk2">
+    <dgm:fillClrLst>
+      <a:schemeClr val="accent5">
+        <a:tint val="40000"/>
         <a:alpha val="90000"/>
+      </a:schemeClr>
+      <a:schemeClr val="accent6">
         <a:tint val="40000"/>
+        <a:alpha val="90000"/>
       </a:schemeClr>
     </dgm:fillClrLst>
-    <dgm:linClrLst meth="repeat">
-      <a:schemeClr val="dk2">
+    <dgm:linClrLst>
+      <a:schemeClr val="accent5">
+        <a:tint val="40000"/>
         <a:alpha val="90000"/>
+      </a:schemeClr>
+      <a:schemeClr val="accent6">
         <a:tint val="40000"/>
+        <a:alpha val="90000"/>
       </a:schemeClr>
     </dgm:linClrLst>
     <dgm:effectClrLst/>
@@ -726,12 +757,12 @@
   </dgm:styleLbl>
   <dgm:styleLbl name="fgAcc0">
     <dgm:fillClrLst meth="repeat">
-      <a:schemeClr val="lt2">
+      <a:schemeClr val="lt1">
         <a:alpha val="90000"/>
       </a:schemeClr>
     </dgm:fillClrLst>
-    <dgm:linClrLst meth="repeat">
-      <a:schemeClr val="dk2"/>
+    <dgm:linClrLst>
+      <a:schemeClr val="accent4"/>
     </dgm:linClrLst>
     <dgm:effectClrLst/>
     <dgm:txLinClrLst/>
@@ -742,12 +773,12 @@
   </dgm:styleLbl>
   <dgm:styleLbl name="fgAcc2">
     <dgm:fillClrLst meth="repeat">
-      <a:schemeClr val="lt2">
+      <a:schemeClr val="lt1">
         <a:alpha val="90000"/>
       </a:schemeClr>
     </dgm:fillClrLst>
-    <dgm:linClrLst meth="repeat">
-      <a:schemeClr val="dk2"/>
+    <dgm:linClrLst>
+      <a:schemeClr val="accent6"/>
     </dgm:linClrLst>
     <dgm:effectClrLst/>
     <dgm:txLinClrLst/>
@@ -758,12 +789,12 @@
   </dgm:styleLbl>
   <dgm:styleLbl name="fgAcc3">
     <dgm:fillClrLst meth="repeat">
-      <a:schemeClr val="lt2">
+      <a:schemeClr val="lt1">
         <a:alpha val="90000"/>
       </a:schemeClr>
     </dgm:fillClrLst>
-    <dgm:linClrLst meth="repeat">
-      <a:schemeClr val="dk2"/>
+    <dgm:linClrLst>
+      <a:schemeClr val="accent1"/>
     </dgm:linClrLst>
     <dgm:effectClrLst/>
     <dgm:txLinClrLst/>
@@ -774,12 +805,12 @@
   </dgm:styleLbl>
   <dgm:styleLbl name="fgAcc4">
     <dgm:fillClrLst meth="repeat">
-      <a:schemeClr val="lt2">
+      <a:schemeClr val="lt1">
         <a:alpha val="90000"/>
       </a:schemeClr>
     </dgm:fillClrLst>
-    <dgm:linClrLst meth="repeat">
-      <a:schemeClr val="dk2"/>
+    <dgm:linClrLst>
+      <a:schemeClr val="accent2"/>
     </dgm:linClrLst>
     <dgm:effectClrLst/>
     <dgm:txLinClrLst/>
@@ -790,12 +821,12 @@
   </dgm:styleLbl>
   <dgm:styleLbl name="bgShp">
     <dgm:fillClrLst meth="repeat">
-      <a:schemeClr val="dk2">
+      <a:schemeClr val="accent5">
         <a:tint val="40000"/>
       </a:schemeClr>
     </dgm:fillClrLst>
     <dgm:linClrLst meth="repeat">
-      <a:schemeClr val="dk2"/>
+      <a:schemeClr val="dk1"/>
     </dgm:linClrLst>
     <dgm:effectClrLst/>
     <dgm:txLinClrLst/>
@@ -806,12 +837,12 @@
   </dgm:styleLbl>
   <dgm:styleLbl name="dkBgShp">
     <dgm:fillClrLst meth="repeat">
-      <a:schemeClr val="dk2">
-        <a:shade val="80000"/>
+      <a:schemeClr val="accent5">
+        <a:shade val="90000"/>
       </a:schemeClr>
     </dgm:fillClrLst>
     <dgm:linClrLst meth="repeat">
-      <a:schemeClr val="dk2"/>
+      <a:schemeClr val="dk1"/>
     </dgm:linClrLst>
     <dgm:effectClrLst/>
     <dgm:txLinClrLst/>
@@ -822,13 +853,13 @@
   </dgm:styleLbl>
   <dgm:styleLbl name="trBgShp">
     <dgm:fillClrLst meth="repeat">
-      <a:schemeClr val="dk2">
+      <a:schemeClr val="accent5">
         <a:tint val="50000"/>
         <a:alpha val="40000"/>
       </a:schemeClr>
     </dgm:fillClrLst>
     <dgm:linClrLst meth="repeat">
-      <a:schemeClr val="dk2"/>
+      <a:schemeClr val="accent5"/>
     </dgm:linClrLst>
     <dgm:effectClrLst/>
     <dgm:txLinClrLst/>
@@ -839,12 +870,12 @@
   </dgm:styleLbl>
   <dgm:styleLbl name="fgShp">
     <dgm:fillClrLst meth="repeat">
-      <a:schemeClr val="dk2">
-        <a:tint val="60000"/>
+      <a:schemeClr val="accent5">
+        <a:tint val="40000"/>
       </a:schemeClr>
     </dgm:fillClrLst>
     <dgm:linClrLst meth="repeat">
-      <a:schemeClr val="lt2"/>
+      <a:schemeClr val="lt1"/>
     </dgm:linClrLst>
     <dgm:effectClrLst/>
     <dgm:txLinClrLst/>
@@ -855,7 +886,7 @@
   </dgm:styleLbl>
   <dgm:styleLbl name="revTx">
     <dgm:fillClrLst meth="repeat">
-      <a:schemeClr val="lt2">
+      <a:schemeClr val="lt1">
         <a:alpha val="0"/>
       </a:schemeClr>
     </dgm:fillClrLst>
@@ -1622,15 +1653,15 @@
 </file>
 
 <file path=ppt/diagrams/colors3.xml><?xml version="1.0" encoding="utf-8"?>
-<dgm:colorsDef xmlns:dgm="http://schemas.openxmlformats.org/drawingml/2006/diagram" xmlns:a="http://schemas.openxmlformats.org/drawingml/2006/main" uniqueId="urn:microsoft.com/office/officeart/2005/8/colors/colorful2">
+<dgm:colorsDef xmlns:dgm="http://schemas.openxmlformats.org/drawingml/2006/diagram" xmlns:a="http://schemas.openxmlformats.org/drawingml/2006/main" uniqueId="urn:microsoft.com/office/officeart/2005/8/colors/colorful5">
   <dgm:title val=""/>
   <dgm:desc val=""/>
   <dgm:catLst>
-    <dgm:cat type="colorful" pri="10200"/>
+    <dgm:cat type="colorful" pri="10500"/>
   </dgm:catLst>
   <dgm:styleLbl name="node0">
     <dgm:fillClrLst meth="repeat">
-      <a:schemeClr val="accent1"/>
+      <a:schemeClr val="accent4"/>
     </dgm:fillClrLst>
     <dgm:linClrLst meth="repeat">
       <a:schemeClr val="lt1"/>
@@ -1642,8 +1673,8 @@
   </dgm:styleLbl>
   <dgm:styleLbl name="node1">
     <dgm:fillClrLst>
-      <a:schemeClr val="accent2"/>
-      <a:schemeClr val="accent3"/>
+      <a:schemeClr val="accent5"/>
+      <a:schemeClr val="accent6"/>
     </dgm:fillClrLst>
     <dgm:linClrLst meth="repeat">
       <a:schemeClr val="lt1"/>
@@ -1655,12 +1686,12 @@
   </dgm:styleLbl>
   <dgm:styleLbl name="alignNode1">
     <dgm:fillClrLst>
-      <a:schemeClr val="accent2"/>
-      <a:schemeClr val="accent3"/>
+      <a:schemeClr val="accent5"/>
+      <a:schemeClr val="accent6"/>
     </dgm:fillClrLst>
     <dgm:linClrLst>
-      <a:schemeClr val="accent2"/>
-      <a:schemeClr val="accent3"/>
+      <a:schemeClr val="accent5"/>
+      <a:schemeClr val="accent6"/>
     </dgm:linClrLst>
     <dgm:effectClrLst/>
     <dgm:txLinClrLst/>
@@ -1669,8 +1700,8 @@
   </dgm:styleLbl>
   <dgm:styleLbl name="lnNode1">
     <dgm:fillClrLst>
-      <a:schemeClr val="accent2"/>
-      <a:schemeClr val="accent3"/>
+      <a:schemeClr val="accent5"/>
+      <a:schemeClr val="accent6"/>
     </dgm:fillClrLst>
     <dgm:linClrLst meth="repeat">
       <a:schemeClr val="lt1"/>
@@ -1682,10 +1713,10 @@
   </dgm:styleLbl>
   <dgm:styleLbl name="vennNode1">
     <dgm:fillClrLst>
-      <a:schemeClr val="accent2">
+      <a:schemeClr val="accent5">
         <a:alpha val="50000"/>
       </a:schemeClr>
-      <a:schemeClr val="accent3">
+      <a:schemeClr val="accent6">
         <a:alpha val="50000"/>
       </a:schemeClr>
     </dgm:fillClrLst>
@@ -1699,7 +1730,7 @@
   </dgm:styleLbl>
   <dgm:styleLbl name="node2">
     <dgm:fillClrLst>
-      <a:schemeClr val="accent3"/>
+      <a:schemeClr val="accent6"/>
     </dgm:fillClrLst>
     <dgm:linClrLst meth="repeat">
       <a:schemeClr val="lt1"/>
@@ -1711,7 +1742,7 @@
   </dgm:styleLbl>
   <dgm:styleLbl name="node3">
     <dgm:fillClrLst>
-      <a:schemeClr val="accent4"/>
+      <a:schemeClr val="accent1"/>
     </dgm:fillClrLst>
     <dgm:linClrLst meth="repeat">
       <a:schemeClr val="lt1"/>
@@ -1723,7 +1754,7 @@
   </dgm:styleLbl>
   <dgm:styleLbl name="node4">
     <dgm:fillClrLst>
-      <a:schemeClr val="accent5"/>
+      <a:schemeClr val="accent2"/>
     </dgm:fillClrLst>
     <dgm:linClrLst meth="repeat">
       <a:schemeClr val="lt1"/>
@@ -1735,10 +1766,10 @@
   </dgm:styleLbl>
   <dgm:styleLbl name="fgImgPlace1">
     <dgm:fillClrLst>
-      <a:schemeClr val="accent2">
+      <a:schemeClr val="accent5">
         <a:tint val="50000"/>
       </a:schemeClr>
-      <a:schemeClr val="accent3">
+      <a:schemeClr val="accent6">
         <a:tint val="50000"/>
       </a:schemeClr>
     </dgm:fillClrLst>
@@ -1754,10 +1785,10 @@
   </dgm:styleLbl>
   <dgm:styleLbl name="alignImgPlace1">
     <dgm:fillClrLst>
-      <a:schemeClr val="accent2">
+      <a:schemeClr val="accent5">
         <a:tint val="50000"/>
       </a:schemeClr>
-      <a:schemeClr val="accent3">
+      <a:schemeClr val="accent6">
         <a:tint val="20000"/>
       </a:schemeClr>
     </dgm:fillClrLst>
@@ -1773,10 +1804,10 @@
   </dgm:styleLbl>
   <dgm:styleLbl name="bgImgPlace1">
     <dgm:fillClrLst>
-      <a:schemeClr val="accent2">
+      <a:schemeClr val="accent5">
         <a:tint val="50000"/>
       </a:schemeClr>
-      <a:schemeClr val="accent3">
+      <a:schemeClr val="accent6">
         <a:tint val="20000"/>
       </a:schemeClr>
     </dgm:fillClrLst>
@@ -1792,8 +1823,8 @@
   </dgm:styleLbl>
   <dgm:styleLbl name="sibTrans2D1">
     <dgm:fillClrLst>
-      <a:schemeClr val="accent2"/>
-      <a:schemeClr val="accent3"/>
+      <a:schemeClr val="accent5"/>
+      <a:schemeClr val="accent6"/>
     </dgm:fillClrLst>
     <dgm:linClrLst meth="repeat">
       <a:schemeClr val="lt1"/>
@@ -1805,8 +1836,8 @@
   </dgm:styleLbl>
   <dgm:styleLbl name="fgSibTrans2D1">
     <dgm:fillClrLst>
-      <a:schemeClr val="accent2"/>
-      <a:schemeClr val="accent3"/>
+      <a:schemeClr val="accent5"/>
+      <a:schemeClr val="accent6"/>
     </dgm:fillClrLst>
     <dgm:linClrLst meth="repeat">
       <a:schemeClr val="lt1"/>
@@ -1820,8 +1851,8 @@
   </dgm:styleLbl>
   <dgm:styleLbl name="bgSibTrans2D1">
     <dgm:fillClrLst>
-      <a:schemeClr val="accent2"/>
-      <a:schemeClr val="accent3"/>
+      <a:schemeClr val="accent5"/>
+      <a:schemeClr val="accent6"/>
     </dgm:fillClrLst>
     <dgm:linClrLst meth="repeat">
       <a:schemeClr val="lt1"/>
@@ -1836,8 +1867,8 @@
   <dgm:styleLbl name="sibTrans1D1">
     <dgm:fillClrLst/>
     <dgm:linClrLst>
-      <a:schemeClr val="accent2"/>
-      <a:schemeClr val="accent3"/>
+      <a:schemeClr val="accent5"/>
+      <a:schemeClr val="accent6"/>
     </dgm:linClrLst>
     <dgm:effectClrLst/>
     <dgm:txLinClrLst/>
@@ -1848,10 +1879,10 @@
   </dgm:styleLbl>
   <dgm:styleLbl name="callout">
     <dgm:fillClrLst meth="repeat">
-      <a:schemeClr val="accent2"/>
+      <a:schemeClr val="accent5"/>
     </dgm:fillClrLst>
     <dgm:linClrLst meth="repeat">
-      <a:schemeClr val="accent2">
+      <a:schemeClr val="accent5">
         <a:tint val="50000"/>
       </a:schemeClr>
     </dgm:linClrLst>
@@ -1864,7 +1895,7 @@
   </dgm:styleLbl>
   <dgm:styleLbl name="asst0">
     <dgm:fillClrLst meth="repeat">
-      <a:schemeClr val="accent2"/>
+      <a:schemeClr val="accent5"/>
     </dgm:fillClrLst>
     <dgm:linClrLst meth="repeat">
       <a:schemeClr val="lt1">
@@ -1878,7 +1909,7 @@
   </dgm:styleLbl>
   <dgm:styleLbl name="asst1">
     <dgm:fillClrLst meth="repeat">
-      <a:schemeClr val="accent3"/>
+      <a:schemeClr val="accent6"/>
     </dgm:fillClrLst>
     <dgm:linClrLst meth="repeat">
       <a:schemeClr val="lt1">
@@ -1892,7 +1923,7 @@
   </dgm:styleLbl>
   <dgm:styleLbl name="asst2">
     <dgm:fillClrLst>
-      <a:schemeClr val="accent4"/>
+      <a:schemeClr val="accent1"/>
     </dgm:fillClrLst>
     <dgm:linClrLst meth="repeat">
       <a:schemeClr val="lt1"/>
@@ -1904,7 +1935,7 @@
   </dgm:styleLbl>
   <dgm:styleLbl name="asst3">
     <dgm:fillClrLst>
-      <a:schemeClr val="accent5"/>
+      <a:schemeClr val="accent2"/>
     </dgm:fillClrLst>
     <dgm:linClrLst meth="repeat">
       <a:schemeClr val="lt1"/>
@@ -1916,32 +1947,6 @@
   </dgm:styleLbl>
   <dgm:styleLbl name="asst4">
     <dgm:fillClrLst>
-      <a:schemeClr val="accent6"/>
-    </dgm:fillClrLst>
-    <dgm:linClrLst meth="repeat">
-      <a:schemeClr val="lt1"/>
-    </dgm:linClrLst>
-    <dgm:effectClrLst/>
-    <dgm:txLinClrLst/>
-    <dgm:txFillClrLst/>
-    <dgm:txEffectClrLst/>
-  </dgm:styleLbl>
-  <dgm:styleLbl name="parChTrans2D1">
-    <dgm:fillClrLst meth="repeat">
-      <a:schemeClr val="accent2"/>
-    </dgm:fillClrLst>
-    <dgm:linClrLst meth="repeat">
-      <a:schemeClr val="lt1"/>
-    </dgm:linClrLst>
-    <dgm:effectClrLst/>
-    <dgm:txLinClrLst/>
-    <dgm:txFillClrLst meth="repeat">
-      <a:schemeClr val="lt1"/>
-    </dgm:txFillClrLst>
-    <dgm:txEffectClrLst/>
-  </dgm:styleLbl>
-  <dgm:styleLbl name="parChTrans2D2">
-    <dgm:fillClrLst meth="repeat">
       <a:schemeClr val="accent3"/>
     </dgm:fillClrLst>
     <dgm:linClrLst meth="repeat">
@@ -1952,19 +1957,7 @@
     <dgm:txFillClrLst/>
     <dgm:txEffectClrLst/>
   </dgm:styleLbl>
-  <dgm:styleLbl name="parChTrans2D3">
-    <dgm:fillClrLst meth="repeat">
-      <a:schemeClr val="accent4"/>
-    </dgm:fillClrLst>
-    <dgm:linClrLst meth="repeat">
-      <a:schemeClr val="lt1"/>
-    </dgm:linClrLst>
-    <dgm:effectClrLst/>
-    <dgm:txLinClrLst/>
-    <dgm:txFillClrLst/>
-    <dgm:txEffectClrLst/>
-  </dgm:styleLbl>
-  <dgm:styleLbl name="parChTrans2D4">
+  <dgm:styleLbl name="parChTrans2D1">
     <dgm:fillClrLst meth="repeat">
       <a:schemeClr val="accent5"/>
     </dgm:fillClrLst>
@@ -1978,9 +1971,95 @@
     </dgm:txFillClrLst>
     <dgm:txEffectClrLst/>
   </dgm:styleLbl>
+  <dgm:styleLbl name="parChTrans2D2">
+    <dgm:fillClrLst meth="repeat">
+      <a:schemeClr val="accent6"/>
+    </dgm:fillClrLst>
+    <dgm:linClrLst meth="repeat">
+      <a:schemeClr val="lt1"/>
+    </dgm:linClrLst>
+    <dgm:effectClrLst/>
+    <dgm:txLinClrLst/>
+    <dgm:txFillClrLst/>
+    <dgm:txEffectClrLst/>
+  </dgm:styleLbl>
+  <dgm:styleLbl name="parChTrans2D3">
+    <dgm:fillClrLst meth="repeat">
+      <a:schemeClr val="accent6"/>
+    </dgm:fillClrLst>
+    <dgm:linClrLst meth="repeat">
+      <a:schemeClr val="lt1"/>
+    </dgm:linClrLst>
+    <dgm:effectClrLst/>
+    <dgm:txLinClrLst/>
+    <dgm:txFillClrLst/>
+    <dgm:txEffectClrLst/>
+  </dgm:styleLbl>
+  <dgm:styleLbl name="parChTrans2D4">
+    <dgm:fillClrLst meth="repeat">
+      <a:schemeClr val="accent1"/>
+    </dgm:fillClrLst>
+    <dgm:linClrLst meth="repeat">
+      <a:schemeClr val="lt1"/>
+    </dgm:linClrLst>
+    <dgm:effectClrLst/>
+    <dgm:txLinClrLst/>
+    <dgm:txFillClrLst meth="repeat">
+      <a:schemeClr val="lt1"/>
+    </dgm:txFillClrLst>
+    <dgm:txEffectClrLst/>
+  </dgm:styleLbl>
   <dgm:styleLbl name="parChTrans1D1">
     <dgm:fillClrLst meth="repeat">
-      <a:schemeClr val="accent2"/>
+      <a:schemeClr val="accent5"/>
+    </dgm:fillClrLst>
+    <dgm:linClrLst meth="repeat">
+      <a:schemeClr val="accent5"/>
+    </dgm:linClrLst>
+    <dgm:effectClrLst/>
+    <dgm:txLinClrLst/>
+    <dgm:txFillClrLst meth="repeat">
+      <a:schemeClr val="tx1"/>
+    </dgm:txFillClrLst>
+    <dgm:txEffectClrLst/>
+  </dgm:styleLbl>
+  <dgm:styleLbl name="parChTrans1D2">
+    <dgm:fillClrLst meth="repeat">
+      <a:schemeClr val="accent6">
+        <a:tint val="90000"/>
+      </a:schemeClr>
+    </dgm:fillClrLst>
+    <dgm:linClrLst meth="repeat">
+      <a:schemeClr val="accent6"/>
+    </dgm:linClrLst>
+    <dgm:effectClrLst/>
+    <dgm:txLinClrLst/>
+    <dgm:txFillClrLst meth="repeat">
+      <a:schemeClr val="tx1"/>
+    </dgm:txFillClrLst>
+    <dgm:txEffectClrLst/>
+  </dgm:styleLbl>
+  <dgm:styleLbl name="parChTrans1D3">
+    <dgm:fillClrLst meth="repeat">
+      <a:schemeClr val="accent6">
+        <a:tint val="70000"/>
+      </a:schemeClr>
+    </dgm:fillClrLst>
+    <dgm:linClrLst meth="repeat">
+      <a:schemeClr val="accent1"/>
+    </dgm:linClrLst>
+    <dgm:effectClrLst/>
+    <dgm:txLinClrLst/>
+    <dgm:txFillClrLst meth="repeat">
+      <a:schemeClr val="tx1"/>
+    </dgm:txFillClrLst>
+    <dgm:txEffectClrLst/>
+  </dgm:styleLbl>
+  <dgm:styleLbl name="parChTrans1D4">
+    <dgm:fillClrLst meth="repeat">
+      <a:schemeClr val="accent6">
+        <a:tint val="50000"/>
+      </a:schemeClr>
     </dgm:fillClrLst>
     <dgm:linClrLst meth="repeat">
       <a:schemeClr val="accent2"/>
@@ -1992,42 +2071,61 @@
     </dgm:txFillClrLst>
     <dgm:txEffectClrLst/>
   </dgm:styleLbl>
-  <dgm:styleLbl name="parChTrans1D2">
+  <dgm:styleLbl name="fgAcc1">
     <dgm:fillClrLst meth="repeat">
-      <a:schemeClr val="accent2">
-        <a:tint val="90000"/>
+      <a:schemeClr val="lt1">
+        <a:alpha val="90000"/>
       </a:schemeClr>
     </dgm:fillClrLst>
-    <dgm:linClrLst meth="repeat">
-      <a:schemeClr val="accent3"/>
+    <dgm:linClrLst>
+      <a:schemeClr val="accent5"/>
+      <a:schemeClr val="accent6"/>
     </dgm:linClrLst>
     <dgm:effectClrLst/>
     <dgm:txLinClrLst/>
     <dgm:txFillClrLst meth="repeat">
-      <a:schemeClr val="tx1"/>
+      <a:schemeClr val="dk1"/>
     </dgm:txFillClrLst>
     <dgm:txEffectClrLst/>
   </dgm:styleLbl>
-  <dgm:styleLbl name="parChTrans1D3">
+  <dgm:styleLbl name="conFgAcc1">
     <dgm:fillClrLst meth="repeat">
-      <a:schemeClr val="accent2">
-        <a:tint val="70000"/>
+      <a:schemeClr val="lt1">
+        <a:alpha val="90000"/>
       </a:schemeClr>
     </dgm:fillClrLst>
-    <dgm:linClrLst meth="repeat">
-      <a:schemeClr val="accent4"/>
+    <dgm:linClrLst>
+      <a:schemeClr val="accent5"/>
+      <a:schemeClr val="accent6"/>
     </dgm:linClrLst>
     <dgm:effectClrLst/>
     <dgm:txLinClrLst/>
     <dgm:txFillClrLst meth="repeat">
-      <a:schemeClr val="tx1"/>
+      <a:schemeClr val="dk1"/>
     </dgm:txFillClrLst>
     <dgm:txEffectClrLst/>
   </dgm:styleLbl>
-  <dgm:styleLbl name="parChTrans1D4">
+  <dgm:styleLbl name="alignAcc1">
     <dgm:fillClrLst meth="repeat">
-      <a:schemeClr val="accent2">
-        <a:tint val="50000"/>
+      <a:schemeClr val="lt1">
+        <a:alpha val="90000"/>
+      </a:schemeClr>
+    </dgm:fillClrLst>
+    <dgm:linClrLst>
+      <a:schemeClr val="accent5"/>
+      <a:schemeClr val="accent6"/>
+    </dgm:linClrLst>
+    <dgm:effectClrLst/>
+    <dgm:txLinClrLst/>
+    <dgm:txFillClrLst meth="repeat">
+      <a:schemeClr val="dk1"/>
+    </dgm:txFillClrLst>
+    <dgm:txEffectClrLst/>
+  </dgm:styleLbl>
+  <dgm:styleLbl name="trAlignAcc1">
+    <dgm:fillClrLst meth="repeat">
+      <a:schemeClr val="lt1">
+        <a:alpha val="40000"/>
       </a:schemeClr>
     </dgm:fillClrLst>
     <dgm:linClrLst meth="repeat">
@@ -2036,19 +2134,19 @@
     <dgm:effectClrLst/>
     <dgm:txLinClrLst/>
     <dgm:txFillClrLst meth="repeat">
-      <a:schemeClr val="tx1"/>
+      <a:schemeClr val="dk1"/>
     </dgm:txFillClrLst>
     <dgm:txEffectClrLst/>
   </dgm:styleLbl>
-  <dgm:styleLbl name="fgAcc1">
+  <dgm:styleLbl name="bgAcc1">
     <dgm:fillClrLst meth="repeat">
       <a:schemeClr val="lt1">
         <a:alpha val="90000"/>
       </a:schemeClr>
     </dgm:fillClrLst>
     <dgm:linClrLst>
-      <a:schemeClr val="accent2"/>
-      <a:schemeClr val="accent3"/>
+      <a:schemeClr val="accent5"/>
+      <a:schemeClr val="accent6"/>
     </dgm:linClrLst>
     <dgm:effectClrLst/>
     <dgm:txLinClrLst/>
@@ -2057,15 +2155,13 @@
     </dgm:txFillClrLst>
     <dgm:txEffectClrLst/>
   </dgm:styleLbl>
-  <dgm:styleLbl name="conFgAcc1">
+  <dgm:styleLbl name="solidFgAcc1">
     <dgm:fillClrLst meth="repeat">
-      <a:schemeClr val="lt1">
-        <a:alpha val="90000"/>
-      </a:schemeClr>
+      <a:schemeClr val="lt1"/>
     </dgm:fillClrLst>
     <dgm:linClrLst>
-      <a:schemeClr val="accent2"/>
-      <a:schemeClr val="accent3"/>
+      <a:schemeClr val="accent5"/>
+      <a:schemeClr val="accent6"/>
     </dgm:linClrLst>
     <dgm:effectClrLst/>
     <dgm:txLinClrLst/>
@@ -2074,15 +2170,13 @@
     </dgm:txFillClrLst>
     <dgm:txEffectClrLst/>
   </dgm:styleLbl>
-  <dgm:styleLbl name="alignAcc1">
+  <dgm:styleLbl name="solidAlignAcc1">
     <dgm:fillClrLst meth="repeat">
-      <a:schemeClr val="lt1">
-        <a:alpha val="90000"/>
-      </a:schemeClr>
+      <a:schemeClr val="lt1"/>
     </dgm:fillClrLst>
     <dgm:linClrLst>
-      <a:schemeClr val="accent2"/>
-      <a:schemeClr val="accent3"/>
+      <a:schemeClr val="accent5"/>
+      <a:schemeClr val="accent6"/>
     </dgm:linClrLst>
     <dgm:effectClrLst/>
     <dgm:txLinClrLst/>
@@ -2091,14 +2185,13 @@
     </dgm:txFillClrLst>
     <dgm:txEffectClrLst/>
   </dgm:styleLbl>
-  <dgm:styleLbl name="trAlignAcc1">
+  <dgm:styleLbl name="solidBgAcc1">
     <dgm:fillClrLst meth="repeat">
-      <a:schemeClr val="lt1">
-        <a:alpha val="40000"/>
-      </a:schemeClr>
+      <a:schemeClr val="lt1"/>
     </dgm:fillClrLst>
-    <dgm:linClrLst meth="repeat">
-      <a:schemeClr val="accent2"/>
+    <dgm:linClrLst>
+      <a:schemeClr val="accent5"/>
+      <a:schemeClr val="accent6"/>
     </dgm:linClrLst>
     <dgm:effectClrLst/>
     <dgm:txLinClrLst/>
@@ -2107,85 +2200,23 @@
     </dgm:txFillClrLst>
     <dgm:txEffectClrLst/>
   </dgm:styleLbl>
-  <dgm:styleLbl name="bgAcc1">
-    <dgm:fillClrLst meth="repeat">
-      <a:schemeClr val="lt1">
-        <a:alpha val="90000"/>
-      </a:schemeClr>
-    </dgm:fillClrLst>
-    <dgm:linClrLst>
-      <a:schemeClr val="accent2"/>
-      <a:schemeClr val="accent3"/>
-    </dgm:linClrLst>
-    <dgm:effectClrLst/>
-    <dgm:txLinClrLst/>
-    <dgm:txFillClrLst meth="repeat">
-      <a:schemeClr val="dk1"/>
-    </dgm:txFillClrLst>
-    <dgm:txEffectClrLst/>
-  </dgm:styleLbl>
-  <dgm:styleLbl name="solidFgAcc1">
-    <dgm:fillClrLst meth="repeat">
-      <a:schemeClr val="lt1"/>
-    </dgm:fillClrLst>
-    <dgm:linClrLst>
-      <a:schemeClr val="accent2"/>
-      <a:schemeClr val="accent3"/>
-    </dgm:linClrLst>
-    <dgm:effectClrLst/>
-    <dgm:txLinClrLst/>
-    <dgm:txFillClrLst meth="repeat">
-      <a:schemeClr val="dk1"/>
-    </dgm:txFillClrLst>
-    <dgm:txEffectClrLst/>
-  </dgm:styleLbl>
-  <dgm:styleLbl name="solidAlignAcc1">
-    <dgm:fillClrLst meth="repeat">
-      <a:schemeClr val="lt1"/>
-    </dgm:fillClrLst>
-    <dgm:linClrLst>
-      <a:schemeClr val="accent2"/>
-      <a:schemeClr val="accent3"/>
-    </dgm:linClrLst>
-    <dgm:effectClrLst/>
-    <dgm:txLinClrLst/>
-    <dgm:txFillClrLst meth="repeat">
-      <a:schemeClr val="dk1"/>
-    </dgm:txFillClrLst>
-    <dgm:txEffectClrLst/>
-  </dgm:styleLbl>
-  <dgm:styleLbl name="solidBgAcc1">
-    <dgm:fillClrLst meth="repeat">
-      <a:schemeClr val="lt1"/>
-    </dgm:fillClrLst>
-    <dgm:linClrLst>
-      <a:schemeClr val="accent2"/>
-      <a:schemeClr val="accent3"/>
-    </dgm:linClrLst>
-    <dgm:effectClrLst/>
-    <dgm:txLinClrLst/>
-    <dgm:txFillClrLst meth="repeat">
-      <a:schemeClr val="dk1"/>
-    </dgm:txFillClrLst>
-    <dgm:txEffectClrLst/>
-  </dgm:styleLbl>
   <dgm:styleLbl name="fgAccFollowNode1">
     <dgm:fillClrLst>
-      <a:schemeClr val="accent2">
+      <a:schemeClr val="accent5">
         <a:tint val="40000"/>
         <a:alpha val="90000"/>
       </a:schemeClr>
-      <a:schemeClr val="accent3">
+      <a:schemeClr val="accent6">
         <a:tint val="40000"/>
         <a:alpha val="90000"/>
       </a:schemeClr>
     </dgm:fillClrLst>
     <dgm:linClrLst>
-      <a:schemeClr val="accent2">
+      <a:schemeClr val="accent5">
         <a:tint val="40000"/>
         <a:alpha val="90000"/>
       </a:schemeClr>
-      <a:schemeClr val="accent3">
+      <a:schemeClr val="accent5">
         <a:tint val="40000"/>
         <a:alpha val="90000"/>
       </a:schemeClr>
@@ -2199,21 +2230,21 @@
   </dgm:styleLbl>
   <dgm:styleLbl name="alignAccFollowNode1">
     <dgm:fillClrLst>
-      <a:schemeClr val="accent2">
+      <a:schemeClr val="accent5">
         <a:tint val="40000"/>
         <a:alpha val="90000"/>
       </a:schemeClr>
-      <a:schemeClr val="accent3">
+      <a:schemeClr val="accent6">
         <a:tint val="40000"/>
         <a:alpha val="90000"/>
       </a:schemeClr>
     </dgm:fillClrLst>
     <dgm:linClrLst>
-      <a:schemeClr val="accent2">
+      <a:schemeClr val="accent5">
         <a:tint val="40000"/>
         <a:alpha val="90000"/>
       </a:schemeClr>
-      <a:schemeClr val="accent3">
+      <a:schemeClr val="accent6">
         <a:tint val="40000"/>
         <a:alpha val="90000"/>
       </a:schemeClr>
@@ -2227,21 +2258,21 @@
   </dgm:styleLbl>
   <dgm:styleLbl name="bgAccFollowNode1">
     <dgm:fillClrLst>
-      <a:schemeClr val="accent2">
+      <a:schemeClr val="accent5">
         <a:tint val="40000"/>
         <a:alpha val="90000"/>
       </a:schemeClr>
-      <a:schemeClr val="accent3">
+      <a:schemeClr val="accent6">
         <a:tint val="40000"/>
         <a:alpha val="90000"/>
       </a:schemeClr>
     </dgm:fillClrLst>
     <dgm:linClrLst>
-      <a:schemeClr val="accent2">
+      <a:schemeClr val="accent5">
         <a:tint val="40000"/>
         <a:alpha val="90000"/>
       </a:schemeClr>
-      <a:schemeClr val="accent3">
+      <a:schemeClr val="accent6">
         <a:tint val="40000"/>
         <a:alpha val="90000"/>
       </a:schemeClr>
@@ -2254,6 +2285,38 @@
     <dgm:txEffectClrLst/>
   </dgm:styleLbl>
   <dgm:styleLbl name="fgAcc0">
+    <dgm:fillClrLst meth="repeat">
+      <a:schemeClr val="lt1">
+        <a:alpha val="90000"/>
+      </a:schemeClr>
+    </dgm:fillClrLst>
+    <dgm:linClrLst>
+      <a:schemeClr val="accent4"/>
+    </dgm:linClrLst>
+    <dgm:effectClrLst/>
+    <dgm:txLinClrLst/>
+    <dgm:txFillClrLst meth="repeat">
+      <a:schemeClr val="dk1"/>
+    </dgm:txFillClrLst>
+    <dgm:txEffectClrLst/>
+  </dgm:styleLbl>
+  <dgm:styleLbl name="fgAcc2">
+    <dgm:fillClrLst meth="repeat">
+      <a:schemeClr val="lt1">
+        <a:alpha val="90000"/>
+      </a:schemeClr>
+    </dgm:fillClrLst>
+    <dgm:linClrLst>
+      <a:schemeClr val="accent6"/>
+    </dgm:linClrLst>
+    <dgm:effectClrLst/>
+    <dgm:txLinClrLst/>
+    <dgm:txFillClrLst meth="repeat">
+      <a:schemeClr val="dk1"/>
+    </dgm:txFillClrLst>
+    <dgm:txEffectClrLst/>
+  </dgm:styleLbl>
+  <dgm:styleLbl name="fgAcc3">
     <dgm:fillClrLst meth="repeat">
       <a:schemeClr val="lt1">
         <a:alpha val="90000"/>
@@ -2269,14 +2332,14 @@
     </dgm:txFillClrLst>
     <dgm:txEffectClrLst/>
   </dgm:styleLbl>
-  <dgm:styleLbl name="fgAcc2">
+  <dgm:styleLbl name="fgAcc4">
     <dgm:fillClrLst meth="repeat">
       <a:schemeClr val="lt1">
         <a:alpha val="90000"/>
       </a:schemeClr>
     </dgm:fillClrLst>
     <dgm:linClrLst>
-      <a:schemeClr val="accent3"/>
+      <a:schemeClr val="accent2"/>
     </dgm:linClrLst>
     <dgm:effectClrLst/>
     <dgm:txLinClrLst/>
@@ -2285,41 +2348,9 @@
     </dgm:txFillClrLst>
     <dgm:txEffectClrLst/>
   </dgm:styleLbl>
-  <dgm:styleLbl name="fgAcc3">
-    <dgm:fillClrLst meth="repeat">
-      <a:schemeClr val="lt1">
-        <a:alpha val="90000"/>
-      </a:schemeClr>
-    </dgm:fillClrLst>
-    <dgm:linClrLst>
-      <a:schemeClr val="accent4"/>
-    </dgm:linClrLst>
-    <dgm:effectClrLst/>
-    <dgm:txLinClrLst/>
-    <dgm:txFillClrLst meth="repeat">
-      <a:schemeClr val="dk1"/>
-    </dgm:txFillClrLst>
-    <dgm:txEffectClrLst/>
-  </dgm:styleLbl>
-  <dgm:styleLbl name="fgAcc4">
-    <dgm:fillClrLst meth="repeat">
-      <a:schemeClr val="lt1">
-        <a:alpha val="90000"/>
-      </a:schemeClr>
-    </dgm:fillClrLst>
-    <dgm:linClrLst>
-      <a:schemeClr val="accent5"/>
-    </dgm:linClrLst>
-    <dgm:effectClrLst/>
-    <dgm:txLinClrLst/>
-    <dgm:txFillClrLst meth="repeat">
-      <a:schemeClr val="dk1"/>
-    </dgm:txFillClrLst>
-    <dgm:txEffectClrLst/>
-  </dgm:styleLbl>
   <dgm:styleLbl name="bgShp">
     <dgm:fillClrLst meth="repeat">
-      <a:schemeClr val="accent2">
+      <a:schemeClr val="accent5">
         <a:tint val="40000"/>
       </a:schemeClr>
     </dgm:fillClrLst>
@@ -2335,7 +2366,7 @@
   </dgm:styleLbl>
   <dgm:styleLbl name="dkBgShp">
     <dgm:fillClrLst meth="repeat">
-      <a:schemeClr val="accent2">
+      <a:schemeClr val="accent5">
         <a:shade val="90000"/>
       </a:schemeClr>
     </dgm:fillClrLst>
@@ -2351,13 +2382,13 @@
   </dgm:styleLbl>
   <dgm:styleLbl name="trBgShp">
     <dgm:fillClrLst meth="repeat">
-      <a:schemeClr val="accent2">
+      <a:schemeClr val="accent5">
         <a:tint val="50000"/>
         <a:alpha val="40000"/>
       </a:schemeClr>
     </dgm:fillClrLst>
     <dgm:linClrLst meth="repeat">
-      <a:schemeClr val="accent2"/>
+      <a:schemeClr val="accent5"/>
     </dgm:linClrLst>
     <dgm:effectClrLst/>
     <dgm:txLinClrLst/>
@@ -2368,7 +2399,7 @@
   </dgm:styleLbl>
   <dgm:styleLbl name="fgShp">
     <dgm:fillClrLst meth="repeat">
-      <a:schemeClr val="accent2">
+      <a:schemeClr val="accent5">
         <a:tint val="40000"/>
       </a:schemeClr>
     </dgm:fillClrLst>
@@ -2407,7 +2438,7 @@
 <dgm:dataModel xmlns:dgm="http://schemas.openxmlformats.org/drawingml/2006/diagram" xmlns:a="http://schemas.openxmlformats.org/drawingml/2006/main">
   <dgm:ptLst>
     <dgm:pt modelId="{24E0129C-5D95-3C47-9B06-04043CA55473}" type="doc">
-      <dgm:prSet loTypeId="urn:microsoft.com/office/officeart/2016/7/layout/RepeatingBendingProcessNew" loCatId="process" qsTypeId="urn:microsoft.com/office/officeart/2005/8/quickstyle/simple1" qsCatId="simple" csTypeId="urn:microsoft.com/office/officeart/2005/8/colors/accent0_3" csCatId="mainScheme" phldr="1"/>
+      <dgm:prSet loTypeId="urn:microsoft.com/office/officeart/2016/7/layout/RepeatingBendingProcessNew" loCatId="process" qsTypeId="urn:microsoft.com/office/officeart/2005/8/quickstyle/simple1" qsCatId="simple" csTypeId="urn:microsoft.com/office/officeart/2005/8/colors/colorful5" csCatId="colorful" phldr="1"/>
       <dgm:spPr/>
       <dgm:t>
         <a:bodyPr/>
@@ -2444,7 +2475,15 @@
     </dgm:pt>
     <dgm:pt modelId="{EA1065AE-525E-244C-952A-B85BD6D72DEB}" type="sibTrans" cxnId="{6872C27D-205A-C94F-85EF-3DAD0CFA0E38}">
       <dgm:prSet/>
-      <dgm:spPr/>
+      <dgm:spPr>
+        <a:ln w="28575">
+          <a:solidFill>
+            <a:schemeClr val="bg1">
+              <a:lumMod val="50000"/>
+            </a:schemeClr>
+          </a:solidFill>
+        </a:ln>
+      </dgm:spPr>
       <dgm:t>
         <a:bodyPr/>
         <a:lstStyle/>
@@ -2480,7 +2519,15 @@
     </dgm:pt>
     <dgm:pt modelId="{D8A76DA0-028A-4347-B367-C963157D82D0}" type="sibTrans" cxnId="{34137092-4DAF-5341-94BF-9A26F5C586FD}">
       <dgm:prSet/>
-      <dgm:spPr/>
+      <dgm:spPr>
+        <a:ln w="28575">
+          <a:solidFill>
+            <a:schemeClr val="bg1">
+              <a:lumMod val="50000"/>
+            </a:schemeClr>
+          </a:solidFill>
+        </a:ln>
+      </dgm:spPr>
       <dgm:t>
         <a:bodyPr/>
         <a:lstStyle/>
@@ -2516,7 +2563,15 @@
     </dgm:pt>
     <dgm:pt modelId="{62047629-E52A-284B-83D2-588FF7B8B97A}" type="sibTrans" cxnId="{FAA2D410-C836-2348-ADA3-ACD259035B67}">
       <dgm:prSet/>
-      <dgm:spPr/>
+      <dgm:spPr>
+        <a:ln w="28575">
+          <a:solidFill>
+            <a:schemeClr val="bg1">
+              <a:lumMod val="50000"/>
+            </a:schemeClr>
+          </a:solidFill>
+        </a:ln>
+      </dgm:spPr>
       <dgm:t>
         <a:bodyPr/>
         <a:lstStyle/>
@@ -2552,7 +2607,15 @@
     </dgm:pt>
     <dgm:pt modelId="{805BC26B-79AE-C54B-A389-ADD6762194EB}" type="sibTrans" cxnId="{B21E2A74-399E-1B42-AC50-352623C53375}">
       <dgm:prSet/>
-      <dgm:spPr/>
+      <dgm:spPr>
+        <a:ln w="28575">
+          <a:solidFill>
+            <a:schemeClr val="bg1">
+              <a:lumMod val="50000"/>
+            </a:schemeClr>
+          </a:solidFill>
+        </a:ln>
+      </dgm:spPr>
       <dgm:t>
         <a:bodyPr/>
         <a:lstStyle/>
@@ -2624,7 +2687,15 @@
     </dgm:pt>
     <dgm:pt modelId="{7EF71C4A-833D-554E-A5A7-CA5AC68C8857}" type="sibTrans" cxnId="{8EE06894-002B-624F-8D60-4A3CFED7A3D5}">
       <dgm:prSet/>
-      <dgm:spPr/>
+      <dgm:spPr>
+        <a:ln w="28575">
+          <a:solidFill>
+            <a:schemeClr val="bg1">
+              <a:lumMod val="50000"/>
+            </a:schemeClr>
+          </a:solidFill>
+        </a:ln>
+      </dgm:spPr>
       <dgm:t>
         <a:bodyPr/>
         <a:lstStyle/>
@@ -2633,7 +2704,7 @@
         </a:p>
       </dgm:t>
     </dgm:pt>
-    <dgm:pt modelId="{A7CA9436-FF99-924B-98B4-5149CD2ED020}" type="pres">
+    <dgm:pt modelId="{5362013A-1C80-5349-A382-28D3FF1DE6F9}" type="pres">
       <dgm:prSet presAssocID="{24E0129C-5D95-3C47-9B06-04043CA55473}" presName="Name0" presStyleCnt="0">
         <dgm:presLayoutVars>
           <dgm:dir/>
@@ -2642,7 +2713,7 @@
       </dgm:prSet>
       <dgm:spPr/>
     </dgm:pt>
-    <dgm:pt modelId="{108596E6-F710-7B4B-85F0-CA30429E116E}" type="pres">
+    <dgm:pt modelId="{9BD49620-195D-354B-8EBF-55890738D1D8}" type="pres">
       <dgm:prSet presAssocID="{763B299A-A3A6-C74C-AF8C-5B276FF55B92}" presName="node" presStyleLbl="node1" presStyleIdx="0" presStyleCnt="6">
         <dgm:presLayoutVars>
           <dgm:bulletEnabled val="1"/>
@@ -2650,15 +2721,15 @@
       </dgm:prSet>
       <dgm:spPr/>
     </dgm:pt>
-    <dgm:pt modelId="{C9267905-6F54-F04E-AF2E-CB2975AB340E}" type="pres">
+    <dgm:pt modelId="{5FCFDDC5-0114-784B-BAF4-F20CF49B4B2D}" type="pres">
       <dgm:prSet presAssocID="{EA1065AE-525E-244C-952A-B85BD6D72DEB}" presName="sibTrans" presStyleLbl="sibTrans1D1" presStyleIdx="0" presStyleCnt="5"/>
       <dgm:spPr/>
     </dgm:pt>
-    <dgm:pt modelId="{A5C68796-E2AE-ED41-8921-B9B291DC977E}" type="pres">
+    <dgm:pt modelId="{47B17261-E363-C24C-8927-CB00ECDC5AC8}" type="pres">
       <dgm:prSet presAssocID="{EA1065AE-525E-244C-952A-B85BD6D72DEB}" presName="connectorText" presStyleLbl="sibTrans1D1" presStyleIdx="0" presStyleCnt="5"/>
       <dgm:spPr/>
     </dgm:pt>
-    <dgm:pt modelId="{1F7BF467-CAA5-E244-A8B0-AE82EC8829C4}" type="pres">
+    <dgm:pt modelId="{58A84B51-DEE9-A247-90C0-3C128E280237}" type="pres">
       <dgm:prSet presAssocID="{9E0B73BB-25E6-244C-88D2-C78394E258A0}" presName="node" presStyleLbl="node1" presStyleIdx="1" presStyleCnt="6">
         <dgm:presLayoutVars>
           <dgm:bulletEnabled val="1"/>
@@ -2666,15 +2737,15 @@
       </dgm:prSet>
       <dgm:spPr/>
     </dgm:pt>
-    <dgm:pt modelId="{BE2EDDB4-F6EC-9546-A6CC-CFA9F05B7981}" type="pres">
+    <dgm:pt modelId="{44CFAD02-6EDE-4549-AE12-10AE7C41EEA0}" type="pres">
       <dgm:prSet presAssocID="{D8A76DA0-028A-4347-B367-C963157D82D0}" presName="sibTrans" presStyleLbl="sibTrans1D1" presStyleIdx="1" presStyleCnt="5"/>
       <dgm:spPr/>
     </dgm:pt>
-    <dgm:pt modelId="{C2C09F19-9945-2C4F-8F80-28442B46E447}" type="pres">
+    <dgm:pt modelId="{A827C844-D2A6-ED49-976C-DE29AFA31FB3}" type="pres">
       <dgm:prSet presAssocID="{D8A76DA0-028A-4347-B367-C963157D82D0}" presName="connectorText" presStyleLbl="sibTrans1D1" presStyleIdx="1" presStyleCnt="5"/>
       <dgm:spPr/>
     </dgm:pt>
-    <dgm:pt modelId="{6C013801-D3F7-0749-9984-226755DCA8DD}" type="pres">
+    <dgm:pt modelId="{A21DA58C-02AC-354E-AB72-7026516EB3F8}" type="pres">
       <dgm:prSet presAssocID="{95E11F2F-0E57-104E-98C9-2CD537C7637E}" presName="node" presStyleLbl="node1" presStyleIdx="2" presStyleCnt="6">
         <dgm:presLayoutVars>
           <dgm:bulletEnabled val="1"/>
@@ -2682,15 +2753,15 @@
       </dgm:prSet>
       <dgm:spPr/>
     </dgm:pt>
-    <dgm:pt modelId="{02689391-208A-474B-AD01-1382708DE939}" type="pres">
+    <dgm:pt modelId="{CD01FFEF-8A91-8349-B927-DE1FF2455BAE}" type="pres">
       <dgm:prSet presAssocID="{7EF71C4A-833D-554E-A5A7-CA5AC68C8857}" presName="sibTrans" presStyleLbl="sibTrans1D1" presStyleIdx="2" presStyleCnt="5"/>
       <dgm:spPr/>
     </dgm:pt>
-    <dgm:pt modelId="{6B1BA5BA-A325-3E4A-AF27-F65F2589830E}" type="pres">
+    <dgm:pt modelId="{D1DC987B-D3BE-2346-A948-32CDA9201EE2}" type="pres">
       <dgm:prSet presAssocID="{7EF71C4A-833D-554E-A5A7-CA5AC68C8857}" presName="connectorText" presStyleLbl="sibTrans1D1" presStyleIdx="2" presStyleCnt="5"/>
       <dgm:spPr/>
     </dgm:pt>
-    <dgm:pt modelId="{539A949E-A62A-CF43-B4A0-934E250B590B}" type="pres">
+    <dgm:pt modelId="{BEE0466D-831D-DB42-AB95-EFE9D78AFF92}" type="pres">
       <dgm:prSet presAssocID="{AB00244D-9919-D542-8AA4-999F3F2E3475}" presName="node" presStyleLbl="node1" presStyleIdx="3" presStyleCnt="6">
         <dgm:presLayoutVars>
           <dgm:bulletEnabled val="1"/>
@@ -2698,15 +2769,15 @@
       </dgm:prSet>
       <dgm:spPr/>
     </dgm:pt>
-    <dgm:pt modelId="{07224510-582E-F943-AB43-BDABA27328DD}" type="pres">
+    <dgm:pt modelId="{0B92585E-66D8-6D4C-B6E3-80B4C4F49202}" type="pres">
       <dgm:prSet presAssocID="{62047629-E52A-284B-83D2-588FF7B8B97A}" presName="sibTrans" presStyleLbl="sibTrans1D1" presStyleIdx="3" presStyleCnt="5"/>
       <dgm:spPr/>
     </dgm:pt>
-    <dgm:pt modelId="{E8E7055B-8659-9F42-90CF-CB71AC69C516}" type="pres">
+    <dgm:pt modelId="{31189D5B-EB97-CA4F-83FF-AC9DBDBE2A08}" type="pres">
       <dgm:prSet presAssocID="{62047629-E52A-284B-83D2-588FF7B8B97A}" presName="connectorText" presStyleLbl="sibTrans1D1" presStyleIdx="3" presStyleCnt="5"/>
       <dgm:spPr/>
     </dgm:pt>
-    <dgm:pt modelId="{B4EEB252-A842-1C47-9152-D1F1DFEB181A}" type="pres">
+    <dgm:pt modelId="{7FA658A9-219B-5A45-975A-CE4A3A526FC3}" type="pres">
       <dgm:prSet presAssocID="{BF56499D-67D8-9245-8F21-5369813FC338}" presName="node" presStyleLbl="node1" presStyleIdx="4" presStyleCnt="6">
         <dgm:presLayoutVars>
           <dgm:bulletEnabled val="1"/>
@@ -2714,15 +2785,15 @@
       </dgm:prSet>
       <dgm:spPr/>
     </dgm:pt>
-    <dgm:pt modelId="{99E8F455-F226-D648-86B4-8E481BAEDE50}" type="pres">
+    <dgm:pt modelId="{DFA21956-7D41-D940-88B7-DDDF0F1FB40E}" type="pres">
       <dgm:prSet presAssocID="{805BC26B-79AE-C54B-A389-ADD6762194EB}" presName="sibTrans" presStyleLbl="sibTrans1D1" presStyleIdx="4" presStyleCnt="5"/>
       <dgm:spPr/>
     </dgm:pt>
-    <dgm:pt modelId="{BAB59A33-D8A0-0645-BAE6-FE48FD8DD1D3}" type="pres">
+    <dgm:pt modelId="{93C4D4CD-D18F-734C-936B-D645989ED30C}" type="pres">
       <dgm:prSet presAssocID="{805BC26B-79AE-C54B-A389-ADD6762194EB}" presName="connectorText" presStyleLbl="sibTrans1D1" presStyleIdx="4" presStyleCnt="5"/>
       <dgm:spPr/>
     </dgm:pt>
-    <dgm:pt modelId="{8680362E-92B7-7F4B-B1FA-34C7F423AAF0}" type="pres">
+    <dgm:pt modelId="{841BFFC4-5AE5-984E-967E-8B0611A8E7D8}" type="pres">
       <dgm:prSet presAssocID="{C03BADCA-9FD8-8C4F-804F-4DA3C9FF831C}" presName="node" presStyleLbl="node1" presStyleIdx="5" presStyleCnt="6">
         <dgm:presLayoutVars>
           <dgm:bulletEnabled val="1"/>
@@ -2732,45 +2803,45 @@
     </dgm:pt>
   </dgm:ptLst>
   <dgm:cxnLst>
-    <dgm:cxn modelId="{8938B90D-3086-D74F-98F2-15EA13F2FA35}" type="presOf" srcId="{7EF71C4A-833D-554E-A5A7-CA5AC68C8857}" destId="{6B1BA5BA-A325-3E4A-AF27-F65F2589830E}" srcOrd="1" destOrd="0" presId="urn:microsoft.com/office/officeart/2016/7/layout/RepeatingBendingProcessNew"/>
+    <dgm:cxn modelId="{A950200E-FD3D-C046-B6B1-3AFB6888743F}" type="presOf" srcId="{95E11F2F-0E57-104E-98C9-2CD537C7637E}" destId="{A21DA58C-02AC-354E-AB72-7026516EB3F8}" srcOrd="0" destOrd="0" presId="urn:microsoft.com/office/officeart/2016/7/layout/RepeatingBendingProcessNew"/>
+    <dgm:cxn modelId="{A9F52F0E-21AA-3148-BF5C-690B0DBE39A2}" type="presOf" srcId="{9E0B73BB-25E6-244C-88D2-C78394E258A0}" destId="{58A84B51-DEE9-A247-90C0-3C128E280237}" srcOrd="0" destOrd="0" presId="urn:microsoft.com/office/officeart/2016/7/layout/RepeatingBendingProcessNew"/>
     <dgm:cxn modelId="{FAA2D410-C836-2348-ADA3-ACD259035B67}" srcId="{24E0129C-5D95-3C47-9B06-04043CA55473}" destId="{AB00244D-9919-D542-8AA4-999F3F2E3475}" srcOrd="3" destOrd="0" parTransId="{EF962EC7-8BC5-A942-AFBB-7CD76626A40C}" sibTransId="{62047629-E52A-284B-83D2-588FF7B8B97A}"/>
-    <dgm:cxn modelId="{435B0221-0B4E-7B45-A508-4B6C16D72E35}" type="presOf" srcId="{763B299A-A3A6-C74C-AF8C-5B276FF55B92}" destId="{108596E6-F710-7B4B-85F0-CA30429E116E}" srcOrd="0" destOrd="0" presId="urn:microsoft.com/office/officeart/2016/7/layout/RepeatingBendingProcessNew"/>
-    <dgm:cxn modelId="{09390027-7FAE-EC4A-BC40-4C0F5EFBC7D4}" type="presOf" srcId="{EA1065AE-525E-244C-952A-B85BD6D72DEB}" destId="{C9267905-6F54-F04E-AF2E-CB2975AB340E}" srcOrd="0" destOrd="0" presId="urn:microsoft.com/office/officeart/2016/7/layout/RepeatingBendingProcessNew"/>
-    <dgm:cxn modelId="{2D734D2A-A79A-3E4C-AC9B-4264AB72DC23}" type="presOf" srcId="{D8A76DA0-028A-4347-B367-C963157D82D0}" destId="{BE2EDDB4-F6EC-9546-A6CC-CFA9F05B7981}" srcOrd="0" destOrd="0" presId="urn:microsoft.com/office/officeart/2016/7/layout/RepeatingBendingProcessNew"/>
-    <dgm:cxn modelId="{EE540D42-B2C9-C849-8AE8-0234636335E3}" type="presOf" srcId="{805BC26B-79AE-C54B-A389-ADD6762194EB}" destId="{99E8F455-F226-D648-86B4-8E481BAEDE50}" srcOrd="0" destOrd="0" presId="urn:microsoft.com/office/officeart/2016/7/layout/RepeatingBendingProcessNew"/>
-    <dgm:cxn modelId="{2FFA2444-D643-E845-835F-3647295CB2B8}" type="presOf" srcId="{95E11F2F-0E57-104E-98C9-2CD537C7637E}" destId="{6C013801-D3F7-0749-9984-226755DCA8DD}" srcOrd="0" destOrd="0" presId="urn:microsoft.com/office/officeart/2016/7/layout/RepeatingBendingProcessNew"/>
-    <dgm:cxn modelId="{1A6E4D46-E83F-1E49-92E7-26157E996999}" type="presOf" srcId="{62047629-E52A-284B-83D2-588FF7B8B97A}" destId="{E8E7055B-8659-9F42-90CF-CB71AC69C516}" srcOrd="1" destOrd="0" presId="urn:microsoft.com/office/officeart/2016/7/layout/RepeatingBendingProcessNew"/>
-    <dgm:cxn modelId="{3C2D415F-B625-3E40-A1BE-9643D0E05E33}" type="presOf" srcId="{62047629-E52A-284B-83D2-588FF7B8B97A}" destId="{07224510-582E-F943-AB43-BDABA27328DD}" srcOrd="0" destOrd="0" presId="urn:microsoft.com/office/officeart/2016/7/layout/RepeatingBendingProcessNew"/>
-    <dgm:cxn modelId="{A892F563-F7EB-F34D-96E4-49AE32743D25}" type="presOf" srcId="{D8A76DA0-028A-4347-B367-C963157D82D0}" destId="{C2C09F19-9945-2C4F-8F80-28442B46E447}" srcOrd="1" destOrd="0" presId="urn:microsoft.com/office/officeart/2016/7/layout/RepeatingBendingProcessNew"/>
-    <dgm:cxn modelId="{057E2766-CAE9-654F-8CC0-03EBFFFF7A8D}" type="presOf" srcId="{24E0129C-5D95-3C47-9B06-04043CA55473}" destId="{A7CA9436-FF99-924B-98B4-5149CD2ED020}" srcOrd="0" destOrd="0" presId="urn:microsoft.com/office/officeart/2016/7/layout/RepeatingBendingProcessNew"/>
+    <dgm:cxn modelId="{DD8C7F25-920C-1045-9A6D-FA6627A7D822}" type="presOf" srcId="{7EF71C4A-833D-554E-A5A7-CA5AC68C8857}" destId="{CD01FFEF-8A91-8349-B927-DE1FF2455BAE}" srcOrd="0" destOrd="0" presId="urn:microsoft.com/office/officeart/2016/7/layout/RepeatingBendingProcessNew"/>
+    <dgm:cxn modelId="{7332C731-74A0-D443-A55C-81B319BEE4AF}" type="presOf" srcId="{62047629-E52A-284B-83D2-588FF7B8B97A}" destId="{0B92585E-66D8-6D4C-B6E3-80B4C4F49202}" srcOrd="0" destOrd="0" presId="urn:microsoft.com/office/officeart/2016/7/layout/RepeatingBendingProcessNew"/>
+    <dgm:cxn modelId="{7671D74B-778D-8648-9F06-514102CA615A}" type="presOf" srcId="{EA1065AE-525E-244C-952A-B85BD6D72DEB}" destId="{47B17261-E363-C24C-8927-CB00ECDC5AC8}" srcOrd="1" destOrd="0" presId="urn:microsoft.com/office/officeart/2016/7/layout/RepeatingBendingProcessNew"/>
+    <dgm:cxn modelId="{17126450-626E-B945-BAF3-9DA9671A4BB2}" type="presOf" srcId="{AB00244D-9919-D542-8AA4-999F3F2E3475}" destId="{BEE0466D-831D-DB42-AB95-EFE9D78AFF92}" srcOrd="0" destOrd="0" presId="urn:microsoft.com/office/officeart/2016/7/layout/RepeatingBendingProcessNew"/>
+    <dgm:cxn modelId="{125B5B5B-B3ED-8545-BBED-DA7DE563EC9D}" type="presOf" srcId="{7EF71C4A-833D-554E-A5A7-CA5AC68C8857}" destId="{D1DC987B-D3BE-2346-A948-32CDA9201EE2}" srcOrd="1" destOrd="0" presId="urn:microsoft.com/office/officeart/2016/7/layout/RepeatingBendingProcessNew"/>
+    <dgm:cxn modelId="{FF7B1C67-0BEB-A74E-94F6-6659255D823E}" type="presOf" srcId="{763B299A-A3A6-C74C-AF8C-5B276FF55B92}" destId="{9BD49620-195D-354B-8EBF-55890738D1D8}" srcOrd="0" destOrd="0" presId="urn:microsoft.com/office/officeart/2016/7/layout/RepeatingBendingProcessNew"/>
     <dgm:cxn modelId="{B21E2A74-399E-1B42-AC50-352623C53375}" srcId="{24E0129C-5D95-3C47-9B06-04043CA55473}" destId="{BF56499D-67D8-9245-8F21-5369813FC338}" srcOrd="4" destOrd="0" parTransId="{830F276B-D9D6-7C44-9266-7F95A33DF122}" sibTransId="{805BC26B-79AE-C54B-A389-ADD6762194EB}"/>
+    <dgm:cxn modelId="{9FC76274-8315-E94C-97A6-EA495412BAD4}" type="presOf" srcId="{805BC26B-79AE-C54B-A389-ADD6762194EB}" destId="{93C4D4CD-D18F-734C-936B-D645989ED30C}" srcOrd="1" destOrd="0" presId="urn:microsoft.com/office/officeart/2016/7/layout/RepeatingBendingProcessNew"/>
     <dgm:cxn modelId="{6872C27D-205A-C94F-85EF-3DAD0CFA0E38}" srcId="{24E0129C-5D95-3C47-9B06-04043CA55473}" destId="{763B299A-A3A6-C74C-AF8C-5B276FF55B92}" srcOrd="0" destOrd="0" parTransId="{13F4654A-455A-0E41-85F6-63CBA0A33461}" sibTransId="{EA1065AE-525E-244C-952A-B85BD6D72DEB}"/>
-    <dgm:cxn modelId="{8143D687-CF3D-E445-96CC-6175DEEBF0DE}" type="presOf" srcId="{AB00244D-9919-D542-8AA4-999F3F2E3475}" destId="{539A949E-A62A-CF43-B4A0-934E250B590B}" srcOrd="0" destOrd="0" presId="urn:microsoft.com/office/officeart/2016/7/layout/RepeatingBendingProcessNew"/>
+    <dgm:cxn modelId="{3379AC85-9B97-AC45-81E1-4695126202E4}" type="presOf" srcId="{805BC26B-79AE-C54B-A389-ADD6762194EB}" destId="{DFA21956-7D41-D940-88B7-DDDF0F1FB40E}" srcOrd="0" destOrd="0" presId="urn:microsoft.com/office/officeart/2016/7/layout/RepeatingBendingProcessNew"/>
+    <dgm:cxn modelId="{B2F9348A-64E7-9F47-B4DC-E76A0C6970D8}" type="presOf" srcId="{C03BADCA-9FD8-8C4F-804F-4DA3C9FF831C}" destId="{841BFFC4-5AE5-984E-967E-8B0611A8E7D8}" srcOrd="0" destOrd="0" presId="urn:microsoft.com/office/officeart/2016/7/layout/RepeatingBendingProcessNew"/>
     <dgm:cxn modelId="{3E8F648F-8765-3E4D-835E-161BD1F58846}" srcId="{24E0129C-5D95-3C47-9B06-04043CA55473}" destId="{C03BADCA-9FD8-8C4F-804F-4DA3C9FF831C}" srcOrd="5" destOrd="0" parTransId="{9C4A3FD5-F1B8-704B-BB4D-674827F98DA7}" sibTransId="{8F1AD1F0-B5F0-0646-8549-8CABBC31C689}"/>
     <dgm:cxn modelId="{34137092-4DAF-5341-94BF-9A26F5C586FD}" srcId="{24E0129C-5D95-3C47-9B06-04043CA55473}" destId="{9E0B73BB-25E6-244C-88D2-C78394E258A0}" srcOrd="1" destOrd="0" parTransId="{B10C9FC0-E9BD-4144-839B-705700E99C0F}" sibTransId="{D8A76DA0-028A-4347-B367-C963157D82D0}"/>
     <dgm:cxn modelId="{8EE06894-002B-624F-8D60-4A3CFED7A3D5}" srcId="{24E0129C-5D95-3C47-9B06-04043CA55473}" destId="{95E11F2F-0E57-104E-98C9-2CD537C7637E}" srcOrd="2" destOrd="0" parTransId="{2D706E57-8DE1-4342-A7B3-308383F243D2}" sibTransId="{7EF71C4A-833D-554E-A5A7-CA5AC68C8857}"/>
-    <dgm:cxn modelId="{6A2219A9-6134-EA40-9E43-1443C1A8C328}" type="presOf" srcId="{BF56499D-67D8-9245-8F21-5369813FC338}" destId="{B4EEB252-A842-1C47-9152-D1F1DFEB181A}" srcOrd="0" destOrd="0" presId="urn:microsoft.com/office/officeart/2016/7/layout/RepeatingBendingProcessNew"/>
-    <dgm:cxn modelId="{A06B7BB7-7D1C-B04D-A171-6952C305B16C}" type="presOf" srcId="{9E0B73BB-25E6-244C-88D2-C78394E258A0}" destId="{1F7BF467-CAA5-E244-A8B0-AE82EC8829C4}" srcOrd="0" destOrd="0" presId="urn:microsoft.com/office/officeart/2016/7/layout/RepeatingBendingProcessNew"/>
-    <dgm:cxn modelId="{04FDD7C5-D198-CC49-AE13-B3DC3DFE61BB}" type="presOf" srcId="{C03BADCA-9FD8-8C4F-804F-4DA3C9FF831C}" destId="{8680362E-92B7-7F4B-B1FA-34C7F423AAF0}" srcOrd="0" destOrd="0" presId="urn:microsoft.com/office/officeart/2016/7/layout/RepeatingBendingProcessNew"/>
-    <dgm:cxn modelId="{1980EFC8-B36E-1047-8E22-785C3C6EE36A}" type="presOf" srcId="{EA1065AE-525E-244C-952A-B85BD6D72DEB}" destId="{A5C68796-E2AE-ED41-8921-B9B291DC977E}" srcOrd="1" destOrd="0" presId="urn:microsoft.com/office/officeart/2016/7/layout/RepeatingBendingProcessNew"/>
-    <dgm:cxn modelId="{1D8D98E8-8F8F-9A40-BBC2-B010003D085B}" type="presOf" srcId="{805BC26B-79AE-C54B-A389-ADD6762194EB}" destId="{BAB59A33-D8A0-0645-BAE6-FE48FD8DD1D3}" srcOrd="1" destOrd="0" presId="urn:microsoft.com/office/officeart/2016/7/layout/RepeatingBendingProcessNew"/>
-    <dgm:cxn modelId="{B4D8CCF0-1C66-A747-AA60-F04AC71F5D37}" type="presOf" srcId="{7EF71C4A-833D-554E-A5A7-CA5AC68C8857}" destId="{02689391-208A-474B-AD01-1382708DE939}" srcOrd="0" destOrd="0" presId="urn:microsoft.com/office/officeart/2016/7/layout/RepeatingBendingProcessNew"/>
-    <dgm:cxn modelId="{EACC1217-DA4A-BB45-935C-F6F9E5ED1583}" type="presParOf" srcId="{A7CA9436-FF99-924B-98B4-5149CD2ED020}" destId="{108596E6-F710-7B4B-85F0-CA30429E116E}" srcOrd="0" destOrd="0" presId="urn:microsoft.com/office/officeart/2016/7/layout/RepeatingBendingProcessNew"/>
-    <dgm:cxn modelId="{B35E5EE0-ACEE-D046-A73C-ED407A8BC261}" type="presParOf" srcId="{A7CA9436-FF99-924B-98B4-5149CD2ED020}" destId="{C9267905-6F54-F04E-AF2E-CB2975AB340E}" srcOrd="1" destOrd="0" presId="urn:microsoft.com/office/officeart/2016/7/layout/RepeatingBendingProcessNew"/>
-    <dgm:cxn modelId="{4B0F64A2-5F54-B940-AE51-AED98694364A}" type="presParOf" srcId="{C9267905-6F54-F04E-AF2E-CB2975AB340E}" destId="{A5C68796-E2AE-ED41-8921-B9B291DC977E}" srcOrd="0" destOrd="0" presId="urn:microsoft.com/office/officeart/2016/7/layout/RepeatingBendingProcessNew"/>
-    <dgm:cxn modelId="{88D3FF8C-E73D-C148-AE67-0AE00AD3777D}" type="presParOf" srcId="{A7CA9436-FF99-924B-98B4-5149CD2ED020}" destId="{1F7BF467-CAA5-E244-A8B0-AE82EC8829C4}" srcOrd="2" destOrd="0" presId="urn:microsoft.com/office/officeart/2016/7/layout/RepeatingBendingProcessNew"/>
-    <dgm:cxn modelId="{2AD109A1-425A-F342-B6A0-61A2064657B6}" type="presParOf" srcId="{A7CA9436-FF99-924B-98B4-5149CD2ED020}" destId="{BE2EDDB4-F6EC-9546-A6CC-CFA9F05B7981}" srcOrd="3" destOrd="0" presId="urn:microsoft.com/office/officeart/2016/7/layout/RepeatingBendingProcessNew"/>
-    <dgm:cxn modelId="{58814D02-A5D4-3E48-BEDF-71CA57BC3C92}" type="presParOf" srcId="{BE2EDDB4-F6EC-9546-A6CC-CFA9F05B7981}" destId="{C2C09F19-9945-2C4F-8F80-28442B46E447}" srcOrd="0" destOrd="0" presId="urn:microsoft.com/office/officeart/2016/7/layout/RepeatingBendingProcessNew"/>
-    <dgm:cxn modelId="{7A6580CC-B129-6C49-8BA0-D4D909967EE5}" type="presParOf" srcId="{A7CA9436-FF99-924B-98B4-5149CD2ED020}" destId="{6C013801-D3F7-0749-9984-226755DCA8DD}" srcOrd="4" destOrd="0" presId="urn:microsoft.com/office/officeart/2016/7/layout/RepeatingBendingProcessNew"/>
-    <dgm:cxn modelId="{CD930B32-05C2-3345-839B-DA6FF1B15615}" type="presParOf" srcId="{A7CA9436-FF99-924B-98B4-5149CD2ED020}" destId="{02689391-208A-474B-AD01-1382708DE939}" srcOrd="5" destOrd="0" presId="urn:microsoft.com/office/officeart/2016/7/layout/RepeatingBendingProcessNew"/>
-    <dgm:cxn modelId="{14247858-B9F9-4947-9ED9-D2AE484A7011}" type="presParOf" srcId="{02689391-208A-474B-AD01-1382708DE939}" destId="{6B1BA5BA-A325-3E4A-AF27-F65F2589830E}" srcOrd="0" destOrd="0" presId="urn:microsoft.com/office/officeart/2016/7/layout/RepeatingBendingProcessNew"/>
-    <dgm:cxn modelId="{5D7E7615-E345-C247-8360-681C603D812E}" type="presParOf" srcId="{A7CA9436-FF99-924B-98B4-5149CD2ED020}" destId="{539A949E-A62A-CF43-B4A0-934E250B590B}" srcOrd="6" destOrd="0" presId="urn:microsoft.com/office/officeart/2016/7/layout/RepeatingBendingProcessNew"/>
-    <dgm:cxn modelId="{25A305BB-09C1-A94F-91FB-5407F48968EC}" type="presParOf" srcId="{A7CA9436-FF99-924B-98B4-5149CD2ED020}" destId="{07224510-582E-F943-AB43-BDABA27328DD}" srcOrd="7" destOrd="0" presId="urn:microsoft.com/office/officeart/2016/7/layout/RepeatingBendingProcessNew"/>
-    <dgm:cxn modelId="{EFEBCB6A-09A5-5D4E-B761-240A696B1596}" type="presParOf" srcId="{07224510-582E-F943-AB43-BDABA27328DD}" destId="{E8E7055B-8659-9F42-90CF-CB71AC69C516}" srcOrd="0" destOrd="0" presId="urn:microsoft.com/office/officeart/2016/7/layout/RepeatingBendingProcessNew"/>
-    <dgm:cxn modelId="{CB53D6C4-9683-7D42-896A-12C5BC7CA7E7}" type="presParOf" srcId="{A7CA9436-FF99-924B-98B4-5149CD2ED020}" destId="{B4EEB252-A842-1C47-9152-D1F1DFEB181A}" srcOrd="8" destOrd="0" presId="urn:microsoft.com/office/officeart/2016/7/layout/RepeatingBendingProcessNew"/>
-    <dgm:cxn modelId="{1016D125-A3A6-A847-880D-26107E2FE196}" type="presParOf" srcId="{A7CA9436-FF99-924B-98B4-5149CD2ED020}" destId="{99E8F455-F226-D648-86B4-8E481BAEDE50}" srcOrd="9" destOrd="0" presId="urn:microsoft.com/office/officeart/2016/7/layout/RepeatingBendingProcessNew"/>
-    <dgm:cxn modelId="{ECFF9C55-7D43-5742-B69F-5F77C2367934}" type="presParOf" srcId="{99E8F455-F226-D648-86B4-8E481BAEDE50}" destId="{BAB59A33-D8A0-0645-BAE6-FE48FD8DD1D3}" srcOrd="0" destOrd="0" presId="urn:microsoft.com/office/officeart/2016/7/layout/RepeatingBendingProcessNew"/>
-    <dgm:cxn modelId="{3D07333F-B803-264D-8E39-05FA21C7BB00}" type="presParOf" srcId="{A7CA9436-FF99-924B-98B4-5149CD2ED020}" destId="{8680362E-92B7-7F4B-B1FA-34C7F423AAF0}" srcOrd="10" destOrd="0" presId="urn:microsoft.com/office/officeart/2016/7/layout/RepeatingBendingProcessNew"/>
+    <dgm:cxn modelId="{D4BD0695-9CEB-7B4F-8ADD-6682EECEE0E5}" type="presOf" srcId="{BF56499D-67D8-9245-8F21-5369813FC338}" destId="{7FA658A9-219B-5A45-975A-CE4A3A526FC3}" srcOrd="0" destOrd="0" presId="urn:microsoft.com/office/officeart/2016/7/layout/RepeatingBendingProcessNew"/>
+    <dgm:cxn modelId="{39509397-583C-A645-8964-C4BE92E70205}" type="presOf" srcId="{D8A76DA0-028A-4347-B367-C963157D82D0}" destId="{A827C844-D2A6-ED49-976C-DE29AFA31FB3}" srcOrd="1" destOrd="0" presId="urn:microsoft.com/office/officeart/2016/7/layout/RepeatingBendingProcessNew"/>
+    <dgm:cxn modelId="{72B348AF-231B-3E45-BE35-64A3AE1BDF2C}" type="presOf" srcId="{D8A76DA0-028A-4347-B367-C963157D82D0}" destId="{44CFAD02-6EDE-4549-AE12-10AE7C41EEA0}" srcOrd="0" destOrd="0" presId="urn:microsoft.com/office/officeart/2016/7/layout/RepeatingBendingProcessNew"/>
+    <dgm:cxn modelId="{1D7E7FBF-0A3B-4A44-8ABC-655563862631}" type="presOf" srcId="{62047629-E52A-284B-83D2-588FF7B8B97A}" destId="{31189D5B-EB97-CA4F-83FF-AC9DBDBE2A08}" srcOrd="1" destOrd="0" presId="urn:microsoft.com/office/officeart/2016/7/layout/RepeatingBendingProcessNew"/>
+    <dgm:cxn modelId="{B24EC0CE-BFCA-9E42-AFA7-A363AF63F702}" type="presOf" srcId="{EA1065AE-525E-244C-952A-B85BD6D72DEB}" destId="{5FCFDDC5-0114-784B-BAF4-F20CF49B4B2D}" srcOrd="0" destOrd="0" presId="urn:microsoft.com/office/officeart/2016/7/layout/RepeatingBendingProcessNew"/>
+    <dgm:cxn modelId="{D87527E3-5A8C-AF4C-A42E-4ABF4C5E5995}" type="presOf" srcId="{24E0129C-5D95-3C47-9B06-04043CA55473}" destId="{5362013A-1C80-5349-A382-28D3FF1DE6F9}" srcOrd="0" destOrd="0" presId="urn:microsoft.com/office/officeart/2016/7/layout/RepeatingBendingProcessNew"/>
+    <dgm:cxn modelId="{D45F547D-E5A2-BC41-A206-3DFB6C7C4D1B}" type="presParOf" srcId="{5362013A-1C80-5349-A382-28D3FF1DE6F9}" destId="{9BD49620-195D-354B-8EBF-55890738D1D8}" srcOrd="0" destOrd="0" presId="urn:microsoft.com/office/officeart/2016/7/layout/RepeatingBendingProcessNew"/>
+    <dgm:cxn modelId="{6A5C4F77-058F-C843-A9CA-4E3AE8597A0B}" type="presParOf" srcId="{5362013A-1C80-5349-A382-28D3FF1DE6F9}" destId="{5FCFDDC5-0114-784B-BAF4-F20CF49B4B2D}" srcOrd="1" destOrd="0" presId="urn:microsoft.com/office/officeart/2016/7/layout/RepeatingBendingProcessNew"/>
+    <dgm:cxn modelId="{A2B156C9-8EF3-0942-9C4B-7EEBB363ED32}" type="presParOf" srcId="{5FCFDDC5-0114-784B-BAF4-F20CF49B4B2D}" destId="{47B17261-E363-C24C-8927-CB00ECDC5AC8}" srcOrd="0" destOrd="0" presId="urn:microsoft.com/office/officeart/2016/7/layout/RepeatingBendingProcessNew"/>
+    <dgm:cxn modelId="{F15DC02D-27E8-4745-9E8C-210D51B6570E}" type="presParOf" srcId="{5362013A-1C80-5349-A382-28D3FF1DE6F9}" destId="{58A84B51-DEE9-A247-90C0-3C128E280237}" srcOrd="2" destOrd="0" presId="urn:microsoft.com/office/officeart/2016/7/layout/RepeatingBendingProcessNew"/>
+    <dgm:cxn modelId="{B804CB3B-2DCB-E443-A5F3-1DCD18AF9726}" type="presParOf" srcId="{5362013A-1C80-5349-A382-28D3FF1DE6F9}" destId="{44CFAD02-6EDE-4549-AE12-10AE7C41EEA0}" srcOrd="3" destOrd="0" presId="urn:microsoft.com/office/officeart/2016/7/layout/RepeatingBendingProcessNew"/>
+    <dgm:cxn modelId="{DBD69A0F-B4AE-C94B-87AA-75E148D96EE9}" type="presParOf" srcId="{44CFAD02-6EDE-4549-AE12-10AE7C41EEA0}" destId="{A827C844-D2A6-ED49-976C-DE29AFA31FB3}" srcOrd="0" destOrd="0" presId="urn:microsoft.com/office/officeart/2016/7/layout/RepeatingBendingProcessNew"/>
+    <dgm:cxn modelId="{E6383D40-591E-114E-9201-0380A54B1A5A}" type="presParOf" srcId="{5362013A-1C80-5349-A382-28D3FF1DE6F9}" destId="{A21DA58C-02AC-354E-AB72-7026516EB3F8}" srcOrd="4" destOrd="0" presId="urn:microsoft.com/office/officeart/2016/7/layout/RepeatingBendingProcessNew"/>
+    <dgm:cxn modelId="{6EE0EBB8-C7F3-2B43-A7C5-6B5A39A570D4}" type="presParOf" srcId="{5362013A-1C80-5349-A382-28D3FF1DE6F9}" destId="{CD01FFEF-8A91-8349-B927-DE1FF2455BAE}" srcOrd="5" destOrd="0" presId="urn:microsoft.com/office/officeart/2016/7/layout/RepeatingBendingProcessNew"/>
+    <dgm:cxn modelId="{13B7ED88-2C9F-E549-AC95-25B330ADB0EC}" type="presParOf" srcId="{CD01FFEF-8A91-8349-B927-DE1FF2455BAE}" destId="{D1DC987B-D3BE-2346-A948-32CDA9201EE2}" srcOrd="0" destOrd="0" presId="urn:microsoft.com/office/officeart/2016/7/layout/RepeatingBendingProcessNew"/>
+    <dgm:cxn modelId="{FF8AECCA-D6BE-114A-958F-93E434F7F68E}" type="presParOf" srcId="{5362013A-1C80-5349-A382-28D3FF1DE6F9}" destId="{BEE0466D-831D-DB42-AB95-EFE9D78AFF92}" srcOrd="6" destOrd="0" presId="urn:microsoft.com/office/officeart/2016/7/layout/RepeatingBendingProcessNew"/>
+    <dgm:cxn modelId="{5BB92BDD-179F-1741-8819-38D2FD28C600}" type="presParOf" srcId="{5362013A-1C80-5349-A382-28D3FF1DE6F9}" destId="{0B92585E-66D8-6D4C-B6E3-80B4C4F49202}" srcOrd="7" destOrd="0" presId="urn:microsoft.com/office/officeart/2016/7/layout/RepeatingBendingProcessNew"/>
+    <dgm:cxn modelId="{2D657E1C-7EB6-964F-B447-53CF3ADB28E0}" type="presParOf" srcId="{0B92585E-66D8-6D4C-B6E3-80B4C4F49202}" destId="{31189D5B-EB97-CA4F-83FF-AC9DBDBE2A08}" srcOrd="0" destOrd="0" presId="urn:microsoft.com/office/officeart/2016/7/layout/RepeatingBendingProcessNew"/>
+    <dgm:cxn modelId="{5497A084-7252-BE49-A11C-B18C96F7ADA5}" type="presParOf" srcId="{5362013A-1C80-5349-A382-28D3FF1DE6F9}" destId="{7FA658A9-219B-5A45-975A-CE4A3A526FC3}" srcOrd="8" destOrd="0" presId="urn:microsoft.com/office/officeart/2016/7/layout/RepeatingBendingProcessNew"/>
+    <dgm:cxn modelId="{2A6A764F-1521-0B43-8DC7-DE4BADA8E701}" type="presParOf" srcId="{5362013A-1C80-5349-A382-28D3FF1DE6F9}" destId="{DFA21956-7D41-D940-88B7-DDDF0F1FB40E}" srcOrd="9" destOrd="0" presId="urn:microsoft.com/office/officeart/2016/7/layout/RepeatingBendingProcessNew"/>
+    <dgm:cxn modelId="{8C6A20FE-B87D-6943-944E-9761D8BF9209}" type="presParOf" srcId="{DFA21956-7D41-D940-88B7-DDDF0F1FB40E}" destId="{93C4D4CD-D18F-734C-936B-D645989ED30C}" srcOrd="0" destOrd="0" presId="urn:microsoft.com/office/officeart/2016/7/layout/RepeatingBendingProcessNew"/>
+    <dgm:cxn modelId="{1D337F48-E47C-334C-95E6-A87AF4D433F5}" type="presParOf" srcId="{5362013A-1C80-5349-A382-28D3FF1DE6F9}" destId="{841BFFC4-5AE5-984E-967E-8B0611A8E7D8}" srcOrd="10" destOrd="0" presId="urn:microsoft.com/office/officeart/2016/7/layout/RepeatingBendingProcessNew"/>
   </dgm:cxnLst>
   <dgm:bg/>
   <dgm:whole/>
@@ -3059,7 +3130,7 @@
 <dgm:dataModel xmlns:dgm="http://schemas.openxmlformats.org/drawingml/2006/diagram" xmlns:a="http://schemas.openxmlformats.org/drawingml/2006/main">
   <dgm:ptLst>
     <dgm:pt modelId="{A1BFBDD7-1E18-445F-8115-E09FF590B384}" type="doc">
-      <dgm:prSet loTypeId="urn:microsoft.com/office/officeart/2005/8/layout/vList5" loCatId="list" qsTypeId="urn:microsoft.com/office/officeart/2005/8/quickstyle/simple1" qsCatId="simple" csTypeId="urn:microsoft.com/office/officeart/2005/8/colors/colorful2" csCatId="colorful" phldr="1"/>
+      <dgm:prSet loTypeId="urn:microsoft.com/office/officeart/2005/8/layout/vList5" loCatId="list" qsTypeId="urn:microsoft.com/office/officeart/2005/8/quickstyle/simple1" qsCatId="simple" csTypeId="urn:microsoft.com/office/officeart/2005/8/colors/colorful5" csCatId="colorful" phldr="1"/>
       <dgm:spPr/>
       <dgm:t>
         <a:bodyPr/>
@@ -3509,7 +3580,7 @@
         </a:p>
       </dgm:t>
     </dgm:pt>
-    <dgm:pt modelId="{3B17F6D1-1289-D84A-998F-5B0F9C690318}" type="pres">
+    <dgm:pt modelId="{F4836869-4AD8-8C49-A3A9-F5B4D0B7249A}" type="pres">
       <dgm:prSet presAssocID="{A1BFBDD7-1E18-445F-8115-E09FF590B384}" presName="Name0" presStyleCnt="0">
         <dgm:presLayoutVars>
           <dgm:dir/>
@@ -3519,11 +3590,11 @@
       </dgm:prSet>
       <dgm:spPr/>
     </dgm:pt>
-    <dgm:pt modelId="{AF9E883A-F6A6-8349-8997-B3659E49C965}" type="pres">
+    <dgm:pt modelId="{484B03F3-2994-EF45-BA26-34C1254340B6}" type="pres">
       <dgm:prSet presAssocID="{5C568554-7535-4300-8615-374316965E9C}" presName="linNode" presStyleCnt="0"/>
       <dgm:spPr/>
     </dgm:pt>
-    <dgm:pt modelId="{C348B490-4758-2348-95D4-F47331E4A85A}" type="pres">
+    <dgm:pt modelId="{F4A5664C-2AD6-2442-A594-6DBE4DA58A7D}" type="pres">
       <dgm:prSet presAssocID="{5C568554-7535-4300-8615-374316965E9C}" presName="parentText" presStyleLbl="node1" presStyleIdx="0" presStyleCnt="4">
         <dgm:presLayoutVars>
           <dgm:chMax val="1"/>
@@ -3532,7 +3603,7 @@
       </dgm:prSet>
       <dgm:spPr/>
     </dgm:pt>
-    <dgm:pt modelId="{FDBF05B4-D36B-C149-B968-D2A2DE9F55BC}" type="pres">
+    <dgm:pt modelId="{FDB3E8DD-F168-7448-8FF9-589400015950}" type="pres">
       <dgm:prSet presAssocID="{5C568554-7535-4300-8615-374316965E9C}" presName="descendantText" presStyleLbl="alignAccFollowNode1" presStyleIdx="0" presStyleCnt="4">
         <dgm:presLayoutVars>
           <dgm:bulletEnabled val="1"/>
@@ -3540,15 +3611,15 @@
       </dgm:prSet>
       <dgm:spPr/>
     </dgm:pt>
-    <dgm:pt modelId="{9528C5E7-5B33-9C4E-9A41-983A87AA15D9}" type="pres">
+    <dgm:pt modelId="{E5F3D165-0144-364A-8B39-177BE273F83A}" type="pres">
       <dgm:prSet presAssocID="{4BB1CD2E-0D05-4741-9C6A-BDFA8A4BCE07}" presName="sp" presStyleCnt="0"/>
       <dgm:spPr/>
     </dgm:pt>
-    <dgm:pt modelId="{C63BA1E9-3E45-9549-B706-2667FF452DA1}" type="pres">
+    <dgm:pt modelId="{F520D214-450B-AC42-A570-60659FB9364C}" type="pres">
       <dgm:prSet presAssocID="{72D78306-E24E-4A50-9867-E4E7044F5AD5}" presName="linNode" presStyleCnt="0"/>
       <dgm:spPr/>
     </dgm:pt>
-    <dgm:pt modelId="{A4EBBE77-BE75-574C-8FCD-5A1BDCEE059F}" type="pres">
+    <dgm:pt modelId="{4300F195-D647-534F-9588-B126E5CDC85D}" type="pres">
       <dgm:prSet presAssocID="{72D78306-E24E-4A50-9867-E4E7044F5AD5}" presName="parentText" presStyleLbl="node1" presStyleIdx="1" presStyleCnt="4">
         <dgm:presLayoutVars>
           <dgm:chMax val="1"/>
@@ -3557,7 +3628,7 @@
       </dgm:prSet>
       <dgm:spPr/>
     </dgm:pt>
-    <dgm:pt modelId="{BBBEA0E7-4147-C34B-9D66-877A2F2FBAC3}" type="pres">
+    <dgm:pt modelId="{58D772C2-4F39-574C-8CAF-ECF9D0E587F1}" type="pres">
       <dgm:prSet presAssocID="{72D78306-E24E-4A50-9867-E4E7044F5AD5}" presName="descendantText" presStyleLbl="alignAccFollowNode1" presStyleIdx="1" presStyleCnt="4">
         <dgm:presLayoutVars>
           <dgm:bulletEnabled val="1"/>
@@ -3565,15 +3636,15 @@
       </dgm:prSet>
       <dgm:spPr/>
     </dgm:pt>
-    <dgm:pt modelId="{D127B4C9-27FB-B34D-87BF-E84060B5543B}" type="pres">
+    <dgm:pt modelId="{9A251819-EBEE-6E4B-AB6B-60603CD30C64}" type="pres">
       <dgm:prSet presAssocID="{0882FDED-A438-4DF3-AA7C-21E9F99C770E}" presName="sp" presStyleCnt="0"/>
       <dgm:spPr/>
     </dgm:pt>
-    <dgm:pt modelId="{FB6A2B43-3FBB-4542-B549-8A57F2F021C3}" type="pres">
+    <dgm:pt modelId="{DF32633A-2C26-B746-B55B-54F1DC69E855}" type="pres">
       <dgm:prSet presAssocID="{1E476772-E926-42A1-9A1B-CAC3A749F5DA}" presName="linNode" presStyleCnt="0"/>
       <dgm:spPr/>
     </dgm:pt>
-    <dgm:pt modelId="{E0755FB0-923B-CD40-96F6-31C3C4C3B293}" type="pres">
+    <dgm:pt modelId="{8058C386-0673-9B46-A269-EC40E934911E}" type="pres">
       <dgm:prSet presAssocID="{1E476772-E926-42A1-9A1B-CAC3A749F5DA}" presName="parentText" presStyleLbl="node1" presStyleIdx="2" presStyleCnt="4">
         <dgm:presLayoutVars>
           <dgm:chMax val="1"/>
@@ -3582,7 +3653,7 @@
       </dgm:prSet>
       <dgm:spPr/>
     </dgm:pt>
-    <dgm:pt modelId="{8463B778-1DDB-8E4F-B9A1-A6214970B0E1}" type="pres">
+    <dgm:pt modelId="{BA5F3569-162A-614A-810F-34BC641FC633}" type="pres">
       <dgm:prSet presAssocID="{1E476772-E926-42A1-9A1B-CAC3A749F5DA}" presName="descendantText" presStyleLbl="alignAccFollowNode1" presStyleIdx="2" presStyleCnt="4">
         <dgm:presLayoutVars>
           <dgm:bulletEnabled val="1"/>
@@ -3590,15 +3661,15 @@
       </dgm:prSet>
       <dgm:spPr/>
     </dgm:pt>
-    <dgm:pt modelId="{B23D2AAC-6BA3-C046-BF82-B2059A3BDD42}" type="pres">
+    <dgm:pt modelId="{FABEFB8E-D291-3245-83E1-040E16117546}" type="pres">
       <dgm:prSet presAssocID="{F793F875-7251-449A-B592-4FB63D8FDCDD}" presName="sp" presStyleCnt="0"/>
       <dgm:spPr/>
     </dgm:pt>
-    <dgm:pt modelId="{4C79C561-E37D-E740-A25E-97D8AF251362}" type="pres">
+    <dgm:pt modelId="{CAB29984-5B04-E640-9BF0-4AD0388B8199}" type="pres">
       <dgm:prSet presAssocID="{CDFC4793-86E9-4044-95FE-6AD5184DBCEA}" presName="linNode" presStyleCnt="0"/>
       <dgm:spPr/>
     </dgm:pt>
-    <dgm:pt modelId="{C1FE65BE-02DD-8147-BB71-65637701F9FD}" type="pres">
+    <dgm:pt modelId="{EC2C3918-5D91-8949-A9EC-B1FD45B99AC1}" type="pres">
       <dgm:prSet presAssocID="{CDFC4793-86E9-4044-95FE-6AD5184DBCEA}" presName="parentText" presStyleLbl="node1" presStyleIdx="3" presStyleCnt="4">
         <dgm:presLayoutVars>
           <dgm:chMax val="1"/>
@@ -3607,7 +3678,7 @@
       </dgm:prSet>
       <dgm:spPr/>
     </dgm:pt>
-    <dgm:pt modelId="{C00F8C18-05EB-7F40-B33A-0737D27B4492}" type="pres">
+    <dgm:pt modelId="{E6462D9A-7037-A149-BEBA-F1881C4FFC85}" type="pres">
       <dgm:prSet presAssocID="{CDFC4793-86E9-4044-95FE-6AD5184DBCEA}" presName="descendantText" presStyleLbl="alignAccFollowNode1" presStyleIdx="3" presStyleCnt="4">
         <dgm:presLayoutVars>
           <dgm:bulletEnabled val="1"/>
@@ -3619,44 +3690,44 @@
   <dgm:cxnLst>
     <dgm:cxn modelId="{3F223F07-3C5E-4ABB-92B7-42827A5F1EC1}" srcId="{CDFC4793-86E9-4044-95FE-6AD5184DBCEA}" destId="{39F4DC2A-F490-49EA-BA5D-95F5D433C87A}" srcOrd="1" destOrd="0" parTransId="{6EDDE6E3-64EA-4442-A678-A719A0E7E8CF}" sibTransId="{B47119B0-95D0-467B-AB5A-9CCD79227EC4}"/>
     <dgm:cxn modelId="{948DB717-D957-453D-9D19-FF66D970F775}" srcId="{72D78306-E24E-4A50-9867-E4E7044F5AD5}" destId="{9A6250AD-EFB0-4200-A8C7-55350B13E8AC}" srcOrd="0" destOrd="0" parTransId="{0ECF86A8-533C-4F19-9FC3-C02D7211E868}" sibTransId="{D488C0E8-4E95-47A0-BDEA-2E1F15099791}"/>
+    <dgm:cxn modelId="{56640119-9B1B-CA4D-86C3-EBD5004B220C}" type="presOf" srcId="{1E476772-E926-42A1-9A1B-CAC3A749F5DA}" destId="{8058C386-0673-9B46-A269-EC40E934911E}" srcOrd="0" destOrd="0" presId="urn:microsoft.com/office/officeart/2005/8/layout/vList5"/>
+    <dgm:cxn modelId="{D2B2B222-37B0-4745-ABC1-5F30E6642157}" type="presOf" srcId="{DC8C6BBF-C147-4868-A57A-6497CAE604D1}" destId="{E6462D9A-7037-A149-BEBA-F1881C4FFC85}" srcOrd="0" destOrd="0" presId="urn:microsoft.com/office/officeart/2005/8/layout/vList5"/>
     <dgm:cxn modelId="{96FA862B-4400-417F-9359-5ED7779A08A7}" srcId="{A1BFBDD7-1E18-445F-8115-E09FF590B384}" destId="{CDFC4793-86E9-4044-95FE-6AD5184DBCEA}" srcOrd="3" destOrd="0" parTransId="{542CA93F-266A-431F-92A2-F30873A6A78E}" sibTransId="{AEC5520D-9456-4A72-A41D-58F7C507CB6B}"/>
-    <dgm:cxn modelId="{E164972B-3D47-B74C-AFB0-EF3A03C6ACAC}" type="presOf" srcId="{09EBAF86-E7E2-4C25-8A3F-CE0F908053AE}" destId="{FDBF05B4-D36B-C149-B968-D2A2DE9F55BC}" srcOrd="0" destOrd="0" presId="urn:microsoft.com/office/officeart/2005/8/layout/vList5"/>
-    <dgm:cxn modelId="{B857F32F-BAF2-0E4E-B461-3BDA690DCFBE}" type="presOf" srcId="{9A6250AD-EFB0-4200-A8C7-55350B13E8AC}" destId="{BBBEA0E7-4147-C34B-9D66-877A2F2FBAC3}" srcOrd="0" destOrd="0" presId="urn:microsoft.com/office/officeart/2005/8/layout/vList5"/>
-    <dgm:cxn modelId="{495BB632-CCBD-B544-937A-4EAE739E28BB}" type="presOf" srcId="{D6E7D8BF-5499-4108-8C39-5A57C4CB5272}" destId="{8463B778-1DDB-8E4F-B9A1-A6214970B0E1}" srcOrd="0" destOrd="1" presId="urn:microsoft.com/office/officeart/2005/8/layout/vList5"/>
     <dgm:cxn modelId="{23BCEB32-0336-4C37-91B0-31589EA87469}" srcId="{CDFC4793-86E9-4044-95FE-6AD5184DBCEA}" destId="{DC8C6BBF-C147-4868-A57A-6497CAE604D1}" srcOrd="0" destOrd="0" parTransId="{3A8C441B-7393-49C6-8314-FC0DC488ACEF}" sibTransId="{1A880C34-7F82-43F9-BD57-945CF5FF40CB}"/>
     <dgm:cxn modelId="{A162D84B-14D6-4864-8B3D-67FBFA025942}" srcId="{72D78306-E24E-4A50-9867-E4E7044F5AD5}" destId="{BFD8B4BB-2A02-4DF8-A13D-148A7D546FF7}" srcOrd="1" destOrd="0" parTransId="{854F7687-E44A-4CE7-911F-74BDD448941F}" sibTransId="{709BCD26-5C12-488F-B33C-515335F9E894}"/>
-    <dgm:cxn modelId="{D3FAD658-CFE6-FA4D-92A2-CACFDCA17EA3}" type="presOf" srcId="{CDFC4793-86E9-4044-95FE-6AD5184DBCEA}" destId="{C1FE65BE-02DD-8147-BB71-65637701F9FD}" srcOrd="0" destOrd="0" presId="urn:microsoft.com/office/officeart/2005/8/layout/vList5"/>
-    <dgm:cxn modelId="{11AF366A-CCA2-7B4B-812B-8FC7F332A960}" type="presOf" srcId="{DC8C6BBF-C147-4868-A57A-6497CAE604D1}" destId="{C00F8C18-05EB-7F40-B33A-0737D27B4492}" srcOrd="0" destOrd="0" presId="urn:microsoft.com/office/officeart/2005/8/layout/vList5"/>
-    <dgm:cxn modelId="{BA4C666F-B0E3-AC44-9F56-B1F465F3BD3E}" type="presOf" srcId="{C98FC20D-A10E-44A4-A108-62A273769370}" destId="{8463B778-1DDB-8E4F-B9A1-A6214970B0E1}" srcOrd="0" destOrd="0" presId="urn:microsoft.com/office/officeart/2005/8/layout/vList5"/>
+    <dgm:cxn modelId="{AB07EE55-E9E6-3F4F-8687-A2D58CC819A9}" type="presOf" srcId="{9A6250AD-EFB0-4200-A8C7-55350B13E8AC}" destId="{58D772C2-4F39-574C-8CAF-ECF9D0E587F1}" srcOrd="0" destOrd="0" presId="urn:microsoft.com/office/officeart/2005/8/layout/vList5"/>
+    <dgm:cxn modelId="{F4CAEF6D-0C10-504B-B3E1-E3C76BBF7CDB}" type="presOf" srcId="{72D78306-E24E-4A50-9867-E4E7044F5AD5}" destId="{4300F195-D647-534F-9588-B126E5CDC85D}" srcOrd="0" destOrd="0" presId="urn:microsoft.com/office/officeart/2005/8/layout/vList5"/>
     <dgm:cxn modelId="{7C5D4870-E458-406E-AF37-BF6CFE76D3F2}" srcId="{5C568554-7535-4300-8615-374316965E9C}" destId="{09EBAF86-E7E2-4C25-8A3F-CE0F908053AE}" srcOrd="0" destOrd="0" parTransId="{64D06446-2AAF-496C-B4D2-11E2ABF2D1CF}" sibTransId="{403656B3-781D-42E2-89D3-3BFCB18EB14F}"/>
-    <dgm:cxn modelId="{4504B573-6C30-E444-8C9B-A0ED6F55D92E}" type="presOf" srcId="{BFD8B4BB-2A02-4DF8-A13D-148A7D546FF7}" destId="{BBBEA0E7-4147-C34B-9D66-877A2F2FBAC3}" srcOrd="0" destOrd="1" presId="urn:microsoft.com/office/officeart/2005/8/layout/vList5"/>
+    <dgm:cxn modelId="{7B589473-CB30-F44F-ACF9-CAE1FC155F35}" type="presOf" srcId="{BFD8B4BB-2A02-4DF8-A13D-148A7D546FF7}" destId="{58D772C2-4F39-574C-8CAF-ECF9D0E587F1}" srcOrd="0" destOrd="1" presId="urn:microsoft.com/office/officeart/2005/8/layout/vList5"/>
     <dgm:cxn modelId="{7239DC79-63FB-4124-8B34-3E6E70AFD6F5}" srcId="{1E476772-E926-42A1-9A1B-CAC3A749F5DA}" destId="{D6E7D8BF-5499-4108-8C39-5A57C4CB5272}" srcOrd="1" destOrd="0" parTransId="{25981B64-0CFA-4CF4-94C9-CCCA678AD27C}" sibTransId="{11BB140F-79CA-4536-9AF2-EE48841644D0}"/>
-    <dgm:cxn modelId="{8CC3D686-9B36-9E4E-802E-D877FD31CA41}" type="presOf" srcId="{69A67A82-3E41-4064-B619-864A1866FAE5}" destId="{C00F8C18-05EB-7F40-B33A-0737D27B4492}" srcOrd="0" destOrd="2" presId="urn:microsoft.com/office/officeart/2005/8/layout/vList5"/>
+    <dgm:cxn modelId="{6CB34F7D-9178-5546-9337-977044EE2244}" type="presOf" srcId="{A1BFBDD7-1E18-445F-8115-E09FF590B384}" destId="{F4836869-4AD8-8C49-A3A9-F5B4D0B7249A}" srcOrd="0" destOrd="0" presId="urn:microsoft.com/office/officeart/2005/8/layout/vList5"/>
+    <dgm:cxn modelId="{7D2BB08A-6150-C143-889D-A667E72F277E}" type="presOf" srcId="{39F4DC2A-F490-49EA-BA5D-95F5D433C87A}" destId="{E6462D9A-7037-A149-BEBA-F1881C4FFC85}" srcOrd="0" destOrd="1" presId="urn:microsoft.com/office/officeart/2005/8/layout/vList5"/>
     <dgm:cxn modelId="{62BC2D92-CE86-4C95-8AC1-66658F5842FF}" srcId="{1E476772-E926-42A1-9A1B-CAC3A749F5DA}" destId="{C98FC20D-A10E-44A4-A108-62A273769370}" srcOrd="0" destOrd="0" parTransId="{C695B60A-29CA-48D8-984D-28C1676160F8}" sibTransId="{C8E44A61-19D7-4AD9-8772-2C1A66455F1D}"/>
-    <dgm:cxn modelId="{EB346694-15B8-2146-B0C6-20FF84184762}" type="presOf" srcId="{1E476772-E926-42A1-9A1B-CAC3A749F5DA}" destId="{E0755FB0-923B-CD40-96F6-31C3C4C3B293}" srcOrd="0" destOrd="0" presId="urn:microsoft.com/office/officeart/2005/8/layout/vList5"/>
-    <dgm:cxn modelId="{FBCC07AE-1CF7-3F4F-A148-24E90ACD5023}" type="presOf" srcId="{39F4DC2A-F490-49EA-BA5D-95F5D433C87A}" destId="{C00F8C18-05EB-7F40-B33A-0737D27B4492}" srcOrd="0" destOrd="1" presId="urn:microsoft.com/office/officeart/2005/8/layout/vList5"/>
-    <dgm:cxn modelId="{5162A2BC-49D5-5C4D-A042-7C9CFB1F8697}" type="presOf" srcId="{5C568554-7535-4300-8615-374316965E9C}" destId="{C348B490-4758-2348-95D4-F47331E4A85A}" srcOrd="0" destOrd="0" presId="urn:microsoft.com/office/officeart/2005/8/layout/vList5"/>
-    <dgm:cxn modelId="{2EC7B4BC-4F25-FF43-AF3D-6AB8ABF4B016}" type="presOf" srcId="{72D78306-E24E-4A50-9867-E4E7044F5AD5}" destId="{A4EBBE77-BE75-574C-8FCD-5A1BDCEE059F}" srcOrd="0" destOrd="0" presId="urn:microsoft.com/office/officeart/2005/8/layout/vList5"/>
+    <dgm:cxn modelId="{C11893BC-1233-BD4A-AB8C-42C9846023B1}" type="presOf" srcId="{D6E7D8BF-5499-4108-8C39-5A57C4CB5272}" destId="{BA5F3569-162A-614A-810F-34BC641FC633}" srcOrd="0" destOrd="1" presId="urn:microsoft.com/office/officeart/2005/8/layout/vList5"/>
+    <dgm:cxn modelId="{7DDCD9C9-2A47-E44F-BA98-A5E7718B7351}" type="presOf" srcId="{5C568554-7535-4300-8615-374316965E9C}" destId="{F4A5664C-2AD6-2442-A594-6DBE4DA58A7D}" srcOrd="0" destOrd="0" presId="urn:microsoft.com/office/officeart/2005/8/layout/vList5"/>
+    <dgm:cxn modelId="{66B65DDA-58BA-454D-8871-D624AB0C35B1}" type="presOf" srcId="{CDFC4793-86E9-4044-95FE-6AD5184DBCEA}" destId="{EC2C3918-5D91-8949-A9EC-B1FD45B99AC1}" srcOrd="0" destOrd="0" presId="urn:microsoft.com/office/officeart/2005/8/layout/vList5"/>
     <dgm:cxn modelId="{C10EB3DE-C4A9-4B9E-AE27-554FE2895AC9}" srcId="{CDFC4793-86E9-4044-95FE-6AD5184DBCEA}" destId="{69A67A82-3E41-4064-B619-864A1866FAE5}" srcOrd="2" destOrd="0" parTransId="{1F9B1627-4EB1-4BA0-AC60-EF8E44F9A529}" sibTransId="{7A0ABF5D-F3B3-41F0-AADC-64D60C8D6DAE}"/>
+    <dgm:cxn modelId="{1136C2E4-9917-7646-A9C4-DAEB3E0EF983}" type="presOf" srcId="{09EBAF86-E7E2-4C25-8A3F-CE0F908053AE}" destId="{FDB3E8DD-F168-7448-8FF9-589400015950}" srcOrd="0" destOrd="0" presId="urn:microsoft.com/office/officeart/2005/8/layout/vList5"/>
     <dgm:cxn modelId="{A4D61DE6-543D-44B2-872E-3113675C832D}" srcId="{A1BFBDD7-1E18-445F-8115-E09FF590B384}" destId="{72D78306-E24E-4A50-9867-E4E7044F5AD5}" srcOrd="1" destOrd="0" parTransId="{675EE85A-3FD4-47F5-9F2B-BAB6B113D1E4}" sibTransId="{0882FDED-A438-4DF3-AA7C-21E9F99C770E}"/>
     <dgm:cxn modelId="{EFB27BE6-A1F0-44D2-867A-4466D249D959}" srcId="{A1BFBDD7-1E18-445F-8115-E09FF590B384}" destId="{1E476772-E926-42A1-9A1B-CAC3A749F5DA}" srcOrd="2" destOrd="0" parTransId="{F6FA7A1B-C792-4ECC-A061-CEB27BD69CF1}" sibTransId="{F793F875-7251-449A-B592-4FB63D8FDCDD}"/>
+    <dgm:cxn modelId="{7AF815E9-423A-164B-8175-A8B0F523FC83}" type="presOf" srcId="{69A67A82-3E41-4064-B619-864A1866FAE5}" destId="{E6462D9A-7037-A149-BEBA-F1881C4FFC85}" srcOrd="0" destOrd="2" presId="urn:microsoft.com/office/officeart/2005/8/layout/vList5"/>
     <dgm:cxn modelId="{F1205EF0-6C04-4628-9577-8EF2693DDB93}" srcId="{A1BFBDD7-1E18-445F-8115-E09FF590B384}" destId="{5C568554-7535-4300-8615-374316965E9C}" srcOrd="0" destOrd="0" parTransId="{5E668361-676E-41E3-8736-49DC20FD8275}" sibTransId="{4BB1CD2E-0D05-4741-9C6A-BDFA8A4BCE07}"/>
-    <dgm:cxn modelId="{AB6494FE-BE24-C34E-8E54-3BB0A8447E52}" type="presOf" srcId="{A1BFBDD7-1E18-445F-8115-E09FF590B384}" destId="{3B17F6D1-1289-D84A-998F-5B0F9C690318}" srcOrd="0" destOrd="0" presId="urn:microsoft.com/office/officeart/2005/8/layout/vList5"/>
-    <dgm:cxn modelId="{CFAFAF6A-88FC-4E4B-9133-85F4E9C15351}" type="presParOf" srcId="{3B17F6D1-1289-D84A-998F-5B0F9C690318}" destId="{AF9E883A-F6A6-8349-8997-B3659E49C965}" srcOrd="0" destOrd="0" presId="urn:microsoft.com/office/officeart/2005/8/layout/vList5"/>
-    <dgm:cxn modelId="{EAE05424-881F-F440-BD30-09C5B16B5251}" type="presParOf" srcId="{AF9E883A-F6A6-8349-8997-B3659E49C965}" destId="{C348B490-4758-2348-95D4-F47331E4A85A}" srcOrd="0" destOrd="0" presId="urn:microsoft.com/office/officeart/2005/8/layout/vList5"/>
-    <dgm:cxn modelId="{F80BAD51-3E88-FB4D-BAF9-0601C81D5360}" type="presParOf" srcId="{AF9E883A-F6A6-8349-8997-B3659E49C965}" destId="{FDBF05B4-D36B-C149-B968-D2A2DE9F55BC}" srcOrd="1" destOrd="0" presId="urn:microsoft.com/office/officeart/2005/8/layout/vList5"/>
-    <dgm:cxn modelId="{08648083-2521-994E-8BA5-F2C0A0E39EA7}" type="presParOf" srcId="{3B17F6D1-1289-D84A-998F-5B0F9C690318}" destId="{9528C5E7-5B33-9C4E-9A41-983A87AA15D9}" srcOrd="1" destOrd="0" presId="urn:microsoft.com/office/officeart/2005/8/layout/vList5"/>
-    <dgm:cxn modelId="{F7582F23-B98F-4C41-8D96-23EC77F8E1BF}" type="presParOf" srcId="{3B17F6D1-1289-D84A-998F-5B0F9C690318}" destId="{C63BA1E9-3E45-9549-B706-2667FF452DA1}" srcOrd="2" destOrd="0" presId="urn:microsoft.com/office/officeart/2005/8/layout/vList5"/>
-    <dgm:cxn modelId="{D518ACB2-899A-D946-B788-47F43D71BF8F}" type="presParOf" srcId="{C63BA1E9-3E45-9549-B706-2667FF452DA1}" destId="{A4EBBE77-BE75-574C-8FCD-5A1BDCEE059F}" srcOrd="0" destOrd="0" presId="urn:microsoft.com/office/officeart/2005/8/layout/vList5"/>
-    <dgm:cxn modelId="{5251967F-2D53-0447-B9C1-6F12B6B46F16}" type="presParOf" srcId="{C63BA1E9-3E45-9549-B706-2667FF452DA1}" destId="{BBBEA0E7-4147-C34B-9D66-877A2F2FBAC3}" srcOrd="1" destOrd="0" presId="urn:microsoft.com/office/officeart/2005/8/layout/vList5"/>
-    <dgm:cxn modelId="{14C377F4-2AFD-1144-AA13-87CE3D277772}" type="presParOf" srcId="{3B17F6D1-1289-D84A-998F-5B0F9C690318}" destId="{D127B4C9-27FB-B34D-87BF-E84060B5543B}" srcOrd="3" destOrd="0" presId="urn:microsoft.com/office/officeart/2005/8/layout/vList5"/>
-    <dgm:cxn modelId="{2C53DD7D-CB9E-5A40-9E0B-15D24970B8CC}" type="presParOf" srcId="{3B17F6D1-1289-D84A-998F-5B0F9C690318}" destId="{FB6A2B43-3FBB-4542-B549-8A57F2F021C3}" srcOrd="4" destOrd="0" presId="urn:microsoft.com/office/officeart/2005/8/layout/vList5"/>
-    <dgm:cxn modelId="{922F70FD-49F6-6D45-A1B3-7EE175C5555E}" type="presParOf" srcId="{FB6A2B43-3FBB-4542-B549-8A57F2F021C3}" destId="{E0755FB0-923B-CD40-96F6-31C3C4C3B293}" srcOrd="0" destOrd="0" presId="urn:microsoft.com/office/officeart/2005/8/layout/vList5"/>
-    <dgm:cxn modelId="{43A233A6-4BC5-8D45-85D5-BF4557A13710}" type="presParOf" srcId="{FB6A2B43-3FBB-4542-B549-8A57F2F021C3}" destId="{8463B778-1DDB-8E4F-B9A1-A6214970B0E1}" srcOrd="1" destOrd="0" presId="urn:microsoft.com/office/officeart/2005/8/layout/vList5"/>
-    <dgm:cxn modelId="{7070260D-C24C-1347-BFC2-74A7CF38D4D1}" type="presParOf" srcId="{3B17F6D1-1289-D84A-998F-5B0F9C690318}" destId="{B23D2AAC-6BA3-C046-BF82-B2059A3BDD42}" srcOrd="5" destOrd="0" presId="urn:microsoft.com/office/officeart/2005/8/layout/vList5"/>
-    <dgm:cxn modelId="{6FBDA669-56B8-3645-B448-0688D5651EE8}" type="presParOf" srcId="{3B17F6D1-1289-D84A-998F-5B0F9C690318}" destId="{4C79C561-E37D-E740-A25E-97D8AF251362}" srcOrd="6" destOrd="0" presId="urn:microsoft.com/office/officeart/2005/8/layout/vList5"/>
-    <dgm:cxn modelId="{9ED99509-C686-A94C-A17B-06184CC1B672}" type="presParOf" srcId="{4C79C561-E37D-E740-A25E-97D8AF251362}" destId="{C1FE65BE-02DD-8147-BB71-65637701F9FD}" srcOrd="0" destOrd="0" presId="urn:microsoft.com/office/officeart/2005/8/layout/vList5"/>
-    <dgm:cxn modelId="{899DB646-E1AF-AF4F-BC2D-037F78510AB5}" type="presParOf" srcId="{4C79C561-E37D-E740-A25E-97D8AF251362}" destId="{C00F8C18-05EB-7F40-B33A-0737D27B4492}" srcOrd="1" destOrd="0" presId="urn:microsoft.com/office/officeart/2005/8/layout/vList5"/>
+    <dgm:cxn modelId="{64A784F7-1793-854B-9407-6C7C0E550469}" type="presOf" srcId="{C98FC20D-A10E-44A4-A108-62A273769370}" destId="{BA5F3569-162A-614A-810F-34BC641FC633}" srcOrd="0" destOrd="0" presId="urn:microsoft.com/office/officeart/2005/8/layout/vList5"/>
+    <dgm:cxn modelId="{3DA09EB8-8E01-3B4C-83A7-CED1DDEB32FC}" type="presParOf" srcId="{F4836869-4AD8-8C49-A3A9-F5B4D0B7249A}" destId="{484B03F3-2994-EF45-BA26-34C1254340B6}" srcOrd="0" destOrd="0" presId="urn:microsoft.com/office/officeart/2005/8/layout/vList5"/>
+    <dgm:cxn modelId="{5578AEA3-C0A9-BF47-B301-8B83D6820250}" type="presParOf" srcId="{484B03F3-2994-EF45-BA26-34C1254340B6}" destId="{F4A5664C-2AD6-2442-A594-6DBE4DA58A7D}" srcOrd="0" destOrd="0" presId="urn:microsoft.com/office/officeart/2005/8/layout/vList5"/>
+    <dgm:cxn modelId="{2FEC479E-A067-4A41-939E-CA321706BEF2}" type="presParOf" srcId="{484B03F3-2994-EF45-BA26-34C1254340B6}" destId="{FDB3E8DD-F168-7448-8FF9-589400015950}" srcOrd="1" destOrd="0" presId="urn:microsoft.com/office/officeart/2005/8/layout/vList5"/>
+    <dgm:cxn modelId="{F5F23CC9-CE34-7C4A-8406-E1A851683111}" type="presParOf" srcId="{F4836869-4AD8-8C49-A3A9-F5B4D0B7249A}" destId="{E5F3D165-0144-364A-8B39-177BE273F83A}" srcOrd="1" destOrd="0" presId="urn:microsoft.com/office/officeart/2005/8/layout/vList5"/>
+    <dgm:cxn modelId="{5FC988D5-89F1-A244-82B2-9940947F01B2}" type="presParOf" srcId="{F4836869-4AD8-8C49-A3A9-F5B4D0B7249A}" destId="{F520D214-450B-AC42-A570-60659FB9364C}" srcOrd="2" destOrd="0" presId="urn:microsoft.com/office/officeart/2005/8/layout/vList5"/>
+    <dgm:cxn modelId="{80981E4B-A1EB-9046-A621-679F53F00517}" type="presParOf" srcId="{F520D214-450B-AC42-A570-60659FB9364C}" destId="{4300F195-D647-534F-9588-B126E5CDC85D}" srcOrd="0" destOrd="0" presId="urn:microsoft.com/office/officeart/2005/8/layout/vList5"/>
+    <dgm:cxn modelId="{4BCECF2E-5C9F-C845-8D59-35E945CEDF92}" type="presParOf" srcId="{F520D214-450B-AC42-A570-60659FB9364C}" destId="{58D772C2-4F39-574C-8CAF-ECF9D0E587F1}" srcOrd="1" destOrd="0" presId="urn:microsoft.com/office/officeart/2005/8/layout/vList5"/>
+    <dgm:cxn modelId="{3FE35A36-6B6A-D74C-B007-F73AFCA348E2}" type="presParOf" srcId="{F4836869-4AD8-8C49-A3A9-F5B4D0B7249A}" destId="{9A251819-EBEE-6E4B-AB6B-60603CD30C64}" srcOrd="3" destOrd="0" presId="urn:microsoft.com/office/officeart/2005/8/layout/vList5"/>
+    <dgm:cxn modelId="{9CF6033D-B6F2-8B4A-8EA9-99B1EC434BCD}" type="presParOf" srcId="{F4836869-4AD8-8C49-A3A9-F5B4D0B7249A}" destId="{DF32633A-2C26-B746-B55B-54F1DC69E855}" srcOrd="4" destOrd="0" presId="urn:microsoft.com/office/officeart/2005/8/layout/vList5"/>
+    <dgm:cxn modelId="{DC03117E-26E1-534F-8F1B-D0E0D1D9507B}" type="presParOf" srcId="{DF32633A-2C26-B746-B55B-54F1DC69E855}" destId="{8058C386-0673-9B46-A269-EC40E934911E}" srcOrd="0" destOrd="0" presId="urn:microsoft.com/office/officeart/2005/8/layout/vList5"/>
+    <dgm:cxn modelId="{79EAD28E-31EE-1648-9AC3-8BA00CCFB51C}" type="presParOf" srcId="{DF32633A-2C26-B746-B55B-54F1DC69E855}" destId="{BA5F3569-162A-614A-810F-34BC641FC633}" srcOrd="1" destOrd="0" presId="urn:microsoft.com/office/officeart/2005/8/layout/vList5"/>
+    <dgm:cxn modelId="{E6EB77EE-88D6-EE44-B5DF-6FF3960E175B}" type="presParOf" srcId="{F4836869-4AD8-8C49-A3A9-F5B4D0B7249A}" destId="{FABEFB8E-D291-3245-83E1-040E16117546}" srcOrd="5" destOrd="0" presId="urn:microsoft.com/office/officeart/2005/8/layout/vList5"/>
+    <dgm:cxn modelId="{7C121A31-4C60-CF4B-ABA7-9F7F03EE0430}" type="presParOf" srcId="{F4836869-4AD8-8C49-A3A9-F5B4D0B7249A}" destId="{CAB29984-5B04-E640-9BF0-4AD0388B8199}" srcOrd="6" destOrd="0" presId="urn:microsoft.com/office/officeart/2005/8/layout/vList5"/>
+    <dgm:cxn modelId="{FAC88CD5-0AD1-CB4B-92FE-9D32A0F9D4FA}" type="presParOf" srcId="{CAB29984-5B04-E640-9BF0-4AD0388B8199}" destId="{EC2C3918-5D91-8949-A9EC-B1FD45B99AC1}" srcOrd="0" destOrd="0" presId="urn:microsoft.com/office/officeart/2005/8/layout/vList5"/>
+    <dgm:cxn modelId="{77608BD6-4581-E342-BE68-CDB584082DCB}" type="presParOf" srcId="{CAB29984-5B04-E640-9BF0-4AD0388B8199}" destId="{E6462D9A-7037-A149-BEBA-F1881C4FFC85}" srcOrd="1" destOrd="0" presId="urn:microsoft.com/office/officeart/2005/8/layout/vList5"/>
   </dgm:cxnLst>
   <dgm:bg/>
   <dgm:whole/>
@@ -3676,15 +3747,15 @@
       <dsp:cNvGrpSpPr/>
     </dsp:nvGrpSpPr>
     <dsp:grpSpPr/>
-    <dsp:sp modelId="{C9267905-6F54-F04E-AF2E-CB2975AB340E}">
+    <dsp:sp modelId="{5FCFDDC5-0114-784B-BAF4-F20CF49B4B2D}">
       <dsp:nvSpPr>
         <dsp:cNvPr id="0" name=""/>
         <dsp:cNvSpPr/>
       </dsp:nvSpPr>
       <dsp:spPr>
         <a:xfrm>
-          <a:off x="2850052" y="685988"/>
-          <a:ext cx="529335" cy="91440"/>
+          <a:off x="3040792" y="870618"/>
+          <a:ext cx="667342" cy="91440"/>
         </a:xfrm>
         <a:custGeom>
           <a:avLst/>
@@ -3698,19 +3769,16 @@
                 <a:pt x="0" y="45720"/>
               </a:moveTo>
               <a:lnTo>
-                <a:pt x="529335" y="45720"/>
+                <a:pt x="667342" y="45720"/>
               </a:lnTo>
             </a:path>
           </a:pathLst>
         </a:custGeom>
         <a:noFill/>
-        <a:ln w="6350" cap="flat" cmpd="sng" algn="ctr">
+        <a:ln w="28575" cap="flat" cmpd="sng" algn="ctr">
           <a:solidFill>
-            <a:schemeClr val="dk2">
-              <a:hueOff val="0"/>
-              <a:satOff val="0"/>
-              <a:lumOff val="0"/>
-              <a:alphaOff val="0"/>
+            <a:schemeClr val="bg1">
+              <a:lumMod val="50000"/>
             </a:schemeClr>
           </a:solidFill>
           <a:prstDash val="solid"/>
@@ -3753,25 +3821,25 @@
         </a:p>
       </dsp:txBody>
       <dsp:txXfrm>
-        <a:off x="3100721" y="728908"/>
-        <a:ext cx="27996" cy="5599"/>
+        <a:off x="3357014" y="912848"/>
+        <a:ext cx="34897" cy="6979"/>
       </dsp:txXfrm>
     </dsp:sp>
-    <dsp:sp modelId="{108596E6-F710-7B4B-85F0-CA30429E116E}">
+    <dsp:sp modelId="{9BD49620-195D-354B-8EBF-55890738D1D8}">
       <dsp:nvSpPr>
         <dsp:cNvPr id="0" name=""/>
         <dsp:cNvSpPr/>
       </dsp:nvSpPr>
       <dsp:spPr>
         <a:xfrm>
-          <a:off x="417351" y="1358"/>
-          <a:ext cx="2434500" cy="1460700"/>
+          <a:off x="8061" y="5979"/>
+          <a:ext cx="3034531" cy="1820718"/>
         </a:xfrm>
         <a:prstGeom prst="rect">
           <a:avLst/>
         </a:prstGeom>
         <a:solidFill>
-          <a:schemeClr val="dk2">
+          <a:schemeClr val="accent5">
             <a:hueOff val="0"/>
             <a:satOff val="0"/>
             <a:lumOff val="0"/>
@@ -3780,7 +3848,7 @@
         </a:solidFill>
         <a:ln w="12700" cap="flat" cmpd="sng" algn="ctr">
           <a:solidFill>
-            <a:schemeClr val="lt2">
+            <a:schemeClr val="lt1">
               <a:hueOff val="0"/>
               <a:satOff val="0"/>
               <a:lumOff val="0"/>
@@ -3807,12 +3875,12 @@
         </a:fontRef>
       </dsp:style>
       <dsp:txBody>
-        <a:bodyPr spcFirstLastPara="0" vert="horz" wrap="square" lIns="119293" tIns="125219" rIns="119293" bIns="125219" numCol="1" spcCol="1270" anchor="ctr" anchorCtr="0">
+        <a:bodyPr spcFirstLastPara="0" vert="horz" wrap="square" lIns="148695" tIns="156081" rIns="148695" bIns="156081" numCol="1" spcCol="1270" anchor="ctr" anchorCtr="0">
           <a:noAutofit/>
         </a:bodyPr>
         <a:lstStyle/>
         <a:p>
-          <a:pPr marL="0" lvl="0" indent="0" algn="ctr" defTabSz="1822450">
+          <a:pPr marL="0" lvl="0" indent="0" algn="ctr" defTabSz="2311400">
             <a:lnSpc>
               <a:spcPct val="90000"/>
             </a:lnSpc>
@@ -3825,25 +3893,25 @@
             <a:buNone/>
           </a:pPr>
           <a:r>
-            <a:rPr lang="en-US" sz="4100" kern="1200"/>
+            <a:rPr lang="en-US" sz="5200" kern="1200"/>
             <a:t>Source Code </a:t>
           </a:r>
         </a:p>
       </dsp:txBody>
       <dsp:txXfrm>
-        <a:off x="417351" y="1358"/>
-        <a:ext cx="2434500" cy="1460700"/>
+        <a:off x="8061" y="5979"/>
+        <a:ext cx="3034531" cy="1820718"/>
       </dsp:txXfrm>
     </dsp:sp>
-    <dsp:sp modelId="{BE2EDDB4-F6EC-9546-A6CC-CFA9F05B7981}">
+    <dsp:sp modelId="{44CFAD02-6EDE-4549-AE12-10AE7C41EEA0}">
       <dsp:nvSpPr>
         <dsp:cNvPr id="0" name=""/>
         <dsp:cNvSpPr/>
       </dsp:nvSpPr>
       <dsp:spPr>
         <a:xfrm>
-          <a:off x="1634602" y="1460258"/>
-          <a:ext cx="2994435" cy="529335"/>
+          <a:off x="6773265" y="870618"/>
+          <a:ext cx="667342" cy="91440"/>
         </a:xfrm>
         <a:custGeom>
           <a:avLst/>
@@ -3854,28 +3922,19 @@
           <a:pathLst>
             <a:path>
               <a:moveTo>
-                <a:pt x="2994435" y="0"/>
+                <a:pt x="0" y="45720"/>
               </a:moveTo>
               <a:lnTo>
-                <a:pt x="2994435" y="281767"/>
-              </a:lnTo>
-              <a:lnTo>
-                <a:pt x="0" y="281767"/>
-              </a:lnTo>
-              <a:lnTo>
-                <a:pt x="0" y="529335"/>
+                <a:pt x="667342" y="45720"/>
               </a:lnTo>
             </a:path>
           </a:pathLst>
         </a:custGeom>
         <a:noFill/>
-        <a:ln w="6350" cap="flat" cmpd="sng" algn="ctr">
+        <a:ln w="28575" cap="flat" cmpd="sng" algn="ctr">
           <a:solidFill>
-            <a:schemeClr val="dk2">
-              <a:hueOff val="0"/>
-              <a:satOff val="0"/>
-              <a:lumOff val="0"/>
-              <a:alphaOff val="0"/>
+            <a:schemeClr val="bg1">
+              <a:lumMod val="50000"/>
             </a:schemeClr>
           </a:solidFill>
           <a:prstDash val="solid"/>
@@ -3918,34 +3977,34 @@
         </a:p>
       </dsp:txBody>
       <dsp:txXfrm>
-        <a:off x="3055661" y="1722126"/>
-        <a:ext cx="152316" cy="5599"/>
+        <a:off x="7089488" y="912848"/>
+        <a:ext cx="34897" cy="6979"/>
       </dsp:txXfrm>
     </dsp:sp>
-    <dsp:sp modelId="{1F7BF467-CAA5-E244-A8B0-AE82EC8829C4}">
+    <dsp:sp modelId="{58A84B51-DEE9-A247-90C0-3C128E280237}">
       <dsp:nvSpPr>
         <dsp:cNvPr id="0" name=""/>
         <dsp:cNvSpPr/>
       </dsp:nvSpPr>
       <dsp:spPr>
         <a:xfrm>
-          <a:off x="3411787" y="1358"/>
-          <a:ext cx="2434500" cy="1460700"/>
+          <a:off x="3740534" y="5979"/>
+          <a:ext cx="3034531" cy="1820718"/>
         </a:xfrm>
         <a:prstGeom prst="rect">
           <a:avLst/>
         </a:prstGeom>
         <a:solidFill>
-          <a:schemeClr val="dk2">
-            <a:hueOff val="0"/>
-            <a:satOff val="0"/>
-            <a:lumOff val="0"/>
+          <a:schemeClr val="accent5">
+            <a:hueOff val="-1351709"/>
+            <a:satOff val="-3484"/>
+            <a:lumOff val="-2353"/>
             <a:alphaOff val="0"/>
           </a:schemeClr>
         </a:solidFill>
         <a:ln w="12700" cap="flat" cmpd="sng" algn="ctr">
           <a:solidFill>
-            <a:schemeClr val="lt2">
+            <a:schemeClr val="lt1">
               <a:hueOff val="0"/>
               <a:satOff val="0"/>
               <a:lumOff val="0"/>
@@ -3972,12 +4031,12 @@
         </a:fontRef>
       </dsp:style>
       <dsp:txBody>
-        <a:bodyPr spcFirstLastPara="0" vert="horz" wrap="square" lIns="119293" tIns="125219" rIns="119293" bIns="125219" numCol="1" spcCol="1270" anchor="ctr" anchorCtr="0">
+        <a:bodyPr spcFirstLastPara="0" vert="horz" wrap="square" lIns="148695" tIns="156081" rIns="148695" bIns="156081" numCol="1" spcCol="1270" anchor="ctr" anchorCtr="0">
           <a:noAutofit/>
         </a:bodyPr>
         <a:lstStyle/>
         <a:p>
-          <a:pPr marL="0" lvl="0" indent="0" algn="ctr" defTabSz="1822450">
+          <a:pPr marL="0" lvl="0" indent="0" algn="ctr" defTabSz="2311400">
             <a:lnSpc>
               <a:spcPct val="90000"/>
             </a:lnSpc>
@@ -3990,25 +4049,25 @@
             <a:buNone/>
           </a:pPr>
           <a:r>
-            <a:rPr lang="en-US" sz="4100" kern="1200"/>
+            <a:rPr lang="en-US" sz="5200" kern="1200"/>
             <a:t>Macro Expansion</a:t>
           </a:r>
         </a:p>
       </dsp:txBody>
       <dsp:txXfrm>
-        <a:off x="3411787" y="1358"/>
-        <a:ext cx="2434500" cy="1460700"/>
+        <a:off x="3740534" y="5979"/>
+        <a:ext cx="3034531" cy="1820718"/>
       </dsp:txXfrm>
     </dsp:sp>
-    <dsp:sp modelId="{02689391-208A-474B-AD01-1382708DE939}">
+    <dsp:sp modelId="{CD01FFEF-8A91-8349-B927-DE1FF2455BAE}">
       <dsp:nvSpPr>
         <dsp:cNvPr id="0" name=""/>
         <dsp:cNvSpPr/>
       </dsp:nvSpPr>
       <dsp:spPr>
         <a:xfrm>
-          <a:off x="2850052" y="2706624"/>
-          <a:ext cx="529335" cy="91440"/>
+          <a:off x="1525326" y="1824897"/>
+          <a:ext cx="7464946" cy="667342"/>
         </a:xfrm>
         <a:custGeom>
           <a:avLst/>
@@ -4019,22 +4078,25 @@
           <a:pathLst>
             <a:path>
               <a:moveTo>
-                <a:pt x="0" y="45720"/>
+                <a:pt x="7464946" y="0"/>
               </a:moveTo>
               <a:lnTo>
-                <a:pt x="529335" y="45720"/>
+                <a:pt x="7464946" y="350771"/>
+              </a:lnTo>
+              <a:lnTo>
+                <a:pt x="0" y="350771"/>
+              </a:lnTo>
+              <a:lnTo>
+                <a:pt x="0" y="667342"/>
               </a:lnTo>
             </a:path>
           </a:pathLst>
         </a:custGeom>
         <a:noFill/>
-        <a:ln w="6350" cap="flat" cmpd="sng" algn="ctr">
+        <a:ln w="28575" cap="flat" cmpd="sng" algn="ctr">
           <a:solidFill>
-            <a:schemeClr val="dk2">
-              <a:hueOff val="0"/>
-              <a:satOff val="0"/>
-              <a:lumOff val="0"/>
-              <a:alphaOff val="0"/>
+            <a:schemeClr val="bg1">
+              <a:lumMod val="50000"/>
             </a:schemeClr>
           </a:solidFill>
           <a:prstDash val="solid"/>
@@ -4077,34 +4139,34 @@
         </a:p>
       </dsp:txBody>
       <dsp:txXfrm>
-        <a:off x="3100721" y="2749544"/>
-        <a:ext cx="27996" cy="5599"/>
+        <a:off x="5070362" y="2155079"/>
+        <a:ext cx="374875" cy="6979"/>
       </dsp:txXfrm>
     </dsp:sp>
-    <dsp:sp modelId="{6C013801-D3F7-0749-9984-226755DCA8DD}">
+    <dsp:sp modelId="{A21DA58C-02AC-354E-AB72-7026516EB3F8}">
       <dsp:nvSpPr>
         <dsp:cNvPr id="0" name=""/>
         <dsp:cNvSpPr/>
       </dsp:nvSpPr>
       <dsp:spPr>
         <a:xfrm>
-          <a:off x="417351" y="2021993"/>
-          <a:ext cx="2434500" cy="1460700"/>
+          <a:off x="7473007" y="5979"/>
+          <a:ext cx="3034531" cy="1820718"/>
         </a:xfrm>
         <a:prstGeom prst="rect">
           <a:avLst/>
         </a:prstGeom>
         <a:solidFill>
-          <a:schemeClr val="dk2">
-            <a:hueOff val="0"/>
-            <a:satOff val="0"/>
-            <a:lumOff val="0"/>
+          <a:schemeClr val="accent5">
+            <a:hueOff val="-2703417"/>
+            <a:satOff val="-6968"/>
+            <a:lumOff val="-4706"/>
             <a:alphaOff val="0"/>
           </a:schemeClr>
         </a:solidFill>
         <a:ln w="12700" cap="flat" cmpd="sng" algn="ctr">
           <a:solidFill>
-            <a:schemeClr val="lt2">
+            <a:schemeClr val="lt1">
               <a:hueOff val="0"/>
               <a:satOff val="0"/>
               <a:lumOff val="0"/>
@@ -4131,12 +4193,12 @@
         </a:fontRef>
       </dsp:style>
       <dsp:txBody>
-        <a:bodyPr spcFirstLastPara="0" vert="horz" wrap="square" lIns="119293" tIns="125219" rIns="119293" bIns="125219" numCol="1" spcCol="1270" anchor="ctr" anchorCtr="0">
+        <a:bodyPr spcFirstLastPara="0" vert="horz" wrap="square" lIns="148695" tIns="156081" rIns="148695" bIns="156081" numCol="1" spcCol="1270" anchor="ctr" anchorCtr="0">
           <a:noAutofit/>
         </a:bodyPr>
         <a:lstStyle/>
         <a:p>
-          <a:pPr marL="0" lvl="0" indent="0" algn="ctr" defTabSz="1822450">
+          <a:pPr marL="0" lvl="0" indent="0" algn="ctr" defTabSz="2311400">
             <a:lnSpc>
               <a:spcPct val="90000"/>
             </a:lnSpc>
@@ -4149,25 +4211,25 @@
             <a:buNone/>
           </a:pPr>
           <a:r>
-            <a:rPr lang="en-US" sz="4100" kern="1200"/>
+            <a:rPr lang="en-US" sz="5200" kern="1200"/>
             <a:t>AST </a:t>
           </a:r>
         </a:p>
       </dsp:txBody>
       <dsp:txXfrm>
-        <a:off x="417351" y="2021993"/>
-        <a:ext cx="2434500" cy="1460700"/>
+        <a:off x="7473007" y="5979"/>
+        <a:ext cx="3034531" cy="1820718"/>
       </dsp:txXfrm>
     </dsp:sp>
-    <dsp:sp modelId="{07224510-582E-F943-AB43-BDABA27328DD}">
+    <dsp:sp modelId="{0B92585E-66D8-6D4C-B6E3-80B4C4F49202}">
       <dsp:nvSpPr>
         <dsp:cNvPr id="0" name=""/>
         <dsp:cNvSpPr/>
       </dsp:nvSpPr>
       <dsp:spPr>
         <a:xfrm>
-          <a:off x="1634602" y="3480894"/>
-          <a:ext cx="2994435" cy="529335"/>
+          <a:off x="3040792" y="3389279"/>
+          <a:ext cx="667342" cy="91440"/>
         </a:xfrm>
         <a:custGeom>
           <a:avLst/>
@@ -4178,28 +4240,19 @@
           <a:pathLst>
             <a:path>
               <a:moveTo>
-                <a:pt x="2994435" y="0"/>
+                <a:pt x="0" y="45720"/>
               </a:moveTo>
               <a:lnTo>
-                <a:pt x="2994435" y="281767"/>
-              </a:lnTo>
-              <a:lnTo>
-                <a:pt x="0" y="281767"/>
-              </a:lnTo>
-              <a:lnTo>
-                <a:pt x="0" y="529335"/>
+                <a:pt x="667342" y="45720"/>
               </a:lnTo>
             </a:path>
           </a:pathLst>
         </a:custGeom>
         <a:noFill/>
-        <a:ln w="6350" cap="flat" cmpd="sng" algn="ctr">
+        <a:ln w="28575" cap="flat" cmpd="sng" algn="ctr">
           <a:solidFill>
-            <a:schemeClr val="dk2">
-              <a:hueOff val="0"/>
-              <a:satOff val="0"/>
-              <a:lumOff val="0"/>
-              <a:alphaOff val="0"/>
+            <a:schemeClr val="bg1">
+              <a:lumMod val="50000"/>
             </a:schemeClr>
           </a:solidFill>
           <a:prstDash val="solid"/>
@@ -4242,34 +4295,34 @@
         </a:p>
       </dsp:txBody>
       <dsp:txXfrm>
-        <a:off x="3055661" y="3742762"/>
-        <a:ext cx="152316" cy="5599"/>
+        <a:off x="3357014" y="3431509"/>
+        <a:ext cx="34897" cy="6979"/>
       </dsp:txXfrm>
     </dsp:sp>
-    <dsp:sp modelId="{539A949E-A62A-CF43-B4A0-934E250B590B}">
+    <dsp:sp modelId="{BEE0466D-831D-DB42-AB95-EFE9D78AFF92}">
       <dsp:nvSpPr>
         <dsp:cNvPr id="0" name=""/>
         <dsp:cNvSpPr/>
       </dsp:nvSpPr>
       <dsp:spPr>
         <a:xfrm>
-          <a:off x="3411787" y="2021993"/>
-          <a:ext cx="2434500" cy="1460700"/>
+          <a:off x="8061" y="2524640"/>
+          <a:ext cx="3034531" cy="1820718"/>
         </a:xfrm>
         <a:prstGeom prst="rect">
           <a:avLst/>
         </a:prstGeom>
         <a:solidFill>
-          <a:schemeClr val="dk2">
-            <a:hueOff val="0"/>
-            <a:satOff val="0"/>
-            <a:lumOff val="0"/>
+          <a:schemeClr val="accent5">
+            <a:hueOff val="-4055126"/>
+            <a:satOff val="-10451"/>
+            <a:lumOff val="-7059"/>
             <a:alphaOff val="0"/>
           </a:schemeClr>
         </a:solidFill>
         <a:ln w="12700" cap="flat" cmpd="sng" algn="ctr">
           <a:solidFill>
-            <a:schemeClr val="lt2">
+            <a:schemeClr val="lt1">
               <a:hueOff val="0"/>
               <a:satOff val="0"/>
               <a:lumOff val="0"/>
@@ -4296,12 +4349,12 @@
         </a:fontRef>
       </dsp:style>
       <dsp:txBody>
-        <a:bodyPr spcFirstLastPara="0" vert="horz" wrap="square" lIns="119293" tIns="125219" rIns="119293" bIns="125219" numCol="1" spcCol="1270" anchor="ctr" anchorCtr="0">
+        <a:bodyPr spcFirstLastPara="0" vert="horz" wrap="square" lIns="148695" tIns="156081" rIns="148695" bIns="156081" numCol="1" spcCol="1270" anchor="ctr" anchorCtr="0">
           <a:noAutofit/>
         </a:bodyPr>
         <a:lstStyle/>
         <a:p>
-          <a:pPr marL="0" lvl="0" indent="0" algn="ctr" defTabSz="1822450">
+          <a:pPr marL="0" lvl="0" indent="0" algn="ctr" defTabSz="2311400">
             <a:lnSpc>
               <a:spcPct val="90000"/>
             </a:lnSpc>
@@ -4314,25 +4367,25 @@
             <a:buNone/>
           </a:pPr>
           <a:r>
-            <a:rPr lang="en-US" sz="4100" kern="1200"/>
+            <a:rPr lang="en-US" sz="5200" kern="1200"/>
             <a:t>Julia IR</a:t>
           </a:r>
         </a:p>
       </dsp:txBody>
       <dsp:txXfrm>
-        <a:off x="3411787" y="2021993"/>
-        <a:ext cx="2434500" cy="1460700"/>
+        <a:off x="8061" y="2524640"/>
+        <a:ext cx="3034531" cy="1820718"/>
       </dsp:txXfrm>
     </dsp:sp>
-    <dsp:sp modelId="{99E8F455-F226-D648-86B4-8E481BAEDE50}">
+    <dsp:sp modelId="{DFA21956-7D41-D940-88B7-DDDF0F1FB40E}">
       <dsp:nvSpPr>
         <dsp:cNvPr id="0" name=""/>
         <dsp:cNvSpPr/>
       </dsp:nvSpPr>
       <dsp:spPr>
         <a:xfrm>
-          <a:off x="2850052" y="4727259"/>
-          <a:ext cx="529335" cy="91440"/>
+          <a:off x="6773265" y="3389279"/>
+          <a:ext cx="667342" cy="91440"/>
         </a:xfrm>
         <a:custGeom>
           <a:avLst/>
@@ -4346,19 +4399,16 @@
                 <a:pt x="0" y="45720"/>
               </a:moveTo>
               <a:lnTo>
-                <a:pt x="529335" y="45720"/>
+                <a:pt x="667342" y="45720"/>
               </a:lnTo>
             </a:path>
           </a:pathLst>
         </a:custGeom>
         <a:noFill/>
-        <a:ln w="6350" cap="flat" cmpd="sng" algn="ctr">
+        <a:ln w="28575" cap="flat" cmpd="sng" algn="ctr">
           <a:solidFill>
-            <a:schemeClr val="dk2">
-              <a:hueOff val="0"/>
-              <a:satOff val="0"/>
-              <a:lumOff val="0"/>
-              <a:alphaOff val="0"/>
+            <a:schemeClr val="bg1">
+              <a:lumMod val="50000"/>
             </a:schemeClr>
           </a:solidFill>
           <a:prstDash val="solid"/>
@@ -4401,34 +4451,34 @@
         </a:p>
       </dsp:txBody>
       <dsp:txXfrm>
-        <a:off x="3100721" y="4770179"/>
-        <a:ext cx="27996" cy="5599"/>
+        <a:off x="7089488" y="3431509"/>
+        <a:ext cx="34897" cy="6979"/>
       </dsp:txXfrm>
     </dsp:sp>
-    <dsp:sp modelId="{B4EEB252-A842-1C47-9152-D1F1DFEB181A}">
+    <dsp:sp modelId="{7FA658A9-219B-5A45-975A-CE4A3A526FC3}">
       <dsp:nvSpPr>
         <dsp:cNvPr id="0" name=""/>
         <dsp:cNvSpPr/>
       </dsp:nvSpPr>
       <dsp:spPr>
         <a:xfrm>
-          <a:off x="417351" y="4042629"/>
-          <a:ext cx="2434500" cy="1460700"/>
+          <a:off x="3740534" y="2524640"/>
+          <a:ext cx="3034531" cy="1820718"/>
         </a:xfrm>
         <a:prstGeom prst="rect">
           <a:avLst/>
         </a:prstGeom>
         <a:solidFill>
-          <a:schemeClr val="dk2">
-            <a:hueOff val="0"/>
-            <a:satOff val="0"/>
-            <a:lumOff val="0"/>
+          <a:schemeClr val="accent5">
+            <a:hueOff val="-5406834"/>
+            <a:satOff val="-13935"/>
+            <a:lumOff val="-9412"/>
             <a:alphaOff val="0"/>
           </a:schemeClr>
         </a:solidFill>
         <a:ln w="12700" cap="flat" cmpd="sng" algn="ctr">
           <a:solidFill>
-            <a:schemeClr val="lt2">
+            <a:schemeClr val="lt1">
               <a:hueOff val="0"/>
               <a:satOff val="0"/>
               <a:lumOff val="0"/>
@@ -4455,12 +4505,12 @@
         </a:fontRef>
       </dsp:style>
       <dsp:txBody>
-        <a:bodyPr spcFirstLastPara="0" vert="horz" wrap="square" lIns="119293" tIns="125219" rIns="119293" bIns="125219" numCol="1" spcCol="1270" anchor="ctr" anchorCtr="0">
+        <a:bodyPr spcFirstLastPara="0" vert="horz" wrap="square" lIns="148695" tIns="156081" rIns="148695" bIns="156081" numCol="1" spcCol="1270" anchor="ctr" anchorCtr="0">
           <a:noAutofit/>
         </a:bodyPr>
         <a:lstStyle/>
         <a:p>
-          <a:pPr marL="0" lvl="0" indent="0" algn="ctr" defTabSz="1822450">
+          <a:pPr marL="0" lvl="0" indent="0" algn="ctr" defTabSz="2311400">
             <a:lnSpc>
               <a:spcPct val="90000"/>
             </a:lnSpc>
@@ -4473,40 +4523,40 @@
             <a:buNone/>
           </a:pPr>
           <a:r>
-            <a:rPr lang="en-US" sz="4100" kern="1200"/>
+            <a:rPr lang="en-US" sz="5200" kern="1200"/>
             <a:t>LLVM IR </a:t>
           </a:r>
         </a:p>
       </dsp:txBody>
       <dsp:txXfrm>
-        <a:off x="417351" y="4042629"/>
-        <a:ext cx="2434500" cy="1460700"/>
+        <a:off x="3740534" y="2524640"/>
+        <a:ext cx="3034531" cy="1820718"/>
       </dsp:txXfrm>
     </dsp:sp>
-    <dsp:sp modelId="{8680362E-92B7-7F4B-B1FA-34C7F423AAF0}">
+    <dsp:sp modelId="{841BFFC4-5AE5-984E-967E-8B0611A8E7D8}">
       <dsp:nvSpPr>
         <dsp:cNvPr id="0" name=""/>
         <dsp:cNvSpPr/>
       </dsp:nvSpPr>
       <dsp:spPr>
         <a:xfrm>
-          <a:off x="3411787" y="4042629"/>
-          <a:ext cx="2434500" cy="1460700"/>
+          <a:off x="7473007" y="2524640"/>
+          <a:ext cx="3034531" cy="1820718"/>
         </a:xfrm>
         <a:prstGeom prst="rect">
           <a:avLst/>
         </a:prstGeom>
         <a:solidFill>
-          <a:schemeClr val="dk2">
-            <a:hueOff val="0"/>
-            <a:satOff val="0"/>
-            <a:lumOff val="0"/>
+          <a:schemeClr val="accent5">
+            <a:hueOff val="-6758543"/>
+            <a:satOff val="-17419"/>
+            <a:lumOff val="-11765"/>
             <a:alphaOff val="0"/>
           </a:schemeClr>
         </a:solidFill>
         <a:ln w="12700" cap="flat" cmpd="sng" algn="ctr">
           <a:solidFill>
-            <a:schemeClr val="lt2">
+            <a:schemeClr val="lt1">
               <a:hueOff val="0"/>
               <a:satOff val="0"/>
               <a:lumOff val="0"/>
@@ -4533,12 +4583,12 @@
         </a:fontRef>
       </dsp:style>
       <dsp:txBody>
-        <a:bodyPr spcFirstLastPara="0" vert="horz" wrap="square" lIns="119293" tIns="125219" rIns="119293" bIns="125219" numCol="1" spcCol="1270" anchor="ctr" anchorCtr="0">
+        <a:bodyPr spcFirstLastPara="0" vert="horz" wrap="square" lIns="148695" tIns="156081" rIns="148695" bIns="156081" numCol="1" spcCol="1270" anchor="ctr" anchorCtr="0">
           <a:noAutofit/>
         </a:bodyPr>
         <a:lstStyle/>
         <a:p>
-          <a:pPr marL="0" lvl="0" indent="0" algn="ctr" defTabSz="1822450">
+          <a:pPr marL="0" lvl="0" indent="0" algn="ctr" defTabSz="2311400">
             <a:lnSpc>
               <a:spcPct val="90000"/>
             </a:lnSpc>
@@ -4551,14 +4601,14 @@
             <a:buNone/>
           </a:pPr>
           <a:r>
-            <a:rPr lang="en-US" sz="4100" kern="1200"/>
+            <a:rPr lang="en-US" sz="5200" kern="1200"/>
             <a:t>Native code </a:t>
           </a:r>
         </a:p>
       </dsp:txBody>
       <dsp:txXfrm>
-        <a:off x="3411787" y="4042629"/>
-        <a:ext cx="2434500" cy="1460700"/>
+        <a:off x="7473007" y="2524640"/>
+        <a:ext cx="3034531" cy="1820718"/>
       </dsp:txXfrm>
     </dsp:sp>
   </dsp:spTree>
@@ -5098,21 +5148,21 @@
       <dsp:cNvGrpSpPr/>
     </dsp:nvGrpSpPr>
     <dsp:grpSpPr/>
-    <dsp:sp modelId="{FDBF05B4-D36B-C149-B968-D2A2DE9F55BC}">
+    <dsp:sp modelId="{FDB3E8DD-F168-7448-8FF9-589400015950}">
       <dsp:nvSpPr>
         <dsp:cNvPr id="0" name=""/>
         <dsp:cNvSpPr/>
       </dsp:nvSpPr>
       <dsp:spPr>
         <a:xfrm rot="5400000">
-          <a:off x="3862548" y="-1373030"/>
-          <a:ext cx="1133404" cy="4168706"/>
+          <a:off x="6731621" y="-2839081"/>
+          <a:ext cx="837972" cy="6729984"/>
         </a:xfrm>
         <a:prstGeom prst="round2SameRect">
           <a:avLst/>
         </a:prstGeom>
         <a:solidFill>
-          <a:schemeClr val="accent2">
+          <a:schemeClr val="accent5">
             <a:tint val="40000"/>
             <a:alpha val="90000"/>
             <a:hueOff val="0"/>
@@ -5123,7 +5173,7 @@
         </a:solidFill>
         <a:ln w="12700" cap="flat" cmpd="sng" algn="ctr">
           <a:solidFill>
-            <a:schemeClr val="accent2">
+            <a:schemeClr val="accent5">
               <a:tint val="40000"/>
               <a:alpha val="90000"/>
               <a:hueOff val="0"/>
@@ -5150,12 +5200,12 @@
         <a:fontRef idx="minor"/>
       </dsp:style>
       <dsp:txBody>
-        <a:bodyPr spcFirstLastPara="0" vert="horz" wrap="square" lIns="49530" tIns="24765" rIns="49530" bIns="24765" numCol="1" spcCol="1270" anchor="ctr" anchorCtr="0">
+        <a:bodyPr spcFirstLastPara="0" vert="horz" wrap="square" lIns="57150" tIns="28575" rIns="57150" bIns="28575" numCol="1" spcCol="1270" anchor="ctr" anchorCtr="0">
           <a:noAutofit/>
         </a:bodyPr>
         <a:lstStyle/>
         <a:p>
-          <a:pPr marL="114300" lvl="1" indent="-114300" algn="l" defTabSz="577850">
+          <a:pPr marL="114300" lvl="1" indent="-114300" algn="l" defTabSz="666750">
             <a:lnSpc>
               <a:spcPct val="90000"/>
             </a:lnSpc>
@@ -5168,39 +5218,39 @@
             <a:buChar char="•"/>
           </a:pPr>
           <a:r>
-            <a:rPr lang="en-US" sz="1300" kern="1200" dirty="0"/>
+            <a:rPr lang="en-US" sz="1500" kern="1200" dirty="0"/>
             <a:t>Most </a:t>
           </a:r>
           <a:r>
-            <a:rPr lang="en-US" sz="1300" kern="1200" dirty="0" err="1"/>
+            <a:rPr lang="en-US" sz="1500" kern="1200" dirty="0" err="1"/>
             <a:t>usefull</a:t>
           </a:r>
           <a:r>
-            <a:rPr lang="en-US" sz="1300" kern="1200" dirty="0"/>
+            <a:rPr lang="en-US" sz="1500" kern="1200" dirty="0"/>
             <a:t> in unbalanced workloads. Dynamic scheduling with producer and consumer algorithms</a:t>
           </a:r>
         </a:p>
       </dsp:txBody>
       <dsp:txXfrm rot="-5400000">
-        <a:off x="2344897" y="199949"/>
-        <a:ext cx="4113378" cy="1022748"/>
+        <a:off x="3785615" y="147831"/>
+        <a:ext cx="6689078" cy="756160"/>
       </dsp:txXfrm>
     </dsp:sp>
-    <dsp:sp modelId="{C348B490-4758-2348-95D4-F47331E4A85A}">
+    <dsp:sp modelId="{F4A5664C-2AD6-2442-A594-6DBE4DA58A7D}">
       <dsp:nvSpPr>
         <dsp:cNvPr id="0" name=""/>
         <dsp:cNvSpPr/>
       </dsp:nvSpPr>
       <dsp:spPr>
         <a:xfrm>
-          <a:off x="0" y="2945"/>
-          <a:ext cx="2344897" cy="1416755"/>
+          <a:off x="0" y="2177"/>
+          <a:ext cx="3785616" cy="1047465"/>
         </a:xfrm>
         <a:prstGeom prst="roundRect">
           <a:avLst/>
         </a:prstGeom>
         <a:solidFill>
-          <a:schemeClr val="accent2">
+          <a:schemeClr val="accent5">
             <a:hueOff val="0"/>
             <a:satOff val="0"/>
             <a:lumOff val="0"/>
@@ -5236,12 +5286,12 @@
         </a:fontRef>
       </dsp:style>
       <dsp:txBody>
-        <a:bodyPr spcFirstLastPara="0" vert="horz" wrap="square" lIns="121920" tIns="60960" rIns="121920" bIns="60960" numCol="1" spcCol="1270" anchor="ctr" anchorCtr="0">
+        <a:bodyPr spcFirstLastPara="0" vert="horz" wrap="square" lIns="110490" tIns="55245" rIns="110490" bIns="55245" numCol="1" spcCol="1270" anchor="ctr" anchorCtr="0">
           <a:noAutofit/>
         </a:bodyPr>
         <a:lstStyle/>
         <a:p>
-          <a:pPr marL="0" lvl="0" indent="0" algn="ctr" defTabSz="1422400">
+          <a:pPr marL="0" lvl="0" indent="0" algn="ctr" defTabSz="1289050">
             <a:lnSpc>
               <a:spcPct val="90000"/>
             </a:lnSpc>
@@ -5254,47 +5304,47 @@
             <a:buNone/>
           </a:pPr>
           <a:r>
-            <a:rPr lang="en-US" sz="3200" kern="1200" dirty="0"/>
+            <a:rPr lang="en-US" sz="2900" kern="1200" dirty="0"/>
             <a:t>Coroutines</a:t>
           </a:r>
         </a:p>
       </dsp:txBody>
       <dsp:txXfrm>
-        <a:off x="69160" y="72105"/>
-        <a:ext cx="2206577" cy="1278435"/>
+        <a:off x="51133" y="53310"/>
+        <a:ext cx="3683350" cy="945199"/>
       </dsp:txXfrm>
     </dsp:sp>
-    <dsp:sp modelId="{BBBEA0E7-4147-C34B-9D66-877A2F2FBAC3}">
+    <dsp:sp modelId="{58D772C2-4F39-574C-8CAF-ECF9D0E587F1}">
       <dsp:nvSpPr>
         <dsp:cNvPr id="0" name=""/>
         <dsp:cNvSpPr/>
       </dsp:nvSpPr>
       <dsp:spPr>
         <a:xfrm rot="5400000">
-          <a:off x="3862548" y="114563"/>
-          <a:ext cx="1133404" cy="4168706"/>
+          <a:off x="6731621" y="-1739242"/>
+          <a:ext cx="837972" cy="6729984"/>
         </a:xfrm>
         <a:prstGeom prst="round2SameRect">
           <a:avLst/>
         </a:prstGeom>
         <a:solidFill>
-          <a:schemeClr val="accent2">
+          <a:schemeClr val="accent5">
             <a:tint val="40000"/>
             <a:alpha val="90000"/>
-            <a:hueOff val="-283075"/>
-            <a:satOff val="-25115"/>
-            <a:lumOff val="-256"/>
+            <a:hueOff val="-2246587"/>
+            <a:satOff val="-7611"/>
+            <a:lumOff val="-976"/>
             <a:alphaOff val="0"/>
           </a:schemeClr>
         </a:solidFill>
         <a:ln w="12700" cap="flat" cmpd="sng" algn="ctr">
           <a:solidFill>
-            <a:schemeClr val="accent2">
+            <a:schemeClr val="accent5">
               <a:tint val="40000"/>
               <a:alpha val="90000"/>
-              <a:hueOff val="-283075"/>
-              <a:satOff val="-25115"/>
-              <a:lumOff val="-256"/>
+              <a:hueOff val="-2246587"/>
+              <a:satOff val="-7611"/>
+              <a:lumOff val="-976"/>
               <a:alphaOff val="0"/>
             </a:schemeClr>
           </a:solidFill>
@@ -5316,12 +5366,12 @@
         <a:fontRef idx="minor"/>
       </dsp:style>
       <dsp:txBody>
-        <a:bodyPr spcFirstLastPara="0" vert="horz" wrap="square" lIns="49530" tIns="24765" rIns="49530" bIns="24765" numCol="1" spcCol="1270" anchor="ctr" anchorCtr="0">
+        <a:bodyPr spcFirstLastPara="0" vert="horz" wrap="square" lIns="57150" tIns="28575" rIns="57150" bIns="28575" numCol="1" spcCol="1270" anchor="ctr" anchorCtr="0">
           <a:noAutofit/>
         </a:bodyPr>
         <a:lstStyle/>
         <a:p>
-          <a:pPr marL="114300" lvl="1" indent="-114300" algn="l" defTabSz="577850">
+          <a:pPr marL="114300" lvl="1" indent="-114300" algn="l" defTabSz="666750">
             <a:lnSpc>
               <a:spcPct val="90000"/>
             </a:lnSpc>
@@ -5334,12 +5384,12 @@
             <a:buChar char="•"/>
           </a:pPr>
           <a:r>
-            <a:rPr lang="en-US" sz="1300" kern="1200" dirty="0"/>
+            <a:rPr lang="en-US" sz="1500" kern="1200" dirty="0"/>
             <a:t>@thread macro</a:t>
           </a:r>
         </a:p>
         <a:p>
-          <a:pPr marL="114300" lvl="1" indent="-114300" algn="l" defTabSz="577850">
+          <a:pPr marL="114300" lvl="1" indent="-114300" algn="l" defTabSz="666750">
             <a:lnSpc>
               <a:spcPct val="90000"/>
             </a:lnSpc>
@@ -5352,34 +5402,34 @@
             <a:buChar char="•"/>
           </a:pPr>
           <a:r>
-            <a:rPr lang="en-US" sz="1300" kern="1200" dirty="0"/>
+            <a:rPr lang="en-US" sz="1500" kern="1200" dirty="0"/>
             <a:t>Atomic operations -&gt; avoid race condition</a:t>
           </a:r>
         </a:p>
       </dsp:txBody>
       <dsp:txXfrm rot="-5400000">
-        <a:off x="2344897" y="1687542"/>
-        <a:ext cx="4113378" cy="1022748"/>
+        <a:off x="3785615" y="1247670"/>
+        <a:ext cx="6689078" cy="756160"/>
       </dsp:txXfrm>
     </dsp:sp>
-    <dsp:sp modelId="{A4EBBE77-BE75-574C-8FCD-5A1BDCEE059F}">
+    <dsp:sp modelId="{4300F195-D647-534F-9588-B126E5CDC85D}">
       <dsp:nvSpPr>
         <dsp:cNvPr id="0" name=""/>
         <dsp:cNvSpPr/>
       </dsp:nvSpPr>
       <dsp:spPr>
         <a:xfrm>
-          <a:off x="0" y="1490538"/>
-          <a:ext cx="2344897" cy="1416755"/>
+          <a:off x="0" y="1102016"/>
+          <a:ext cx="3785616" cy="1047465"/>
         </a:xfrm>
         <a:prstGeom prst="roundRect">
           <a:avLst/>
         </a:prstGeom>
         <a:solidFill>
-          <a:schemeClr val="accent2">
-            <a:hueOff val="-485121"/>
-            <a:satOff val="-27976"/>
-            <a:lumOff val="2876"/>
+          <a:schemeClr val="accent5">
+            <a:hueOff val="-2252848"/>
+            <a:satOff val="-5806"/>
+            <a:lumOff val="-3922"/>
             <a:alphaOff val="0"/>
           </a:schemeClr>
         </a:solidFill>
@@ -5412,12 +5462,12 @@
         </a:fontRef>
       </dsp:style>
       <dsp:txBody>
-        <a:bodyPr spcFirstLastPara="0" vert="horz" wrap="square" lIns="121920" tIns="60960" rIns="121920" bIns="60960" numCol="1" spcCol="1270" anchor="ctr" anchorCtr="0">
+        <a:bodyPr spcFirstLastPara="0" vert="horz" wrap="square" lIns="110490" tIns="55245" rIns="110490" bIns="55245" numCol="1" spcCol="1270" anchor="ctr" anchorCtr="0">
           <a:noAutofit/>
         </a:bodyPr>
         <a:lstStyle/>
         <a:p>
-          <a:pPr marL="0" lvl="0" indent="0" algn="ctr" defTabSz="1422400">
+          <a:pPr marL="0" lvl="0" indent="0" algn="ctr" defTabSz="1289050">
             <a:lnSpc>
               <a:spcPct val="90000"/>
             </a:lnSpc>
@@ -5430,47 +5480,47 @@
             <a:buNone/>
           </a:pPr>
           <a:r>
-            <a:rPr lang="en-US" sz="3200" kern="1200" dirty="0"/>
+            <a:rPr lang="en-US" sz="2900" kern="1200" dirty="0"/>
             <a:t>Multi-threading</a:t>
           </a:r>
         </a:p>
       </dsp:txBody>
       <dsp:txXfrm>
-        <a:off x="69160" y="1559698"/>
-        <a:ext cx="2206577" cy="1278435"/>
+        <a:off x="51133" y="1153149"/>
+        <a:ext cx="3683350" cy="945199"/>
       </dsp:txXfrm>
     </dsp:sp>
-    <dsp:sp modelId="{8463B778-1DDB-8E4F-B9A1-A6214970B0E1}">
+    <dsp:sp modelId="{BA5F3569-162A-614A-810F-34BC641FC633}">
       <dsp:nvSpPr>
         <dsp:cNvPr id="0" name=""/>
         <dsp:cNvSpPr/>
       </dsp:nvSpPr>
       <dsp:spPr>
         <a:xfrm rot="5400000">
-          <a:off x="3862548" y="1602156"/>
-          <a:ext cx="1133404" cy="4168706"/>
+          <a:off x="6731621" y="-639403"/>
+          <a:ext cx="837972" cy="6729984"/>
         </a:xfrm>
         <a:prstGeom prst="round2SameRect">
           <a:avLst/>
         </a:prstGeom>
         <a:solidFill>
-          <a:schemeClr val="accent2">
+          <a:schemeClr val="accent5">
             <a:tint val="40000"/>
             <a:alpha val="90000"/>
-            <a:hueOff val="-566151"/>
-            <a:satOff val="-50231"/>
-            <a:lumOff val="-513"/>
+            <a:hueOff val="-4493175"/>
+            <a:satOff val="-15221"/>
+            <a:lumOff val="-1952"/>
             <a:alphaOff val="0"/>
           </a:schemeClr>
         </a:solidFill>
         <a:ln w="12700" cap="flat" cmpd="sng" algn="ctr">
           <a:solidFill>
-            <a:schemeClr val="accent2">
+            <a:schemeClr val="accent5">
               <a:tint val="40000"/>
               <a:alpha val="90000"/>
-              <a:hueOff val="-566151"/>
-              <a:satOff val="-50231"/>
-              <a:lumOff val="-513"/>
+              <a:hueOff val="-4493175"/>
+              <a:satOff val="-15221"/>
+              <a:lumOff val="-1952"/>
               <a:alphaOff val="0"/>
             </a:schemeClr>
           </a:solidFill>
@@ -5492,12 +5542,12 @@
         <a:fontRef idx="minor"/>
       </dsp:style>
       <dsp:txBody>
-        <a:bodyPr spcFirstLastPara="0" vert="horz" wrap="square" lIns="49530" tIns="24765" rIns="49530" bIns="24765" numCol="1" spcCol="1270" anchor="ctr" anchorCtr="0">
+        <a:bodyPr spcFirstLastPara="0" vert="horz" wrap="square" lIns="57150" tIns="28575" rIns="57150" bIns="28575" numCol="1" spcCol="1270" anchor="ctr" anchorCtr="0">
           <a:noAutofit/>
         </a:bodyPr>
         <a:lstStyle/>
         <a:p>
-          <a:pPr marL="114300" lvl="1" indent="-114300" algn="l" defTabSz="577850">
+          <a:pPr marL="114300" lvl="1" indent="-114300" algn="l" defTabSz="666750">
             <a:lnSpc>
               <a:spcPct val="90000"/>
             </a:lnSpc>
@@ -5510,12 +5560,12 @@
             <a:buChar char="•"/>
           </a:pPr>
           <a:r>
-            <a:rPr lang="en-US" sz="1300" kern="1200"/>
+            <a:rPr lang="en-US" sz="1500" kern="1200"/>
             <a:t>Code availability and loading packages  </a:t>
           </a:r>
         </a:p>
         <a:p>
-          <a:pPr marL="114300" lvl="1" indent="-114300" algn="l" defTabSz="577850">
+          <a:pPr marL="114300" lvl="1" indent="-114300" algn="l" defTabSz="666750">
             <a:lnSpc>
               <a:spcPct val="90000"/>
             </a:lnSpc>
@@ -5528,34 +5578,34 @@
             <a:buChar char="•"/>
           </a:pPr>
           <a:r>
-            <a:rPr lang="en-US" sz="1300" kern="1200"/>
+            <a:rPr lang="en-US" sz="1500" kern="1200"/>
             <a:t>Data movement</a:t>
           </a:r>
         </a:p>
       </dsp:txBody>
       <dsp:txXfrm rot="-5400000">
-        <a:off x="2344897" y="3175135"/>
-        <a:ext cx="4113378" cy="1022748"/>
+        <a:off x="3785615" y="2347509"/>
+        <a:ext cx="6689078" cy="756160"/>
       </dsp:txXfrm>
     </dsp:sp>
-    <dsp:sp modelId="{E0755FB0-923B-CD40-96F6-31C3C4C3B293}">
+    <dsp:sp modelId="{8058C386-0673-9B46-A269-EC40E934911E}">
       <dsp:nvSpPr>
         <dsp:cNvPr id="0" name=""/>
         <dsp:cNvSpPr/>
       </dsp:nvSpPr>
       <dsp:spPr>
         <a:xfrm>
-          <a:off x="0" y="2978131"/>
-          <a:ext cx="2344897" cy="1416755"/>
+          <a:off x="0" y="2201855"/>
+          <a:ext cx="3785616" cy="1047465"/>
         </a:xfrm>
         <a:prstGeom prst="roundRect">
           <a:avLst/>
         </a:prstGeom>
         <a:solidFill>
-          <a:schemeClr val="accent2">
-            <a:hueOff val="-970242"/>
-            <a:satOff val="-55952"/>
-            <a:lumOff val="5752"/>
+          <a:schemeClr val="accent5">
+            <a:hueOff val="-4505695"/>
+            <a:satOff val="-11613"/>
+            <a:lumOff val="-7843"/>
             <a:alphaOff val="0"/>
           </a:schemeClr>
         </a:solidFill>
@@ -5588,12 +5638,12 @@
         </a:fontRef>
       </dsp:style>
       <dsp:txBody>
-        <a:bodyPr spcFirstLastPara="0" vert="horz" wrap="square" lIns="121920" tIns="60960" rIns="121920" bIns="60960" numCol="1" spcCol="1270" anchor="ctr" anchorCtr="0">
+        <a:bodyPr spcFirstLastPara="0" vert="horz" wrap="square" lIns="110490" tIns="55245" rIns="110490" bIns="55245" numCol="1" spcCol="1270" anchor="ctr" anchorCtr="0">
           <a:noAutofit/>
         </a:bodyPr>
         <a:lstStyle/>
         <a:p>
-          <a:pPr marL="0" lvl="0" indent="0" algn="ctr" defTabSz="1422400">
+          <a:pPr marL="0" lvl="0" indent="0" algn="ctr" defTabSz="1289050">
             <a:lnSpc>
               <a:spcPct val="90000"/>
             </a:lnSpc>
@@ -5606,47 +5656,47 @@
             <a:buNone/>
           </a:pPr>
           <a:r>
-            <a:rPr lang="en-US" sz="3200" kern="1200"/>
+            <a:rPr lang="en-US" sz="2900" kern="1200"/>
             <a:t>Distributed Computing</a:t>
           </a:r>
         </a:p>
       </dsp:txBody>
       <dsp:txXfrm>
-        <a:off x="69160" y="3047291"/>
-        <a:ext cx="2206577" cy="1278435"/>
+        <a:off x="51133" y="2252988"/>
+        <a:ext cx="3683350" cy="945199"/>
       </dsp:txXfrm>
     </dsp:sp>
-    <dsp:sp modelId="{C00F8C18-05EB-7F40-B33A-0737D27B4492}">
+    <dsp:sp modelId="{E6462D9A-7037-A149-BEBA-F1881C4FFC85}">
       <dsp:nvSpPr>
         <dsp:cNvPr id="0" name=""/>
         <dsp:cNvSpPr/>
       </dsp:nvSpPr>
       <dsp:spPr>
         <a:xfrm rot="5400000">
-          <a:off x="3862548" y="3089749"/>
-          <a:ext cx="1133404" cy="4168706"/>
+          <a:off x="6731621" y="460435"/>
+          <a:ext cx="837972" cy="6729984"/>
         </a:xfrm>
         <a:prstGeom prst="round2SameRect">
           <a:avLst/>
         </a:prstGeom>
         <a:solidFill>
-          <a:schemeClr val="accent2">
+          <a:schemeClr val="accent5">
             <a:tint val="40000"/>
             <a:alpha val="90000"/>
-            <a:hueOff val="-849226"/>
-            <a:satOff val="-75346"/>
-            <a:lumOff val="-769"/>
+            <a:hueOff val="-6739762"/>
+            <a:satOff val="-22832"/>
+            <a:lumOff val="-2928"/>
             <a:alphaOff val="0"/>
           </a:schemeClr>
         </a:solidFill>
         <a:ln w="12700" cap="flat" cmpd="sng" algn="ctr">
           <a:solidFill>
-            <a:schemeClr val="accent2">
+            <a:schemeClr val="accent5">
               <a:tint val="40000"/>
               <a:alpha val="90000"/>
-              <a:hueOff val="-849226"/>
-              <a:satOff val="-75346"/>
-              <a:lumOff val="-769"/>
+              <a:hueOff val="-6739762"/>
+              <a:satOff val="-22832"/>
+              <a:lumOff val="-2928"/>
               <a:alphaOff val="0"/>
             </a:schemeClr>
           </a:solidFill>
@@ -5668,12 +5718,12 @@
         <a:fontRef idx="minor"/>
       </dsp:style>
       <dsp:txBody>
-        <a:bodyPr spcFirstLastPara="0" vert="horz" wrap="square" lIns="49530" tIns="24765" rIns="49530" bIns="24765" numCol="1" spcCol="1270" anchor="ctr" anchorCtr="0">
+        <a:bodyPr spcFirstLastPara="0" vert="horz" wrap="square" lIns="57150" tIns="28575" rIns="57150" bIns="28575" numCol="1" spcCol="1270" anchor="ctr" anchorCtr="0">
           <a:noAutofit/>
         </a:bodyPr>
         <a:lstStyle/>
         <a:p>
-          <a:pPr marL="114300" lvl="1" indent="-114300" algn="l" defTabSz="577850">
+          <a:pPr marL="114300" lvl="1" indent="-114300" algn="l" defTabSz="666750">
             <a:lnSpc>
               <a:spcPct val="90000"/>
             </a:lnSpc>
@@ -5686,12 +5736,12 @@
             <a:buChar char="•"/>
           </a:pPr>
           <a:r>
-            <a:rPr lang="en-US" sz="1300" kern="1200"/>
+            <a:rPr lang="en-US" sz="1500" kern="1200"/>
             <a:t>CUDA and OpenCL support</a:t>
           </a:r>
         </a:p>
         <a:p>
-          <a:pPr marL="114300" lvl="1" indent="-114300" algn="l" defTabSz="577850">
+          <a:pPr marL="114300" lvl="1" indent="-114300" algn="l" defTabSz="666750">
             <a:lnSpc>
               <a:spcPct val="90000"/>
             </a:lnSpc>
@@ -5704,12 +5754,12 @@
             <a:buChar char="•"/>
           </a:pPr>
           <a:r>
-            <a:rPr lang="en-US" sz="1300" kern="1200"/>
+            <a:rPr lang="en-US" sz="1500" kern="1200"/>
             <a:t>Hands off approach: use existing library such as CuArrays or CLArrays </a:t>
           </a:r>
         </a:p>
         <a:p>
-          <a:pPr marL="114300" lvl="1" indent="-114300" algn="l" defTabSz="577850">
+          <a:pPr marL="114300" lvl="1" indent="-114300" algn="l" defTabSz="666750">
             <a:lnSpc>
               <a:spcPct val="90000"/>
             </a:lnSpc>
@@ -5722,34 +5772,34 @@
             <a:buChar char="•"/>
           </a:pPr>
           <a:r>
-            <a:rPr lang="en-US" sz="1300" kern="1200"/>
+            <a:rPr lang="en-US" sz="1500" kern="1200"/>
             <a:t>Hands on approach: write custom GPU kernel using CUDAnative and CUDAdrv</a:t>
           </a:r>
         </a:p>
       </dsp:txBody>
       <dsp:txXfrm rot="-5400000">
-        <a:off x="2344897" y="4662728"/>
-        <a:ext cx="4113378" cy="1022748"/>
+        <a:off x="3785615" y="3447347"/>
+        <a:ext cx="6689078" cy="756160"/>
       </dsp:txXfrm>
     </dsp:sp>
-    <dsp:sp modelId="{C1FE65BE-02DD-8147-BB71-65637701F9FD}">
+    <dsp:sp modelId="{EC2C3918-5D91-8949-A9EC-B1FD45B99AC1}">
       <dsp:nvSpPr>
         <dsp:cNvPr id="0" name=""/>
         <dsp:cNvSpPr/>
       </dsp:nvSpPr>
       <dsp:spPr>
         <a:xfrm>
-          <a:off x="0" y="4465725"/>
-          <a:ext cx="2344897" cy="1416755"/>
+          <a:off x="0" y="3301694"/>
+          <a:ext cx="3785616" cy="1047465"/>
         </a:xfrm>
         <a:prstGeom prst="roundRect">
           <a:avLst/>
         </a:prstGeom>
         <a:solidFill>
-          <a:schemeClr val="accent2">
-            <a:hueOff val="-1455363"/>
-            <a:satOff val="-83928"/>
-            <a:lumOff val="8628"/>
+          <a:schemeClr val="accent5">
+            <a:hueOff val="-6758543"/>
+            <a:satOff val="-17419"/>
+            <a:lumOff val="-11765"/>
             <a:alphaOff val="0"/>
           </a:schemeClr>
         </a:solidFill>
@@ -5782,12 +5832,12 @@
         </a:fontRef>
       </dsp:style>
       <dsp:txBody>
-        <a:bodyPr spcFirstLastPara="0" vert="horz" wrap="square" lIns="121920" tIns="60960" rIns="121920" bIns="60960" numCol="1" spcCol="1270" anchor="ctr" anchorCtr="0">
+        <a:bodyPr spcFirstLastPara="0" vert="horz" wrap="square" lIns="110490" tIns="55245" rIns="110490" bIns="55245" numCol="1" spcCol="1270" anchor="ctr" anchorCtr="0">
           <a:noAutofit/>
         </a:bodyPr>
         <a:lstStyle/>
         <a:p>
-          <a:pPr marL="0" lvl="0" indent="0" algn="ctr" defTabSz="1422400">
+          <a:pPr marL="0" lvl="0" indent="0" algn="ctr" defTabSz="1289050">
             <a:lnSpc>
               <a:spcPct val="90000"/>
             </a:lnSpc>
@@ -5800,14 +5850,14 @@
             <a:buNone/>
           </a:pPr>
           <a:r>
-            <a:rPr lang="en-US" sz="3200" kern="1200"/>
+            <a:rPr lang="en-US" sz="2900" kern="1200"/>
             <a:t>GPU</a:t>
           </a:r>
         </a:p>
       </dsp:txBody>
       <dsp:txXfrm>
-        <a:off x="69160" y="4534885"/>
-        <a:ext cx="2206577" cy="1278435"/>
+        <a:off x="51133" y="3352827"/>
+        <a:ext cx="3683350" cy="945199"/>
       </dsp:txXfrm>
     </dsp:sp>
   </dsp:spTree>
@@ -13154,6 +13204,248 @@
           <a:chExt cx="0" cy="0"/>
         </a:xfrm>
       </p:grpSpPr>
+      <p:grpSp>
+        <p:nvGrpSpPr>
+          <p:cNvPr id="8" name="Group 7">
+            <a:extLst>
+              <a:ext uri="{FF2B5EF4-FFF2-40B4-BE49-F238E27FC236}">
+                <a16:creationId xmlns:a16="http://schemas.microsoft.com/office/drawing/2014/main" id="{D2C4BFA1-2075-4901-9E24-E41D1FDD51FD}"/>
+              </a:ext>
+              <a:ext uri="{C183D7F6-B498-43B3-948B-1728B52AA6E4}">
+                <adec:decorative xmlns:adec="http://schemas.microsoft.com/office/drawing/2017/decorative" val="1"/>
+              </a:ext>
+            </a:extLst>
+          </p:cNvPr>
+          <p:cNvGrpSpPr>
+            <a:grpSpLocks noGrp="1" noUngrp="1" noRot="1" noChangeAspect="1" noMove="1" noResize="1"/>
+          </p:cNvGrpSpPr>
+          <p:nvPr>
+            <p:extLst>
+              <p:ext uri="{386F3935-93C4-4BCD-93E2-E3B085C9AB24}">
+                <p16:designElem xmlns:p16="http://schemas.microsoft.com/office/powerpoint/2015/main" val="1"/>
+              </p:ext>
+            </p:extLst>
+          </p:nvPr>
+        </p:nvGrpSpPr>
+        <p:grpSpPr>
+          <a:xfrm>
+            <a:off x="1155481" y="498348"/>
+            <a:ext cx="9902663" cy="5861304"/>
+            <a:chOff x="1155481" y="498348"/>
+            <a:chExt cx="9902663" cy="5861304"/>
+          </a:xfrm>
+        </p:grpSpPr>
+        <p:sp>
+          <p:nvSpPr>
+            <p:cNvPr id="9" name="Oval 5">
+              <a:extLst>
+                <a:ext uri="{FF2B5EF4-FFF2-40B4-BE49-F238E27FC236}">
+                  <a16:creationId xmlns:a16="http://schemas.microsoft.com/office/drawing/2014/main" id="{985A7375-E3AF-4F5C-85AE-17E8832952CA}"/>
+                </a:ext>
+                <a:ext uri="{C183D7F6-B498-43B3-948B-1728B52AA6E4}">
+                  <adec:decorative xmlns:adec="http://schemas.microsoft.com/office/drawing/2017/decorative" val="1"/>
+                </a:ext>
+              </a:extLst>
+            </p:cNvPr>
+            <p:cNvSpPr>
+              <a:spLocks noChangeArrowheads="1"/>
+            </p:cNvSpPr>
+            <p:nvPr>
+              <p:extLst>
+                <p:ext uri="{386F3935-93C4-4BCD-93E2-E3B085C9AB24}">
+                  <p16:designElem xmlns:p16="http://schemas.microsoft.com/office/powerpoint/2015/main" val="1"/>
+                </p:ext>
+              </p:extLst>
+            </p:nvPr>
+          </p:nvSpPr>
+          <p:spPr bwMode="auto">
+            <a:xfrm>
+              <a:off x="1155481" y="498348"/>
+              <a:ext cx="5861304" cy="5861304"/>
+            </a:xfrm>
+            <a:prstGeom prst="ellipse">
+              <a:avLst/>
+            </a:prstGeom>
+            <a:solidFill>
+              <a:schemeClr val="accent1">
+                <a:alpha val="55000"/>
+              </a:schemeClr>
+            </a:solidFill>
+            <a:ln>
+              <a:noFill/>
+            </a:ln>
+          </p:spPr>
+        </p:sp>
+        <p:sp>
+          <p:nvSpPr>
+            <p:cNvPr id="10" name="Oval 9">
+              <a:extLst>
+                <a:ext uri="{FF2B5EF4-FFF2-40B4-BE49-F238E27FC236}">
+                  <a16:creationId xmlns:a16="http://schemas.microsoft.com/office/drawing/2014/main" id="{F0307F65-8304-4FA8-A841-D4D7625411BE}"/>
+                </a:ext>
+                <a:ext uri="{C183D7F6-B498-43B3-948B-1728B52AA6E4}">
+                  <adec:decorative xmlns:adec="http://schemas.microsoft.com/office/drawing/2017/decorative" val="1"/>
+                </a:ext>
+              </a:extLst>
+            </p:cNvPr>
+            <p:cNvSpPr>
+              <a:spLocks noChangeArrowheads="1"/>
+            </p:cNvSpPr>
+            <p:nvPr>
+              <p:extLst>
+                <p:ext uri="{386F3935-93C4-4BCD-93E2-E3B085C9AB24}">
+                  <p16:designElem xmlns:p16="http://schemas.microsoft.com/office/powerpoint/2015/main" val="1"/>
+                </p:ext>
+              </p:extLst>
+            </p:nvPr>
+          </p:nvSpPr>
+          <p:spPr bwMode="auto">
+            <a:xfrm>
+              <a:off x="5196840" y="498348"/>
+              <a:ext cx="5861304" cy="5861304"/>
+            </a:xfrm>
+            <a:prstGeom prst="ellipse">
+              <a:avLst/>
+            </a:prstGeom>
+            <a:solidFill>
+              <a:schemeClr val="accent1">
+                <a:alpha val="55000"/>
+              </a:schemeClr>
+            </a:solidFill>
+            <a:ln>
+              <a:noFill/>
+            </a:ln>
+          </p:spPr>
+        </p:sp>
+        <p:sp>
+          <p:nvSpPr>
+            <p:cNvPr id="11" name="Oval 5">
+              <a:extLst>
+                <a:ext uri="{FF2B5EF4-FFF2-40B4-BE49-F238E27FC236}">
+                  <a16:creationId xmlns:a16="http://schemas.microsoft.com/office/drawing/2014/main" id="{C8B8394C-136F-4E05-A002-D93A5E79CD50}"/>
+                </a:ext>
+                <a:ext uri="{C183D7F6-B498-43B3-948B-1728B52AA6E4}">
+                  <adec:decorative xmlns:adec="http://schemas.microsoft.com/office/drawing/2017/decorative" val="1"/>
+                </a:ext>
+              </a:extLst>
+            </p:cNvPr>
+            <p:cNvSpPr>
+              <a:spLocks noChangeArrowheads="1"/>
+            </p:cNvSpPr>
+            <p:nvPr>
+              <p:extLst>
+                <p:ext uri="{386F3935-93C4-4BCD-93E2-E3B085C9AB24}">
+                  <p16:designElem xmlns:p16="http://schemas.microsoft.com/office/powerpoint/2015/main" val="1"/>
+                </p:ext>
+              </p:extLst>
+            </p:nvPr>
+          </p:nvSpPr>
+          <p:spPr bwMode="auto">
+            <a:xfrm>
+              <a:off x="3165348" y="498348"/>
+              <a:ext cx="5861304" cy="5861304"/>
+            </a:xfrm>
+            <a:prstGeom prst="ellipse">
+              <a:avLst/>
+            </a:prstGeom>
+            <a:solidFill>
+              <a:schemeClr val="accent1">
+                <a:alpha val="70000"/>
+              </a:schemeClr>
+            </a:solidFill>
+            <a:ln>
+              <a:noFill/>
+            </a:ln>
+          </p:spPr>
+        </p:sp>
+      </p:grpSp>
+      <p:sp>
+        <p:nvSpPr>
+          <p:cNvPr id="3" name="Subtitle 2">
+            <a:extLst>
+              <a:ext uri="{FF2B5EF4-FFF2-40B4-BE49-F238E27FC236}">
+                <a16:creationId xmlns:a16="http://schemas.microsoft.com/office/drawing/2014/main" id="{A376200D-4586-1F4C-9F37-7D161C402796}"/>
+              </a:ext>
+            </a:extLst>
+          </p:cNvPr>
+          <p:cNvSpPr>
+            <a:spLocks noGrp="1"/>
+          </p:cNvSpPr>
+          <p:nvPr>
+            <p:ph type="subTitle" idx="1"/>
+          </p:nvPr>
+        </p:nvSpPr>
+        <p:spPr>
+          <a:xfrm>
+            <a:off x="1524000" y="4495800"/>
+            <a:ext cx="9144000" cy="762000"/>
+          </a:xfrm>
+        </p:spPr>
+        <p:txBody>
+          <a:bodyPr>
+            <a:normAutofit/>
+          </a:bodyPr>
+          <a:lstStyle/>
+          <a:p>
+            <a:endParaRPr lang="en-US" sz="1800"/>
+          </a:p>
+        </p:txBody>
+      </p:sp>
+      <p:sp>
+        <p:nvSpPr>
+          <p:cNvPr id="13" name="Rectangle 12">
+            <a:extLst>
+              <a:ext uri="{FF2B5EF4-FFF2-40B4-BE49-F238E27FC236}">
+                <a16:creationId xmlns:a16="http://schemas.microsoft.com/office/drawing/2014/main" id="{053FB2EE-284F-4C87-AB3D-BBF87A9FAB97}"/>
+              </a:ext>
+              <a:ext uri="{C183D7F6-B498-43B3-948B-1728B52AA6E4}">
+                <adec:decorative xmlns:adec="http://schemas.microsoft.com/office/drawing/2017/decorative" val="1"/>
+              </a:ext>
+            </a:extLst>
+          </p:cNvPr>
+          <p:cNvSpPr>
+            <a:spLocks noGrp="1" noRot="1" noChangeAspect="1" noMove="1" noResize="1" noEditPoints="1" noAdjustHandles="1" noChangeArrowheads="1" noChangeShapeType="1" noTextEdit="1"/>
+          </p:cNvSpPr>
+          <p:nvPr>
+            <p:extLst>
+              <p:ext uri="{386F3935-93C4-4BCD-93E2-E3B085C9AB24}">
+                <p16:designElem xmlns:p16="http://schemas.microsoft.com/office/powerpoint/2015/main" val="1"/>
+              </p:ext>
+            </p:extLst>
+          </p:nvPr>
+        </p:nvSpPr>
+        <p:spPr>
+          <a:xfrm>
+            <a:off x="0" y="2514600"/>
+            <a:ext cx="12192000" cy="1828800"/>
+          </a:xfrm>
+          <a:prstGeom prst="rect">
+            <a:avLst/>
+          </a:prstGeom>
+          <a:solidFill>
+            <a:schemeClr val="tx2"/>
+          </a:solidFill>
+          <a:ln>
+            <a:noFill/>
+          </a:ln>
+        </p:spPr>
+        <p:style>
+          <a:lnRef idx="2">
+            <a:schemeClr val="accent1">
+              <a:shade val="50000"/>
+            </a:schemeClr>
+          </a:lnRef>
+          <a:fillRef idx="1">
+            <a:schemeClr val="accent1"/>
+          </a:fillRef>
+          <a:effectRef idx="0">
+            <a:schemeClr val="accent1"/>
+          </a:effectRef>
+          <a:fontRef idx="minor">
+            <a:schemeClr val="lt1"/>
+          </a:fontRef>
+        </p:style>
+      </p:sp>
       <p:sp>
         <p:nvSpPr>
           <p:cNvPr id="2" name="Title 1">
@@ -13190,38 +13482,6 @@
               </a:rPr>
               <a:t>Why is Julia fast and flexible</a:t>
             </a:r>
-          </a:p>
-        </p:txBody>
-      </p:sp>
-      <p:sp>
-        <p:nvSpPr>
-          <p:cNvPr id="3" name="Subtitle 2">
-            <a:extLst>
-              <a:ext uri="{FF2B5EF4-FFF2-40B4-BE49-F238E27FC236}">
-                <a16:creationId xmlns:a16="http://schemas.microsoft.com/office/drawing/2014/main" id="{A376200D-4586-1F4C-9F37-7D161C402796}"/>
-              </a:ext>
-            </a:extLst>
-          </p:cNvPr>
-          <p:cNvSpPr>
-            <a:spLocks noGrp="1"/>
-          </p:cNvSpPr>
-          <p:nvPr>
-            <p:ph type="subTitle" idx="1"/>
-          </p:nvPr>
-        </p:nvSpPr>
-        <p:spPr>
-          <a:xfrm>
-            <a:off x="1524000" y="4495800"/>
-            <a:ext cx="9144000" cy="762000"/>
-          </a:xfrm>
-        </p:spPr>
-        <p:txBody>
-          <a:bodyPr>
-            <a:normAutofit/>
-          </a:bodyPr>
-          <a:lstStyle/>
-          <a:p>
-            <a:endParaRPr lang="en-US" sz="1800"/>
           </a:p>
         </p:txBody>
       </p:sp>
@@ -13386,6 +13646,67 @@
       </p:grpSpPr>
       <p:sp>
         <p:nvSpPr>
+          <p:cNvPr id="11" name="Rectangle 10">
+            <a:extLst>
+              <a:ext uri="{FF2B5EF4-FFF2-40B4-BE49-F238E27FC236}">
+                <a16:creationId xmlns:a16="http://schemas.microsoft.com/office/drawing/2014/main" id="{867D4867-5BA7-4462-B2F6-A23F4A622AA7}"/>
+              </a:ext>
+              <a:ext uri="{C183D7F6-B498-43B3-948B-1728B52AA6E4}">
+                <adec:decorative xmlns:adec="http://schemas.microsoft.com/office/drawing/2017/decorative" val="1"/>
+              </a:ext>
+            </a:extLst>
+          </p:cNvPr>
+          <p:cNvSpPr>
+            <a:spLocks noGrp="1" noRot="1" noChangeAspect="1" noMove="1" noResize="1" noEditPoints="1" noAdjustHandles="1" noChangeArrowheads="1" noChangeShapeType="1" noTextEdit="1"/>
+          </p:cNvSpPr>
+          <p:nvPr>
+            <p:extLst>
+              <p:ext uri="{386F3935-93C4-4BCD-93E2-E3B085C9AB24}">
+                <p16:designElem xmlns:p16="http://schemas.microsoft.com/office/powerpoint/2015/main" val="1"/>
+              </p:ext>
+            </p:extLst>
+          </p:nvPr>
+        </p:nvSpPr>
+        <p:spPr>
+          <a:xfrm>
+            <a:off x="0" y="0"/>
+            <a:ext cx="4654296" cy="6858000"/>
+          </a:xfrm>
+          <a:prstGeom prst="rect">
+            <a:avLst/>
+          </a:prstGeom>
+          <a:solidFill>
+            <a:srgbClr val="3F3F3F"/>
+          </a:solidFill>
+          <a:ln>
+            <a:noFill/>
+          </a:ln>
+        </p:spPr>
+        <p:style>
+          <a:lnRef idx="0">
+            <a:scrgbClr r="0" g="0" b="0"/>
+          </a:lnRef>
+          <a:fillRef idx="0">
+            <a:scrgbClr r="0" g="0" b="0"/>
+          </a:fillRef>
+          <a:effectRef idx="0">
+            <a:scrgbClr r="0" g="0" b="0"/>
+          </a:effectRef>
+          <a:fontRef idx="minor">
+            <a:schemeClr val="lt1"/>
+          </a:fontRef>
+        </p:style>
+        <p:txBody>
+          <a:bodyPr rtlCol="0" anchor="ctr"/>
+          <a:lstStyle/>
+          <a:p>
+            <a:pPr algn="ctr"/>
+            <a:endParaRPr lang="en-US" dirty="0"/>
+          </a:p>
+        </p:txBody>
+      </p:sp>
+      <p:sp>
+        <p:nvSpPr>
           <p:cNvPr id="2" name="Title 1">
             <a:extLst>
               <a:ext uri="{FF2B5EF4-FFF2-40B4-BE49-F238E27FC236}">
@@ -13430,41 +13751,17 @@
               </a:rPr>
               <a:t>Interpreted Language</a:t>
             </a:r>
+            <a:endParaRPr lang="en-US" sz="2800" kern="1200" dirty="0">
+              <a:solidFill>
+                <a:schemeClr val="tx1"/>
+              </a:solidFill>
+              <a:latin typeface="+mj-lt"/>
+              <a:ea typeface="+mj-ea"/>
+              <a:cs typeface="+mj-cs"/>
+            </a:endParaRPr>
           </a:p>
         </p:txBody>
       </p:sp>
-      <p:pic>
-        <p:nvPicPr>
-          <p:cNvPr id="5" name="Content Placeholder 4" descr="A view of a city street filled with lots of traffic&#10;&#10;Description automatically generated">
-            <a:extLst>
-              <a:ext uri="{FF2B5EF4-FFF2-40B4-BE49-F238E27FC236}">
-                <a16:creationId xmlns:a16="http://schemas.microsoft.com/office/drawing/2014/main" id="{0FF79CD5-FDF3-1C48-98C9-6899C29793D8}"/>
-              </a:ext>
-            </a:extLst>
-          </p:cNvPr>
-          <p:cNvPicPr>
-            <a:picLocks noGrp="1" noChangeAspect="1"/>
-          </p:cNvPicPr>
-          <p:nvPr>
-            <p:ph idx="1"/>
-          </p:nvPr>
-        </p:nvPicPr>
-        <p:blipFill>
-          <a:blip r:embed="rId2"/>
-          <a:stretch>
-            <a:fillRect/>
-          </a:stretch>
-        </p:blipFill>
-        <p:spPr>
-          <a:xfrm>
-            <a:off x="5297763" y="1004528"/>
-            <a:ext cx="6250769" cy="4688076"/>
-          </a:xfrm>
-          <a:prstGeom prst="rect">
-            <a:avLst/>
-          </a:prstGeom>
-        </p:spPr>
-      </p:pic>
       <p:sp>
         <p:nvSpPr>
           <p:cNvPr id="6" name="Content Placeholder 2">
@@ -13657,55 +13954,133 @@
             </a:lvl9pPr>
           </a:lstStyle>
           <a:p>
-            <a:endParaRPr lang="en-US" sz="2000" dirty="0"/>
+            <a:endParaRPr lang="en-US" sz="2000" kern="1200">
+              <a:solidFill>
+                <a:schemeClr val="tx1"/>
+              </a:solidFill>
+              <a:latin typeface="+mn-lt"/>
+              <a:ea typeface="+mn-ea"/>
+              <a:cs typeface="+mn-cs"/>
+            </a:endParaRPr>
           </a:p>
           <a:p>
             <a:r>
-              <a:rPr lang="en-US" sz="2000" dirty="0"/>
+              <a:rPr lang="en-US" sz="2000" kern="1200">
+                <a:solidFill>
+                  <a:schemeClr val="tx1"/>
+                </a:solidFill>
+                <a:latin typeface="+mn-lt"/>
+                <a:ea typeface="+mn-ea"/>
+                <a:cs typeface="+mn-cs"/>
+              </a:rPr>
               <a:t>Interpreted line by line</a:t>
             </a:r>
           </a:p>
           <a:p>
             <a:r>
-              <a:rPr lang="en-US" sz="2000" dirty="0"/>
+              <a:rPr lang="en-US" sz="2000" kern="1200">
+                <a:solidFill>
+                  <a:schemeClr val="tx1"/>
+                </a:solidFill>
+                <a:latin typeface="+mn-lt"/>
+                <a:ea typeface="+mn-ea"/>
+                <a:cs typeface="+mn-cs"/>
+              </a:rPr>
               <a:t>Dynamic variable type</a:t>
             </a:r>
           </a:p>
           <a:p>
-            <a:endParaRPr lang="en-US" sz="2000" dirty="0"/>
+            <a:endParaRPr lang="en-US" sz="2000" kern="1200">
+              <a:solidFill>
+                <a:schemeClr val="tx1"/>
+              </a:solidFill>
+              <a:latin typeface="+mn-lt"/>
+              <a:ea typeface="+mn-ea"/>
+              <a:cs typeface="+mn-cs"/>
+            </a:endParaRPr>
           </a:p>
           <a:p>
             <a:r>
-              <a:rPr lang="en-US" sz="2000" dirty="0"/>
+              <a:rPr lang="en-US" sz="2000" kern="1200">
+                <a:solidFill>
+                  <a:schemeClr val="tx1"/>
+                </a:solidFill>
+                <a:latin typeface="+mn-lt"/>
+                <a:ea typeface="+mn-ea"/>
+                <a:cs typeface="+mn-cs"/>
+              </a:rPr>
               <a:t>Adaptive data structure</a:t>
             </a:r>
           </a:p>
           <a:p>
             <a:r>
-              <a:rPr lang="en-US" sz="2000" dirty="0"/>
+              <a:rPr lang="en-US" sz="2000" kern="1200">
+                <a:solidFill>
+                  <a:schemeClr val="tx1"/>
+                </a:solidFill>
+                <a:latin typeface="+mn-lt"/>
+                <a:ea typeface="+mn-ea"/>
+                <a:cs typeface="+mn-cs"/>
+              </a:rPr>
               <a:t>Quick to debug and revise</a:t>
             </a:r>
           </a:p>
           <a:p>
-            <a:endParaRPr lang="en-US" sz="2000" dirty="0"/>
+            <a:endParaRPr lang="en-US" sz="2000" kern="1200">
+              <a:solidFill>
+                <a:schemeClr val="tx1"/>
+              </a:solidFill>
+              <a:latin typeface="+mn-lt"/>
+              <a:ea typeface="+mn-ea"/>
+              <a:cs typeface="+mn-cs"/>
+            </a:endParaRPr>
           </a:p>
           <a:p>
             <a:r>
-              <a:rPr lang="en-US" sz="2000" dirty="0"/>
+              <a:rPr lang="en-US" sz="2000" kern="1200">
+                <a:solidFill>
+                  <a:schemeClr val="tx1"/>
+                </a:solidFill>
+                <a:latin typeface="+mn-lt"/>
+                <a:ea typeface="+mn-ea"/>
+                <a:cs typeface="+mn-cs"/>
+              </a:rPr>
               <a:t>Repetitive interpretation</a:t>
             </a:r>
           </a:p>
           <a:p>
-            <a:pPr marL="0" indent="0">
-              <a:buNone/>
-            </a:pPr>
-            <a:endParaRPr lang="en-US" sz="2000" dirty="0"/>
+            <a:pPr marL="0"/>
+            <a:endParaRPr lang="en-US" sz="2000" kern="1200">
+              <a:solidFill>
+                <a:schemeClr val="tx1"/>
+              </a:solidFill>
+              <a:latin typeface="+mn-lt"/>
+              <a:ea typeface="+mn-ea"/>
+              <a:cs typeface="+mn-cs"/>
+            </a:endParaRPr>
           </a:p>
           <a:p>
-            <a:endParaRPr lang="en-US" sz="2000" dirty="0"/>
+            <a:endParaRPr lang="en-US" sz="2000" kern="1200">
+              <a:solidFill>
+                <a:schemeClr val="tx1"/>
+              </a:solidFill>
+              <a:latin typeface="+mn-lt"/>
+              <a:ea typeface="+mn-ea"/>
+              <a:cs typeface="+mn-cs"/>
+            </a:endParaRPr>
           </a:p>
           <a:p>
-            <a:endParaRPr lang="en-US" sz="2000" kern="1200" dirty="0">
+            <a:endParaRPr lang="en-US" sz="2000" kern="1200">
+              <a:solidFill>
+                <a:schemeClr val="tx1"/>
+              </a:solidFill>
+              <a:latin typeface="+mn-lt"/>
+              <a:ea typeface="+mn-ea"/>
+              <a:cs typeface="+mn-cs"/>
+            </a:endParaRPr>
+          </a:p>
+          <a:p>
+            <a:endParaRPr lang="en-US" sz="2000" kern="1200">
               <a:solidFill>
                 <a:schemeClr val="tx1"/>
               </a:solidFill>
@@ -13724,15 +14099,69 @@
               <a:cs typeface="+mn-cs"/>
             </a:endParaRPr>
           </a:p>
+        </p:txBody>
+      </p:sp>
+      <p:pic>
+        <p:nvPicPr>
+          <p:cNvPr id="5" name="Content Placeholder 4" descr="A view of a city street filled with lots of traffic&#10;&#10;Description automatically generated">
+            <a:extLst>
+              <a:ext uri="{FF2B5EF4-FFF2-40B4-BE49-F238E27FC236}">
+                <a16:creationId xmlns:a16="http://schemas.microsoft.com/office/drawing/2014/main" id="{0FF79CD5-FDF3-1C48-98C9-6899C29793D8}"/>
+              </a:ext>
+            </a:extLst>
+          </p:cNvPr>
+          <p:cNvPicPr>
+            <a:picLocks noGrp="1" noChangeAspect="1"/>
+          </p:cNvPicPr>
+          <p:nvPr>
+            <p:ph idx="1"/>
+          </p:nvPr>
+        </p:nvPicPr>
+        <p:blipFill>
+          <a:blip r:embed="rId2"/>
+          <a:stretch>
+            <a:fillRect/>
+          </a:stretch>
+        </p:blipFill>
+        <p:spPr>
+          <a:xfrm>
+            <a:off x="5297763" y="1004528"/>
+            <a:ext cx="6250769" cy="4688076"/>
+          </a:xfrm>
+          <a:prstGeom prst="rect">
+            <a:avLst/>
+          </a:prstGeom>
+        </p:spPr>
+      </p:pic>
+      <p:sp>
+        <p:nvSpPr>
+          <p:cNvPr id="3" name="TextBox 2">
+            <a:extLst>
+              <a:ext uri="{FF2B5EF4-FFF2-40B4-BE49-F238E27FC236}">
+                <a16:creationId xmlns:a16="http://schemas.microsoft.com/office/drawing/2014/main" id="{EA0A0326-ACA3-394B-A5A1-9CA936994CCB}"/>
+              </a:ext>
+            </a:extLst>
+          </p:cNvPr>
+          <p:cNvSpPr txBox="1"/>
+          <p:nvPr/>
+        </p:nvSpPr>
+        <p:spPr>
+          <a:xfrm>
+            <a:off x="2497873" y="1862254"/>
+            <a:ext cx="184731" cy="369332"/>
+          </a:xfrm>
+          <a:prstGeom prst="rect">
+            <a:avLst/>
+          </a:prstGeom>
+          <a:noFill/>
+        </p:spPr>
+        <p:txBody>
+          <a:bodyPr wrap="none" rtlCol="0">
+            <a:spAutoFit/>
+          </a:bodyPr>
+          <a:lstStyle/>
           <a:p>
-            <a:endParaRPr lang="en-US" sz="2000" kern="1200" dirty="0">
-              <a:solidFill>
-                <a:schemeClr val="tx1"/>
-              </a:solidFill>
-              <a:latin typeface="+mn-lt"/>
-              <a:ea typeface="+mn-ea"/>
-              <a:cs typeface="+mn-cs"/>
-            </a:endParaRPr>
+            <a:endParaRPr lang="en-US" dirty="0"/>
           </a:p>
         </p:txBody>
       </p:sp>
@@ -13774,6 +14203,67 @@
           <a:chExt cx="0" cy="0"/>
         </a:xfrm>
       </p:grpSpPr>
+      <p:sp>
+        <p:nvSpPr>
+          <p:cNvPr id="11" name="Rectangle 10">
+            <a:extLst>
+              <a:ext uri="{FF2B5EF4-FFF2-40B4-BE49-F238E27FC236}">
+                <a16:creationId xmlns:a16="http://schemas.microsoft.com/office/drawing/2014/main" id="{867D4867-5BA7-4462-B2F6-A23F4A622AA7}"/>
+              </a:ext>
+              <a:ext uri="{C183D7F6-B498-43B3-948B-1728B52AA6E4}">
+                <adec:decorative xmlns:adec="http://schemas.microsoft.com/office/drawing/2017/decorative" val="1"/>
+              </a:ext>
+            </a:extLst>
+          </p:cNvPr>
+          <p:cNvSpPr>
+            <a:spLocks noGrp="1" noRot="1" noChangeAspect="1" noMove="1" noResize="1" noEditPoints="1" noAdjustHandles="1" noChangeArrowheads="1" noChangeShapeType="1" noTextEdit="1"/>
+          </p:cNvSpPr>
+          <p:nvPr>
+            <p:extLst>
+              <p:ext uri="{386F3935-93C4-4BCD-93E2-E3B085C9AB24}">
+                <p16:designElem xmlns:p16="http://schemas.microsoft.com/office/powerpoint/2015/main" val="1"/>
+              </p:ext>
+            </p:extLst>
+          </p:nvPr>
+        </p:nvSpPr>
+        <p:spPr>
+          <a:xfrm>
+            <a:off x="0" y="0"/>
+            <a:ext cx="4654296" cy="6858000"/>
+          </a:xfrm>
+          <a:prstGeom prst="rect">
+            <a:avLst/>
+          </a:prstGeom>
+          <a:solidFill>
+            <a:srgbClr val="3F3F3F"/>
+          </a:solidFill>
+          <a:ln>
+            <a:noFill/>
+          </a:ln>
+        </p:spPr>
+        <p:style>
+          <a:lnRef idx="0">
+            <a:scrgbClr r="0" g="0" b="0"/>
+          </a:lnRef>
+          <a:fillRef idx="0">
+            <a:scrgbClr r="0" g="0" b="0"/>
+          </a:fillRef>
+          <a:effectRef idx="0">
+            <a:scrgbClr r="0" g="0" b="0"/>
+          </a:effectRef>
+          <a:fontRef idx="minor">
+            <a:schemeClr val="lt1"/>
+          </a:fontRef>
+        </p:style>
+        <p:txBody>
+          <a:bodyPr rtlCol="0" anchor="ctr"/>
+          <a:lstStyle/>
+          <a:p>
+            <a:pPr algn="ctr"/>
+            <a:endParaRPr lang="en-US" dirty="0"/>
+          </a:p>
+        </p:txBody>
+      </p:sp>
       <p:sp>
         <p:nvSpPr>
           <p:cNvPr id="2" name="Title 1">
@@ -13823,38 +14313,6 @@
           </a:p>
         </p:txBody>
       </p:sp>
-      <p:pic>
-        <p:nvPicPr>
-          <p:cNvPr id="5" name="Content Placeholder 4" descr="A close up of a street sign on a highway&#10;&#10;Description automatically generated">
-            <a:extLst>
-              <a:ext uri="{FF2B5EF4-FFF2-40B4-BE49-F238E27FC236}">
-                <a16:creationId xmlns:a16="http://schemas.microsoft.com/office/drawing/2014/main" id="{D2A17715-ED77-6F4F-9CF3-BC84C32FA97F}"/>
-              </a:ext>
-            </a:extLst>
-          </p:cNvPr>
-          <p:cNvPicPr>
-            <a:picLocks noGrp="1" noChangeAspect="1"/>
-          </p:cNvPicPr>
-          <p:nvPr>
-            <p:ph idx="1"/>
-          </p:nvPr>
-        </p:nvPicPr>
-        <p:blipFill>
-          <a:blip r:embed="rId2"/>
-          <a:stretch>
-            <a:fillRect/>
-          </a:stretch>
-        </p:blipFill>
-        <p:spPr>
-          <a:xfrm>
-            <a:off x="5297763" y="1317067"/>
-            <a:ext cx="6250769" cy="4062999"/>
-          </a:xfrm>
-          <a:prstGeom prst="rect">
-            <a:avLst/>
-          </a:prstGeom>
-        </p:spPr>
-      </p:pic>
       <p:sp>
         <p:nvSpPr>
           <p:cNvPr id="6" name="Content Placeholder 2">
@@ -13880,7 +14338,7 @@
         </p:spPr>
         <p:txBody>
           <a:bodyPr vert="horz" lIns="91440" tIns="45720" rIns="91440" bIns="45720" rtlCol="0">
-            <a:normAutofit lnSpcReduction="10000"/>
+            <a:normAutofit/>
           </a:bodyPr>
           <a:lstStyle>
             <a:lvl1pPr marL="228600" indent="-228600" algn="l" defTabSz="914400" rtl="0" eaLnBrk="1" latinLnBrk="0" hangingPunct="1">
@@ -14048,41 +14506,32 @@
           </a:lstStyle>
           <a:p>
             <a:r>
-              <a:rPr lang="en-US" sz="2000" dirty="0"/>
+              <a:rPr lang="en-US" sz="1700" kern="1200">
+                <a:solidFill>
+                  <a:schemeClr val="tx1"/>
+                </a:solidFill>
+                <a:latin typeface="+mn-lt"/>
+                <a:ea typeface="+mn-ea"/>
+                <a:cs typeface="+mn-cs"/>
+              </a:rPr>
               <a:t>Compile ahead of time to machine code</a:t>
             </a:r>
           </a:p>
           <a:p>
             <a:r>
-              <a:rPr lang="en-US" sz="2000" dirty="0"/>
+              <a:rPr lang="en-US" sz="1700" kern="1200">
+                <a:solidFill>
+                  <a:schemeClr val="tx1"/>
+                </a:solidFill>
+                <a:latin typeface="+mn-lt"/>
+                <a:ea typeface="+mn-ea"/>
+                <a:cs typeface="+mn-cs"/>
+              </a:rPr>
               <a:t>Require type information</a:t>
             </a:r>
           </a:p>
           <a:p>
-            <a:endParaRPr lang="en-US" sz="2000" dirty="0"/>
-          </a:p>
-          <a:p>
-            <a:r>
-              <a:rPr lang="en-US" sz="2000" dirty="0"/>
-              <a:t>Provide compiler optimizations</a:t>
-            </a:r>
-          </a:p>
-          <a:p>
-            <a:r>
-              <a:rPr lang="en-US" sz="2000" dirty="0"/>
-              <a:t>Fast runtime after compilation</a:t>
-            </a:r>
-            <a:endParaRPr lang="en-US" sz="2000" kern="1200" dirty="0">
-              <a:solidFill>
-                <a:schemeClr val="tx1"/>
-              </a:solidFill>
-              <a:latin typeface="+mn-lt"/>
-              <a:ea typeface="+mn-ea"/>
-              <a:cs typeface="+mn-cs"/>
-            </a:endParaRPr>
-          </a:p>
-          <a:p>
-            <a:endParaRPr lang="en-US" sz="2000" kern="1200" dirty="0">
+            <a:endParaRPr lang="en-US" sz="1700" kern="1200">
               <a:solidFill>
                 <a:schemeClr val="tx1"/>
               </a:solidFill>
@@ -14093,7 +14542,43 @@
           </a:p>
           <a:p>
             <a:r>
-              <a:rPr lang="en-US" sz="2000" kern="1200" dirty="0">
+              <a:rPr lang="en-US" sz="1700" kern="1200">
+                <a:solidFill>
+                  <a:schemeClr val="tx1"/>
+                </a:solidFill>
+                <a:latin typeface="+mn-lt"/>
+                <a:ea typeface="+mn-ea"/>
+                <a:cs typeface="+mn-cs"/>
+              </a:rPr>
+              <a:t>Provide compiler optimizations</a:t>
+            </a:r>
+          </a:p>
+          <a:p>
+            <a:r>
+              <a:rPr lang="en-US" sz="1700" kern="1200">
+                <a:solidFill>
+                  <a:schemeClr val="tx1"/>
+                </a:solidFill>
+                <a:latin typeface="+mn-lt"/>
+                <a:ea typeface="+mn-ea"/>
+                <a:cs typeface="+mn-cs"/>
+              </a:rPr>
+              <a:t>Fast runtime after compilation</a:t>
+            </a:r>
+          </a:p>
+          <a:p>
+            <a:endParaRPr lang="en-US" sz="1700" kern="1200">
+              <a:solidFill>
+                <a:schemeClr val="tx1"/>
+              </a:solidFill>
+              <a:latin typeface="+mn-lt"/>
+              <a:ea typeface="+mn-ea"/>
+              <a:cs typeface="+mn-cs"/>
+            </a:endParaRPr>
+          </a:p>
+          <a:p>
+            <a:r>
+              <a:rPr lang="en-US" sz="1700" kern="1200">
                 <a:solidFill>
                   <a:schemeClr val="tx1"/>
                 </a:solidFill>
@@ -14105,7 +14590,7 @@
             </a:r>
           </a:p>
           <a:p>
-            <a:endParaRPr lang="en-US" sz="2000" kern="1200" dirty="0">
+            <a:endParaRPr lang="en-US" sz="1700" kern="1200">
               <a:solidFill>
                 <a:schemeClr val="tx1"/>
               </a:solidFill>
@@ -14116,6 +14601,38 @@
           </a:p>
         </p:txBody>
       </p:sp>
+      <p:pic>
+        <p:nvPicPr>
+          <p:cNvPr id="5" name="Content Placeholder 4" descr="A close up of a street sign on a highway&#10;&#10;Description automatically generated">
+            <a:extLst>
+              <a:ext uri="{FF2B5EF4-FFF2-40B4-BE49-F238E27FC236}">
+                <a16:creationId xmlns:a16="http://schemas.microsoft.com/office/drawing/2014/main" id="{D2A17715-ED77-6F4F-9CF3-BC84C32FA97F}"/>
+              </a:ext>
+            </a:extLst>
+          </p:cNvPr>
+          <p:cNvPicPr>
+            <a:picLocks noGrp="1" noChangeAspect="1"/>
+          </p:cNvPicPr>
+          <p:nvPr>
+            <p:ph idx="1"/>
+          </p:nvPr>
+        </p:nvPicPr>
+        <p:blipFill>
+          <a:blip r:embed="rId2"/>
+          <a:stretch>
+            <a:fillRect/>
+          </a:stretch>
+        </p:blipFill>
+        <p:spPr>
+          <a:xfrm>
+            <a:off x="5297763" y="1317067"/>
+            <a:ext cx="6250769" cy="4062999"/>
+          </a:xfrm>
+          <a:prstGeom prst="rect">
+            <a:avLst/>
+          </a:prstGeom>
+        </p:spPr>
+      </p:pic>
     </p:spTree>
     <p:extLst>
       <p:ext uri="{BB962C8B-B14F-4D97-AF65-F5344CB8AC3E}">
@@ -14154,6 +14671,71 @@
           <a:chExt cx="0" cy="0"/>
         </a:xfrm>
       </p:grpSpPr>
+      <p:sp>
+        <p:nvSpPr>
+          <p:cNvPr id="55" name="Rectangle 54">
+            <a:extLst>
+              <a:ext uri="{FF2B5EF4-FFF2-40B4-BE49-F238E27FC236}">
+                <a16:creationId xmlns:a16="http://schemas.microsoft.com/office/drawing/2014/main" id="{8D70B121-56F4-4848-B38B-182089D909FA}"/>
+              </a:ext>
+              <a:ext uri="{C183D7F6-B498-43B3-948B-1728B52AA6E4}">
+                <adec:decorative xmlns:adec="http://schemas.microsoft.com/office/drawing/2017/decorative" val="1"/>
+              </a:ext>
+            </a:extLst>
+          </p:cNvPr>
+          <p:cNvSpPr>
+            <a:spLocks noGrp="1" noRot="1" noChangeAspect="1" noMove="1" noResize="1" noEditPoints="1" noAdjustHandles="1" noChangeArrowheads="1" noChangeShapeType="1" noTextEdit="1"/>
+          </p:cNvSpPr>
+          <p:nvPr>
+            <p:extLst>
+              <p:ext uri="{386F3935-93C4-4BCD-93E2-E3B085C9AB24}">
+                <p16:designElem xmlns:p16="http://schemas.microsoft.com/office/powerpoint/2015/main" val="1"/>
+              </p:ext>
+            </p:extLst>
+          </p:nvPr>
+        </p:nvSpPr>
+        <p:spPr bwMode="ltGray">
+          <a:xfrm>
+            <a:off x="321564" y="320040"/>
+            <a:ext cx="11548872" cy="6217920"/>
+          </a:xfrm>
+          <a:prstGeom prst="rect">
+            <a:avLst/>
+          </a:prstGeom>
+          <a:solidFill>
+            <a:schemeClr val="tx1">
+              <a:alpha val="8000"/>
+            </a:schemeClr>
+          </a:solidFill>
+          <a:ln w="127000" cap="sq" cmpd="thinThick">
+            <a:noFill/>
+          </a:ln>
+        </p:spPr>
+        <p:style>
+          <a:lnRef idx="2">
+            <a:schemeClr val="accent1">
+              <a:shade val="50000"/>
+            </a:schemeClr>
+          </a:lnRef>
+          <a:fillRef idx="1">
+            <a:schemeClr val="accent1"/>
+          </a:fillRef>
+          <a:effectRef idx="0">
+            <a:schemeClr val="accent1"/>
+          </a:effectRef>
+          <a:fontRef idx="minor">
+            <a:schemeClr val="lt1"/>
+          </a:fontRef>
+        </p:style>
+        <p:txBody>
+          <a:bodyPr rtlCol="0" anchor="ctr"/>
+          <a:lstStyle/>
+          <a:p>
+            <a:pPr algn="ctr"/>
+            <a:endParaRPr lang="en-US"/>
+          </a:p>
+        </p:txBody>
+      </p:sp>
       <p:sp>
         <p:nvSpPr>
           <p:cNvPr id="2" name="Title 1">
@@ -14197,6 +14779,61 @@
           </a:p>
         </p:txBody>
       </p:sp>
+      <p:cxnSp>
+        <p:nvCxnSpPr>
+          <p:cNvPr id="57" name="Straight Connector 56">
+            <a:extLst>
+              <a:ext uri="{FF2B5EF4-FFF2-40B4-BE49-F238E27FC236}">
+                <a16:creationId xmlns:a16="http://schemas.microsoft.com/office/drawing/2014/main" id="{2D72A2C9-F3CA-4216-8BAD-FA4C970C3C4E}"/>
+              </a:ext>
+              <a:ext uri="{C183D7F6-B498-43B3-948B-1728B52AA6E4}">
+                <adec:decorative xmlns:adec="http://schemas.microsoft.com/office/drawing/2017/decorative" val="1"/>
+              </a:ext>
+            </a:extLst>
+          </p:cNvPr>
+          <p:cNvCxnSpPr>
+            <a:cxnSpLocks noGrp="1" noRot="1" noChangeAspect="1" noMove="1" noResize="1" noEditPoints="1" noAdjustHandles="1" noChangeArrowheads="1" noChangeShapeType="1"/>
+          </p:cNvCxnSpPr>
+          <p:nvPr>
+            <p:extLst>
+              <p:ext uri="{386F3935-93C4-4BCD-93E2-E3B085C9AB24}">
+                <p16:designElem xmlns:p16="http://schemas.microsoft.com/office/powerpoint/2015/main" val="1"/>
+              </p:ext>
+            </p:extLst>
+          </p:nvPr>
+        </p:nvCxnSpPr>
+        <p:spPr>
+          <a:xfrm>
+            <a:off x="4654296" y="2057400"/>
+            <a:ext cx="0" cy="2743200"/>
+          </a:xfrm>
+          <a:prstGeom prst="line">
+            <a:avLst/>
+          </a:prstGeom>
+          <a:ln w="19050">
+            <a:solidFill>
+              <a:schemeClr val="tx1">
+                <a:lumMod val="85000"/>
+                <a:lumOff val="15000"/>
+              </a:schemeClr>
+            </a:solidFill>
+          </a:ln>
+        </p:spPr>
+        <p:style>
+          <a:lnRef idx="1">
+            <a:schemeClr val="accent1"/>
+          </a:lnRef>
+          <a:fillRef idx="0">
+            <a:schemeClr val="accent1"/>
+          </a:fillRef>
+          <a:effectRef idx="0">
+            <a:schemeClr val="accent1"/>
+          </a:effectRef>
+          <a:fontRef idx="minor">
+            <a:schemeClr val="tx1"/>
+          </a:fontRef>
+        </p:style>
+      </p:cxnSp>
       <p:sp>
         <p:nvSpPr>
           <p:cNvPr id="50" name="Content Placeholder 3">
@@ -14247,7 +14884,7 @@
           </a:p>
           <a:p>
             <a:pPr lvl="1"/>
-            <a:endParaRPr lang="en-US" dirty="0"/>
+            <a:endParaRPr lang="en-US" sz="2400"/>
           </a:p>
           <a:p>
             <a:pPr lvl="1"/>
@@ -14306,6 +14943,71 @@
       </p:grpSpPr>
       <p:sp>
         <p:nvSpPr>
+          <p:cNvPr id="8" name="Rectangle 7">
+            <a:extLst>
+              <a:ext uri="{FF2B5EF4-FFF2-40B4-BE49-F238E27FC236}">
+                <a16:creationId xmlns:a16="http://schemas.microsoft.com/office/drawing/2014/main" id="{8D70B121-56F4-4848-B38B-182089D909FA}"/>
+              </a:ext>
+              <a:ext uri="{C183D7F6-B498-43B3-948B-1728B52AA6E4}">
+                <adec:decorative xmlns:adec="http://schemas.microsoft.com/office/drawing/2017/decorative" val="1"/>
+              </a:ext>
+            </a:extLst>
+          </p:cNvPr>
+          <p:cNvSpPr>
+            <a:spLocks noGrp="1" noRot="1" noChangeAspect="1" noMove="1" noResize="1" noEditPoints="1" noAdjustHandles="1" noChangeArrowheads="1" noChangeShapeType="1" noTextEdit="1"/>
+          </p:cNvSpPr>
+          <p:nvPr>
+            <p:extLst>
+              <p:ext uri="{386F3935-93C4-4BCD-93E2-E3B085C9AB24}">
+                <p16:designElem xmlns:p16="http://schemas.microsoft.com/office/powerpoint/2015/main" val="1"/>
+              </p:ext>
+            </p:extLst>
+          </p:nvPr>
+        </p:nvSpPr>
+        <p:spPr bwMode="ltGray">
+          <a:xfrm>
+            <a:off x="321564" y="320040"/>
+            <a:ext cx="11548872" cy="6217920"/>
+          </a:xfrm>
+          <a:prstGeom prst="rect">
+            <a:avLst/>
+          </a:prstGeom>
+          <a:solidFill>
+            <a:schemeClr val="tx1">
+              <a:alpha val="8000"/>
+            </a:schemeClr>
+          </a:solidFill>
+          <a:ln w="127000" cap="sq" cmpd="thinThick">
+            <a:noFill/>
+          </a:ln>
+        </p:spPr>
+        <p:style>
+          <a:lnRef idx="2">
+            <a:schemeClr val="accent1">
+              <a:shade val="50000"/>
+            </a:schemeClr>
+          </a:lnRef>
+          <a:fillRef idx="1">
+            <a:schemeClr val="accent1"/>
+          </a:fillRef>
+          <a:effectRef idx="0">
+            <a:schemeClr val="accent1"/>
+          </a:effectRef>
+          <a:fontRef idx="minor">
+            <a:schemeClr val="lt1"/>
+          </a:fontRef>
+        </p:style>
+        <p:txBody>
+          <a:bodyPr rtlCol="0" anchor="ctr"/>
+          <a:lstStyle/>
+          <a:p>
+            <a:pPr algn="ctr"/>
+            <a:endParaRPr lang="en-US"/>
+          </a:p>
+        </p:txBody>
+      </p:sp>
+      <p:sp>
+        <p:nvSpPr>
           <p:cNvPr id="2" name="Title 1">
             <a:extLst>
               <a:ext uri="{FF2B5EF4-FFF2-40B4-BE49-F238E27FC236}">
@@ -14349,6 +15051,61 @@
           </a:p>
         </p:txBody>
       </p:sp>
+      <p:cxnSp>
+        <p:nvCxnSpPr>
+          <p:cNvPr id="10" name="Straight Connector 9">
+            <a:extLst>
+              <a:ext uri="{FF2B5EF4-FFF2-40B4-BE49-F238E27FC236}">
+                <a16:creationId xmlns:a16="http://schemas.microsoft.com/office/drawing/2014/main" id="{2D72A2C9-F3CA-4216-8BAD-FA4C970C3C4E}"/>
+              </a:ext>
+              <a:ext uri="{C183D7F6-B498-43B3-948B-1728B52AA6E4}">
+                <adec:decorative xmlns:adec="http://schemas.microsoft.com/office/drawing/2017/decorative" val="1"/>
+              </a:ext>
+            </a:extLst>
+          </p:cNvPr>
+          <p:cNvCxnSpPr>
+            <a:cxnSpLocks noGrp="1" noRot="1" noChangeAspect="1" noMove="1" noResize="1" noEditPoints="1" noAdjustHandles="1" noChangeArrowheads="1" noChangeShapeType="1"/>
+          </p:cNvCxnSpPr>
+          <p:nvPr>
+            <p:extLst>
+              <p:ext uri="{386F3935-93C4-4BCD-93E2-E3B085C9AB24}">
+                <p16:designElem xmlns:p16="http://schemas.microsoft.com/office/powerpoint/2015/main" val="1"/>
+              </p:ext>
+            </p:extLst>
+          </p:nvPr>
+        </p:nvCxnSpPr>
+        <p:spPr>
+          <a:xfrm>
+            <a:off x="4654296" y="2057400"/>
+            <a:ext cx="0" cy="2743200"/>
+          </a:xfrm>
+          <a:prstGeom prst="line">
+            <a:avLst/>
+          </a:prstGeom>
+          <a:ln w="19050">
+            <a:solidFill>
+              <a:schemeClr val="tx1">
+                <a:lumMod val="85000"/>
+                <a:lumOff val="15000"/>
+              </a:schemeClr>
+            </a:solidFill>
+          </a:ln>
+        </p:spPr>
+        <p:style>
+          <a:lnRef idx="1">
+            <a:schemeClr val="accent1"/>
+          </a:lnRef>
+          <a:fillRef idx="0">
+            <a:schemeClr val="accent1"/>
+          </a:fillRef>
+          <a:effectRef idx="0">
+            <a:schemeClr val="accent1"/>
+          </a:effectRef>
+          <a:fontRef idx="minor">
+            <a:schemeClr val="tx1"/>
+          </a:fontRef>
+        </p:style>
+      </p:cxnSp>
       <p:sp>
         <p:nvSpPr>
           <p:cNvPr id="3" name="Content Placeholder 2">
@@ -14455,8 +15212,8 @@
         </p:nvSpPr>
         <p:spPr>
           <a:xfrm>
-            <a:off x="838200" y="713232"/>
-            <a:ext cx="3374136" cy="5504688"/>
+            <a:off x="838200" y="365125"/>
+            <a:ext cx="10515600" cy="1325563"/>
           </a:xfrm>
         </p:spPr>
         <p:txBody>
@@ -14466,7 +15223,7 @@
           <a:lstStyle/>
           <a:p>
             <a:r>
-              <a:rPr lang="en-US" sz="4400"/>
+              <a:rPr lang="en-US" sz="4400" dirty="0"/>
               <a:t>Compilation Stages of Julia Code</a:t>
             </a:r>
           </a:p>
@@ -14488,14 +15245,14 @@
             <p:ph idx="1"/>
             <p:extLst>
               <p:ext uri="{D42A27DB-BD31-4B8C-83A1-F6EECF244321}">
-                <p14:modId xmlns:p14="http://schemas.microsoft.com/office/powerpoint/2010/main" val="3996888474"/>
+                <p14:modId xmlns:p14="http://schemas.microsoft.com/office/powerpoint/2010/main" val="1853308916"/>
               </p:ext>
             </p:extLst>
           </p:nvPr>
         </p:nvGraphicFramePr>
         <p:xfrm>
-          <a:off x="5093208" y="713232"/>
-          <a:ext cx="6263640" cy="5504688"/>
+          <a:off x="838200" y="1825625"/>
+          <a:ext cx="10515600" cy="4351338"/>
         </p:xfrm>
         <a:graphic>
           <a:graphicData uri="http://schemas.openxmlformats.org/drawingml/2006/diagram">
@@ -14667,8 +15424,8 @@
         </p:nvSpPr>
         <p:spPr>
           <a:xfrm>
-            <a:off x="863029" y="1012004"/>
-            <a:ext cx="3416158" cy="4795408"/>
+            <a:off x="838200" y="365125"/>
+            <a:ext cx="10515600" cy="1325563"/>
           </a:xfrm>
         </p:spPr>
         <p:txBody>
@@ -14678,11 +15435,7 @@
           <a:lstStyle/>
           <a:p>
             <a:r>
-              <a:rPr lang="en-US" sz="4400" dirty="0">
-                <a:solidFill>
-                  <a:srgbClr val="FFFFFF"/>
-                </a:solidFill>
-              </a:rPr>
+              <a:rPr lang="en-US" sz="4400"/>
               <a:t>Parallel Computing</a:t>
             </a:r>
           </a:p>
@@ -14704,14 +15457,14 @@
             <p:ph idx="1"/>
             <p:extLst>
               <p:ext uri="{D42A27DB-BD31-4B8C-83A1-F6EECF244321}">
-                <p14:modId xmlns:p14="http://schemas.microsoft.com/office/powerpoint/2010/main" val="949387582"/>
+                <p14:modId xmlns:p14="http://schemas.microsoft.com/office/powerpoint/2010/main" val="650744338"/>
               </p:ext>
             </p:extLst>
           </p:nvPr>
         </p:nvGraphicFramePr>
         <p:xfrm>
-          <a:off x="5194300" y="470924"/>
-          <a:ext cx="6513604" cy="5885426"/>
+          <a:off x="838200" y="1825625"/>
+          <a:ext cx="10515600" cy="4351338"/>
         </p:xfrm>
         <a:graphic>
           <a:graphicData uri="http://schemas.openxmlformats.org/drawingml/2006/diagram">

</xml_diff>